<commit_message>
Add wkw param control for stress testing wkws + update doc
</commit_message>
<xml_diff>
--- a/Finance/resources/doc/risk-valuation-proactive.pptx
+++ b/Finance/resources/doc/risk-valuation-proactive.pptx
@@ -268,7 +268,7 @@
   </p:defaultTextStyle>
   <p:extLst>
     <p:ext uri="http://customooxmlschemas.google.com/">
-      <go:slidesCustomData xmlns:go="http://customooxmlschemas.google.com/" r:id="rId26" roundtripDataSignature="AMtx7miktY/zWApcvN7ITPhTkLkqclC16g=="/>
+      <go:slidesCustomData xmlns:go="http://customooxmlschemas.google.com/" r:id="rId26" roundtripDataSignature="AMtx7mgLcIYSHxTYJrq1XrARL9zF5UBS/Q=="/>
     </p:ext>
   </p:extLst>
 </p:presentation>
@@ -10406,31 +10406,7 @@
                 <a:cs typeface="Helvetica Neue"/>
                 <a:sym typeface="Helvetica Neue"/>
               </a:rPr>
-              <a:t>Estimates the portfolio PnLs (Profits and Losses) over stressed risk free rates and </a:t>
-            </a:r>
-            <a:r>
-              <a:rPr lang="en-US" sz="2400">
-                <a:solidFill>
-                  <a:schemeClr val="dk1"/>
-                </a:solidFill>
-                <a:latin typeface="Helvetica Neue"/>
-                <a:ea typeface="Helvetica Neue"/>
-                <a:cs typeface="Helvetica Neue"/>
-                <a:sym typeface="Helvetica Neue"/>
-              </a:rPr>
-              <a:t>volatilities</a:t>
-            </a:r>
-            <a:r>
-              <a:rPr b="0" i="0" lang="en-US" sz="2400" u="none" cap="none" strike="noStrike">
-                <a:solidFill>
-                  <a:schemeClr val="dk1"/>
-                </a:solidFill>
-                <a:latin typeface="Helvetica Neue"/>
-                <a:ea typeface="Helvetica Neue"/>
-                <a:cs typeface="Helvetica Neue"/>
-                <a:sym typeface="Helvetica Neue"/>
-              </a:rPr>
-              <a:t>.</a:t>
+              <a:t>Estimates the portfolio PnLs (Profits and Losses) over stressed risk free rates and volatilities.</a:t>
             </a:r>
             <a:endParaRPr b="0" i="0" sz="1400" u="none" cap="none" strike="noStrike">
               <a:solidFill>
@@ -10450,17 +10426,18 @@
           <p:cNvPicPr preferRelativeResize="0"/>
           <p:nvPr/>
         </p:nvPicPr>
-        <p:blipFill rotWithShape="1">
+        <p:blipFill>
           <a:blip r:embed="rId3">
             <a:alphaModFix/>
           </a:blip>
-          <a:srcRect b="0" l="0" r="0" t="0"/>
-          <a:stretch/>
+          <a:stretch>
+            <a:fillRect/>
+          </a:stretch>
         </p:blipFill>
         <p:spPr>
           <a:xfrm>
-            <a:off x="152400" y="3213242"/>
-            <a:ext cx="12852400" cy="4377758"/>
+            <a:off x="47625" y="3285892"/>
+            <a:ext cx="12909551" cy="5791008"/>
           </a:xfrm>
           <a:prstGeom prst="rect">
             <a:avLst/>
@@ -10596,6 +10573,10 @@
               <a:buNone/>
             </a:pPr>
             <a:r>
+              <a:rPr lang="en-US" sz="1800"/>
+              <a:t>Generates all the combinations &lt;stressed risk free rate, stressed volatility&gt; according to their min,max,step user parameters. </a:t>
+            </a:r>
+            <a:r>
               <a:rPr b="0" i="0" lang="en-US" sz="1800" u="none" cap="none" strike="noStrike">
                 <a:solidFill>
                   <a:srgbClr val="000000"/>
@@ -10605,7 +10586,27 @@
                 <a:cs typeface="Arial"/>
                 <a:sym typeface="Arial"/>
               </a:rPr>
-              <a:t>Estimates the number of MC simulations per replicated task. The number of replicated tasks must divide the total number of simulations</a:t>
+              <a:t>The number of replicated tasks must divide the number of </a:t>
+            </a:r>
+            <a:r>
+              <a:rPr lang="en-US" sz="1800"/>
+              <a:t>combinations, i.e. the number of </a:t>
+            </a:r>
+            <a:r>
+              <a:rPr lang="en-US" sz="1800"/>
+              <a:t>scenarios</a:t>
+            </a:r>
+            <a:r>
+              <a:rPr b="0" i="0" lang="en-US" sz="1800" u="none" cap="none" strike="noStrike">
+                <a:solidFill>
+                  <a:srgbClr val="000000"/>
+                </a:solidFill>
+                <a:latin typeface="Arial"/>
+                <a:ea typeface="Arial"/>
+                <a:cs typeface="Arial"/>
+                <a:sym typeface="Arial"/>
+              </a:rPr>
+              <a:t> </a:t>
             </a:r>
             <a:endParaRPr b="0" i="0" sz="1800" u="none" cap="none" strike="noStrike">
               <a:solidFill>
@@ -10729,6 +10730,10 @@
               <a:buNone/>
             </a:pPr>
             <a:r>
+              <a:rPr lang="en-US" sz="1800"/>
+              <a:t>E</a:t>
+            </a:r>
+            <a:r>
               <a:rPr b="0" i="0" lang="en-US" sz="1800" u="none" cap="none" strike="noStrike">
                 <a:solidFill>
                   <a:srgbClr val="000000"/>
@@ -10738,11 +10743,11 @@
                 <a:cs typeface="Arial"/>
                 <a:sym typeface="Arial"/>
               </a:rPr>
-              <a:t>Using Quanlib, each replicated task processes a subset of the MC simulations and deduces the PnL (profit and loss) of each simulated path. An expected PnL is estimated per risk free rate and volatility stressed percentage. Each task </a:t>
+              <a:t>ach replicated task processes a subset of the </a:t>
             </a:r>
             <a:r>
               <a:rPr lang="en-US" sz="1800"/>
-              <a:t>writes the estimated </a:t>
+              <a:t>scenarios</a:t>
             </a:r>
             <a:r>
               <a:rPr b="0" i="0" lang="en-US" sz="1800" u="none" cap="none" strike="noStrike">
@@ -10754,7 +10759,115 @@
                 <a:cs typeface="Arial"/>
                 <a:sym typeface="Arial"/>
               </a:rPr>
-              <a:t>PnLs into a dedicated file</a:t>
+              <a:t> and estimates</a:t>
+            </a:r>
+            <a:r>
+              <a:rPr lang="en-US" sz="1800"/>
+              <a:t> per </a:t>
+            </a:r>
+            <a:r>
+              <a:rPr lang="en-US" sz="1800"/>
+              <a:t>scenario, the mean/expected portfolio Profit and Loss (P&amp;L) over the given number of</a:t>
+            </a:r>
+            <a:r>
+              <a:rPr lang="en-US" sz="1800"/>
+              <a:t> </a:t>
+            </a:r>
+            <a:r>
+              <a:rPr b="0" i="0" lang="en-US" sz="1800" u="none" cap="none" strike="noStrike">
+                <a:solidFill>
+                  <a:srgbClr val="000000"/>
+                </a:solidFill>
+                <a:latin typeface="Arial"/>
+                <a:ea typeface="Arial"/>
+                <a:cs typeface="Arial"/>
+                <a:sym typeface="Arial"/>
+              </a:rPr>
+              <a:t>MC simulations. These </a:t>
+            </a:r>
+            <a:r>
+              <a:rPr lang="en-US" sz="1800"/>
+              <a:t>simulations</a:t>
+            </a:r>
+            <a:r>
+              <a:rPr b="0" i="0" lang="en-US" sz="1800" u="none" cap="none" strike="noStrike">
+                <a:solidFill>
+                  <a:srgbClr val="000000"/>
+                </a:solidFill>
+                <a:latin typeface="Arial"/>
+                <a:ea typeface="Arial"/>
+                <a:cs typeface="Arial"/>
+                <a:sym typeface="Arial"/>
+              </a:rPr>
+              <a:t> are proc</a:t>
+            </a:r>
+            <a:r>
+              <a:rPr lang="en-US" sz="1800"/>
+              <a:t>essed in C++/Quantlib.</a:t>
+            </a:r>
+            <a:r>
+              <a:rPr b="0" i="0" lang="en-US" sz="1800" u="none" cap="none" strike="noStrike">
+                <a:solidFill>
+                  <a:srgbClr val="000000"/>
+                </a:solidFill>
+                <a:latin typeface="Arial"/>
+                <a:ea typeface="Arial"/>
+                <a:cs typeface="Arial"/>
+                <a:sym typeface="Arial"/>
+              </a:rPr>
+              <a:t> Each task writes </a:t>
+            </a:r>
+            <a:r>
+              <a:rPr lang="en-US" sz="1800">
+                <a:solidFill>
+                  <a:schemeClr val="dk1"/>
+                </a:solidFill>
+              </a:rPr>
+              <a:t>into a dedicated file </a:t>
+            </a:r>
+            <a:r>
+              <a:rPr b="0" i="0" lang="en-US" sz="1800" u="none" cap="none" strike="noStrike">
+                <a:solidFill>
+                  <a:srgbClr val="000000"/>
+                </a:solidFill>
+                <a:latin typeface="Arial"/>
+                <a:ea typeface="Arial"/>
+                <a:cs typeface="Arial"/>
+                <a:sym typeface="Arial"/>
+              </a:rPr>
+              <a:t>all its estimated P</a:t>
+            </a:r>
+            <a:r>
+              <a:rPr lang="en-US" sz="1800"/>
+              <a:t>&amp;</a:t>
+            </a:r>
+            <a:r>
+              <a:rPr b="0" i="0" lang="en-US" sz="1800" u="none" cap="none" strike="noStrike">
+                <a:solidFill>
+                  <a:srgbClr val="000000"/>
+                </a:solidFill>
+                <a:latin typeface="Arial"/>
+                <a:ea typeface="Arial"/>
+                <a:cs typeface="Arial"/>
+                <a:sym typeface="Arial"/>
+              </a:rPr>
+              <a:t>Ls</a:t>
+            </a:r>
+            <a:r>
+              <a:rPr lang="en-US" sz="1800"/>
+              <a:t> (</a:t>
+            </a:r>
+            <a:r>
+              <a:rPr b="0" i="0" lang="en-US" sz="1800" u="none" cap="none" strike="noStrike">
+                <a:solidFill>
+                  <a:srgbClr val="000000"/>
+                </a:solidFill>
+                <a:latin typeface="Arial"/>
+                <a:ea typeface="Arial"/>
+                <a:cs typeface="Arial"/>
+                <a:sym typeface="Arial"/>
+              </a:rPr>
+              <a:t>a P&amp;L per senario) </a:t>
             </a:r>
             <a:endParaRPr b="0" i="0" sz="1800" u="none" cap="none" strike="noStrike">
               <a:solidFill>
@@ -10829,38 +10942,7 @@
             </a:endParaRPr>
           </a:p>
           <a:p>
-            <a:pPr indent="0" lvl="0" marL="0" marR="0" rtl="0" algn="r">
-              <a:lnSpc>
-                <a:spcPct val="100000"/>
-              </a:lnSpc>
-              <a:spcBef>
-                <a:spcPts val="0"/>
-              </a:spcBef>
-              <a:spcAft>
-                <a:spcPts val="0"/>
-              </a:spcAft>
-              <a:buClr>
-                <a:srgbClr val="000000"/>
-              </a:buClr>
-              <a:buSzPts val="1800"/>
-              <a:buFont typeface="Arial"/>
-              <a:buNone/>
-            </a:pPr>
-            <a:r>
-              <a:t/>
-            </a:r>
-            <a:endParaRPr b="0" i="0" sz="1800" u="none" cap="none" strike="noStrike">
-              <a:solidFill>
-                <a:srgbClr val="000000"/>
-              </a:solidFill>
-              <a:latin typeface="Arial"/>
-              <a:ea typeface="Arial"/>
-              <a:cs typeface="Arial"/>
-              <a:sym typeface="Arial"/>
-            </a:endParaRPr>
-          </a:p>
-          <a:p>
-            <a:pPr indent="0" lvl="0" marL="0" marR="0" rtl="0" algn="r">
+            <a:pPr indent="0" lvl="0" marL="0" marR="0" rtl="0" algn="l">
               <a:lnSpc>
                 <a:spcPct val="100000"/>
               </a:lnSpc>
@@ -11661,39 +11743,7 @@
                 <a:cs typeface="Arial"/>
                 <a:sym typeface="Arial"/>
               </a:rPr>
-              <a:t>The interactive version of the Stress_Testing_Monte_Carlo_Value_Portfolio</a:t>
-            </a:r>
-            <a:r>
-              <a:rPr lang="en-US" sz="1800"/>
-              <a:t> </a:t>
-            </a:r>
-            <a:r>
-              <a:rPr b="0" i="0" lang="en-US" sz="1800" u="none" cap="none" strike="noStrike">
-                <a:solidFill>
-                  <a:srgbClr val="000000"/>
-                </a:solidFill>
-                <a:latin typeface="Arial"/>
-                <a:ea typeface="Arial"/>
-                <a:cs typeface="Arial"/>
-                <a:sym typeface="Arial"/>
-              </a:rPr>
-              <a:t>workflow allows the user to add more MC simulations to each estimated </a:t>
-            </a:r>
-            <a:r>
-              <a:rPr lang="en-US" sz="1800"/>
-              <a:t>stressed portfolio P&amp;L</a:t>
-            </a:r>
-            <a:r>
-              <a:rPr b="0" i="0" lang="en-US" sz="1800" u="none" cap="none" strike="noStrike">
-                <a:solidFill>
-                  <a:srgbClr val="000000"/>
-                </a:solidFill>
-                <a:latin typeface="Arial"/>
-                <a:ea typeface="Arial"/>
-                <a:cs typeface="Arial"/>
-                <a:sym typeface="Arial"/>
-              </a:rPr>
-              <a:t>.</a:t>
+              <a:t>The interactive version of the Stress_Testing_Monte_Carlo_Value_Portfolio workflow allows the user to add more MC simulations to each estimated stressed portfolio P&amp;L.</a:t>
             </a:r>
             <a:endParaRPr b="0" i="0" sz="1800" u="none" cap="none" strike="noStrike">
               <a:solidFill>
@@ -11713,13 +11763,12 @@
           <p:cNvPicPr preferRelativeResize="0"/>
           <p:nvPr/>
         </p:nvPicPr>
-        <p:blipFill>
+        <p:blipFill rotWithShape="1">
           <a:blip r:embed="rId3">
             <a:alphaModFix/>
           </a:blip>
-          <a:stretch>
-            <a:fillRect/>
-          </a:stretch>
+          <a:srcRect b="0" l="0" r="0" t="0"/>
+          <a:stretch/>
         </p:blipFill>
         <p:spPr>
           <a:xfrm>
@@ -11741,13 +11790,12 @@
           <p:cNvPicPr preferRelativeResize="0"/>
           <p:nvPr/>
         </p:nvPicPr>
-        <p:blipFill>
+        <p:blipFill rotWithShape="1">
           <a:blip r:embed="rId4">
             <a:alphaModFix/>
           </a:blip>
-          <a:stretch>
-            <a:fillRect/>
-          </a:stretch>
+          <a:srcRect b="0" l="0" r="0" t="0"/>
+          <a:stretch/>
         </p:blipFill>
         <p:spPr>
           <a:xfrm>
@@ -11819,7 +11867,7 @@
           <a:effectLst>
             <a:outerShdw blurRad="57150" rotWithShape="0" algn="bl" dir="5400000" dist="19050">
               <a:srgbClr val="000000">
-                <a:alpha val="48235"/>
+                <a:alpha val="47843"/>
               </a:srgbClr>
             </a:outerShdw>
           </a:effectLst>
@@ -11893,7 +11941,7 @@
           <a:effectLst>
             <a:outerShdw blurRad="57150" rotWithShape="0" algn="bl" dir="5400000" dist="19050">
               <a:srgbClr val="000000">
-                <a:alpha val="48235"/>
+                <a:alpha val="47843"/>
               </a:srgbClr>
             </a:outerShdw>
           </a:effectLst>
@@ -11967,7 +12015,7 @@
           <a:effectLst>
             <a:outerShdw blurRad="57150" rotWithShape="0" algn="bl" dir="5400000" dist="19050">
               <a:srgbClr val="000000">
-                <a:alpha val="48235"/>
+                <a:alpha val="47843"/>
               </a:srgbClr>
             </a:outerShdw>
           </a:effectLst>
@@ -12041,7 +12089,7 @@
           <a:effectLst>
             <a:outerShdw blurRad="57150" rotWithShape="0" algn="bl" dir="5400000" dist="19050">
               <a:srgbClr val="000000">
-                <a:alpha val="48235"/>
+                <a:alpha val="47843"/>
               </a:srgbClr>
             </a:outerShdw>
           </a:effectLst>
@@ -12115,7 +12163,7 @@
           <a:effectLst>
             <a:outerShdw blurRad="57150" rotWithShape="0" algn="bl" dir="5400000" dist="19050">
               <a:srgbClr val="000000">
-                <a:alpha val="48235"/>
+                <a:alpha val="47843"/>
               </a:srgbClr>
             </a:outerShdw>
           </a:effectLst>
@@ -12189,7 +12237,7 @@
           <a:effectLst>
             <a:outerShdw blurRad="57150" rotWithShape="0" algn="bl" dir="5400000" dist="19050">
               <a:srgbClr val="000000">
-                <a:alpha val="48235"/>
+                <a:alpha val="47843"/>
               </a:srgbClr>
             </a:outerShdw>
           </a:effectLst>
@@ -12263,7 +12311,7 @@
           <a:effectLst>
             <a:outerShdw blurRad="57150" rotWithShape="0" algn="bl" dir="5400000" dist="19050">
               <a:srgbClr val="000000">
-                <a:alpha val="48235"/>
+                <a:alpha val="47843"/>
               </a:srgbClr>
             </a:outerShdw>
           </a:effectLst>
@@ -12337,7 +12385,7 @@
           <a:effectLst>
             <a:outerShdw blurRad="57150" rotWithShape="0" algn="bl" dir="5400000" dist="19050">
               <a:srgbClr val="000000">
-                <a:alpha val="48235"/>
+                <a:alpha val="47843"/>
               </a:srgbClr>
             </a:outerShdw>
           </a:effectLst>
@@ -12411,7 +12459,7 @@
           <a:effectLst>
             <a:outerShdw blurRad="57150" rotWithShape="0" algn="bl" dir="5400000" dist="19050">
               <a:srgbClr val="000000">
-                <a:alpha val="48235"/>
+                <a:alpha val="47843"/>
               </a:srgbClr>
             </a:outerShdw>
           </a:effectLst>
@@ -12485,7 +12533,7 @@
           <a:effectLst>
             <a:outerShdw blurRad="57150" rotWithShape="0" algn="bl" dir="5400000" dist="19050">
               <a:srgbClr val="000000">
-                <a:alpha val="48235"/>
+                <a:alpha val="47843"/>
               </a:srgbClr>
             </a:outerShdw>
           </a:effectLst>
@@ -12559,7 +12607,7 @@
           <a:effectLst>
             <a:outerShdw blurRad="57150" rotWithShape="0" algn="bl" dir="5400000" dist="19050">
               <a:srgbClr val="000000">
-                <a:alpha val="48235"/>
+                <a:alpha val="47843"/>
               </a:srgbClr>
             </a:outerShdw>
           </a:effectLst>
@@ -12633,7 +12681,7 @@
           <a:effectLst>
             <a:outerShdw blurRad="57150" rotWithShape="0" algn="bl" dir="5400000" dist="19050">
               <a:srgbClr val="000000">
-                <a:alpha val="48235"/>
+                <a:alpha val="47843"/>
               </a:srgbClr>
             </a:outerShdw>
           </a:effectLst>
@@ -12707,7 +12755,7 @@
           <a:effectLst>
             <a:outerShdw blurRad="57150" rotWithShape="0" algn="bl" dir="5400000" dist="19050">
               <a:srgbClr val="000000">
-                <a:alpha val="48235"/>
+                <a:alpha val="47843"/>
               </a:srgbClr>
             </a:outerShdw>
           </a:effectLst>
@@ -12781,7 +12829,7 @@
           <a:effectLst>
             <a:outerShdw blurRad="57150" rotWithShape="0" algn="bl" dir="5400000" dist="19050">
               <a:srgbClr val="000000">
-                <a:alpha val="48235"/>
+                <a:alpha val="47843"/>
               </a:srgbClr>
             </a:outerShdw>
           </a:effectLst>
@@ -12855,7 +12903,7 @@
           <a:effectLst>
             <a:outerShdw blurRad="57150" rotWithShape="0" algn="bl" dir="5400000" dist="19050">
               <a:srgbClr val="000000">
-                <a:alpha val="48235"/>
+                <a:alpha val="47843"/>
               </a:srgbClr>
             </a:outerShdw>
           </a:effectLst>
@@ -12929,7 +12977,7 @@
           <a:effectLst>
             <a:outerShdw blurRad="57150" rotWithShape="0" algn="bl" dir="5400000" dist="19050">
               <a:srgbClr val="000000">
-                <a:alpha val="48235"/>
+                <a:alpha val="47843"/>
               </a:srgbClr>
             </a:outerShdw>
           </a:effectLst>
@@ -13003,7 +13051,7 @@
           <a:effectLst>
             <a:outerShdw blurRad="57150" rotWithShape="0" algn="bl" dir="5400000" dist="19050">
               <a:srgbClr val="000000">
-                <a:alpha val="48235"/>
+                <a:alpha val="47843"/>
               </a:srgbClr>
             </a:outerShdw>
           </a:effectLst>
@@ -13077,7 +13125,7 @@
           <a:effectLst>
             <a:outerShdw blurRad="57150" rotWithShape="0" algn="bl" dir="5400000" dist="19050">
               <a:srgbClr val="000000">
-                <a:alpha val="48235"/>
+                <a:alpha val="47843"/>
               </a:srgbClr>
             </a:outerShdw>
           </a:effectLst>
@@ -13151,7 +13199,7 @@
           <a:effectLst>
             <a:outerShdw blurRad="57150" rotWithShape="0" algn="bl" dir="5400000" dist="19050">
               <a:srgbClr val="000000">
-                <a:alpha val="48235"/>
+                <a:alpha val="47843"/>
               </a:srgbClr>
             </a:outerShdw>
           </a:effectLst>
@@ -13225,7 +13273,7 @@
           <a:effectLst>
             <a:outerShdw blurRad="57150" rotWithShape="0" algn="bl" dir="5400000" dist="19050">
               <a:srgbClr val="000000">
-                <a:alpha val="48235"/>
+                <a:alpha val="47843"/>
               </a:srgbClr>
             </a:outerShdw>
           </a:effectLst>
@@ -13299,7 +13347,7 @@
           <a:effectLst>
             <a:outerShdw blurRad="57150" rotWithShape="0" algn="bl" dir="5400000" dist="19050">
               <a:srgbClr val="000000">
-                <a:alpha val="48235"/>
+                <a:alpha val="47843"/>
               </a:srgbClr>
             </a:outerShdw>
           </a:effectLst>
@@ -13373,7 +13421,7 @@
           <a:effectLst>
             <a:outerShdw blurRad="57150" rotWithShape="0" algn="bl" dir="5400000" dist="19050">
               <a:srgbClr val="000000">
-                <a:alpha val="48235"/>
+                <a:alpha val="47843"/>
               </a:srgbClr>
             </a:outerShdw>
           </a:effectLst>
@@ -13447,7 +13495,7 @@
           <a:effectLst>
             <a:outerShdw blurRad="57150" rotWithShape="0" algn="bl" dir="5400000" dist="19050">
               <a:srgbClr val="000000">
-                <a:alpha val="48235"/>
+                <a:alpha val="47843"/>
               </a:srgbClr>
             </a:outerShdw>
           </a:effectLst>
@@ -13521,7 +13569,7 @@
           <a:effectLst>
             <a:outerShdw blurRad="57150" rotWithShape="0" algn="bl" dir="5400000" dist="19050">
               <a:srgbClr val="000000">
-                <a:alpha val="48235"/>
+                <a:alpha val="47843"/>
               </a:srgbClr>
             </a:outerShdw>
           </a:effectLst>
@@ -13595,7 +13643,7 @@
           <a:effectLst>
             <a:outerShdw blurRad="57150" rotWithShape="0" algn="bl" dir="5400000" dist="19050">
               <a:srgbClr val="000000">
-                <a:alpha val="48235"/>
+                <a:alpha val="47843"/>
               </a:srgbClr>
             </a:outerShdw>
           </a:effectLst>
@@ -13669,7 +13717,7 @@
           <a:effectLst>
             <a:outerShdw blurRad="57150" rotWithShape="0" algn="bl" dir="5400000" dist="19050">
               <a:srgbClr val="000000">
-                <a:alpha val="48235"/>
+                <a:alpha val="47843"/>
               </a:srgbClr>
             </a:outerShdw>
           </a:effectLst>
@@ -13743,7 +13791,7 @@
           <a:effectLst>
             <a:outerShdw blurRad="57150" rotWithShape="0" algn="bl" dir="5400000" dist="19050">
               <a:srgbClr val="000000">
-                <a:alpha val="48235"/>
+                <a:alpha val="47843"/>
               </a:srgbClr>
             </a:outerShdw>
           </a:effectLst>
@@ -13817,7 +13865,7 @@
           <a:effectLst>
             <a:outerShdw blurRad="57150" rotWithShape="0" algn="bl" dir="5400000" dist="19050">
               <a:srgbClr val="000000">
-                <a:alpha val="48235"/>
+                <a:alpha val="47843"/>
               </a:srgbClr>
             </a:outerShdw>
           </a:effectLst>
@@ -13891,7 +13939,7 @@
           <a:effectLst>
             <a:outerShdw blurRad="57150" rotWithShape="0" algn="bl" dir="5400000" dist="19050">
               <a:srgbClr val="000000">
-                <a:alpha val="48235"/>
+                <a:alpha val="47843"/>
               </a:srgbClr>
             </a:outerShdw>
           </a:effectLst>
@@ -13965,7 +14013,7 @@
           <a:effectLst>
             <a:outerShdw blurRad="57150" rotWithShape="0" algn="bl" dir="5400000" dist="19050">
               <a:srgbClr val="000000">
-                <a:alpha val="48235"/>
+                <a:alpha val="47843"/>
               </a:srgbClr>
             </a:outerShdw>
           </a:effectLst>
@@ -14039,7 +14087,7 @@
           <a:effectLst>
             <a:outerShdw blurRad="57150" rotWithShape="0" algn="bl" dir="5400000" dist="19050">
               <a:srgbClr val="000000">
-                <a:alpha val="48235"/>
+                <a:alpha val="47843"/>
               </a:srgbClr>
             </a:outerShdw>
           </a:effectLst>
@@ -14113,7 +14161,7 @@
           <a:effectLst>
             <a:outerShdw blurRad="57150" rotWithShape="0" algn="bl" dir="5400000" dist="19050">
               <a:srgbClr val="000000">
-                <a:alpha val="48235"/>
+                <a:alpha val="47843"/>
               </a:srgbClr>
             </a:outerShdw>
           </a:effectLst>
@@ -14187,7 +14235,7 @@
           <a:effectLst>
             <a:outerShdw blurRad="57150" rotWithShape="0" algn="bl" dir="5400000" dist="19050">
               <a:srgbClr val="000000">
-                <a:alpha val="48235"/>
+                <a:alpha val="47843"/>
               </a:srgbClr>
             </a:outerShdw>
           </a:effectLst>
@@ -14261,7 +14309,7 @@
           <a:effectLst>
             <a:outerShdw blurRad="57150" rotWithShape="0" algn="bl" dir="5400000" dist="19050">
               <a:srgbClr val="000000">
-                <a:alpha val="48235"/>
+                <a:alpha val="47843"/>
               </a:srgbClr>
             </a:outerShdw>
           </a:effectLst>
@@ -14335,7 +14383,7 @@
           <a:effectLst>
             <a:outerShdw blurRad="57150" rotWithShape="0" algn="bl" dir="5400000" dist="19050">
               <a:srgbClr val="000000">
-                <a:alpha val="48235"/>
+                <a:alpha val="47843"/>
               </a:srgbClr>
             </a:outerShdw>
           </a:effectLst>
@@ -14409,7 +14457,7 @@
           <a:effectLst>
             <a:outerShdw blurRad="57150" rotWithShape="0" algn="bl" dir="5400000" dist="19050">
               <a:srgbClr val="000000">
-                <a:alpha val="48235"/>
+                <a:alpha val="47843"/>
               </a:srgbClr>
             </a:outerShdw>
           </a:effectLst>
@@ -14483,7 +14531,7 @@
           <a:effectLst>
             <a:outerShdw blurRad="57150" rotWithShape="0" algn="bl" dir="5400000" dist="19050">
               <a:srgbClr val="000000">
-                <a:alpha val="48235"/>
+                <a:alpha val="47843"/>
               </a:srgbClr>
             </a:outerShdw>
           </a:effectLst>
@@ -14557,7 +14605,7 @@
           <a:effectLst>
             <a:outerShdw blurRad="57150" rotWithShape="0" algn="bl" dir="5400000" dist="19050">
               <a:srgbClr val="000000">
-                <a:alpha val="48235"/>
+                <a:alpha val="47843"/>
               </a:srgbClr>
             </a:outerShdw>
           </a:effectLst>
@@ -14631,7 +14679,7 @@
           <a:effectLst>
             <a:outerShdw blurRad="57150" rotWithShape="0" algn="bl" dir="5400000" dist="19050">
               <a:srgbClr val="000000">
-                <a:alpha val="48235"/>
+                <a:alpha val="47843"/>
               </a:srgbClr>
             </a:outerShdw>
           </a:effectLst>
@@ -14705,7 +14753,7 @@
           <a:effectLst>
             <a:outerShdw blurRad="57150" rotWithShape="0" algn="bl" dir="5400000" dist="19050">
               <a:srgbClr val="000000">
-                <a:alpha val="48235"/>
+                <a:alpha val="47843"/>
               </a:srgbClr>
             </a:outerShdw>
           </a:effectLst>
@@ -14779,7 +14827,7 @@
           <a:effectLst>
             <a:outerShdw blurRad="57150" rotWithShape="0" algn="bl" dir="5400000" dist="19050">
               <a:srgbClr val="000000">
-                <a:alpha val="48235"/>
+                <a:alpha val="47843"/>
               </a:srgbClr>
             </a:outerShdw>
           </a:effectLst>
@@ -14853,7 +14901,7 @@
           <a:effectLst>
             <a:outerShdw blurRad="57150" rotWithShape="0" algn="bl" dir="5400000" dist="19050">
               <a:srgbClr val="000000">
-                <a:alpha val="48235"/>
+                <a:alpha val="47843"/>
               </a:srgbClr>
             </a:outerShdw>
           </a:effectLst>
@@ -14927,7 +14975,7 @@
           <a:effectLst>
             <a:outerShdw blurRad="57150" rotWithShape="0" algn="bl" dir="5400000" dist="19050">
               <a:srgbClr val="000000">
-                <a:alpha val="48235"/>
+                <a:alpha val="47843"/>
               </a:srgbClr>
             </a:outerShdw>
           </a:effectLst>
@@ -15001,7 +15049,7 @@
           <a:effectLst>
             <a:outerShdw blurRad="57150" rotWithShape="0" algn="bl" dir="5400000" dist="19050">
               <a:srgbClr val="000000">
-                <a:alpha val="48235"/>
+                <a:alpha val="47843"/>
               </a:srgbClr>
             </a:outerShdw>
           </a:effectLst>
@@ -15156,31 +15204,7 @@
                 <a:cs typeface="Helvetica Neue"/>
                 <a:sym typeface="Helvetica Neue"/>
               </a:rPr>
-              <a:t>Estimates a Mark-to-Future (MtF) cube of a bond portfolio. Each cell of the cube </a:t>
-            </a:r>
-            <a:r>
-              <a:rPr lang="en-US" sz="2000">
-                <a:solidFill>
-                  <a:schemeClr val="dk1"/>
-                </a:solidFill>
-                <a:latin typeface="Helvetica Neue"/>
-                <a:ea typeface="Helvetica Neue"/>
-                <a:cs typeface="Helvetica Neue"/>
-                <a:sym typeface="Helvetica Neue"/>
-              </a:rPr>
-              <a:t>estimates</a:t>
-            </a:r>
-            <a:r>
-              <a:rPr b="0" i="0" lang="en-US" sz="2000" u="none" cap="none" strike="noStrike">
-                <a:solidFill>
-                  <a:schemeClr val="dk1"/>
-                </a:solidFill>
-                <a:latin typeface="Helvetica Neue"/>
-                <a:ea typeface="Helvetica Neue"/>
-                <a:cs typeface="Helvetica Neue"/>
-                <a:sym typeface="Helvetica Neue"/>
-              </a:rPr>
-              <a:t> the valuation of a bond at a specific time given a specific scenario. This can be easily extended to more exotic instruments thanks to the high maintenability of the implementation (C++ Quantlib for the pricing engine, inputs split in Java/Groovy, R for the cube/cubelet stats,..).</a:t>
+              <a:t>Estimates a Mark-to-Future (MtF) cube of a bond portfolio. Each cell of the cube estimates the valuation of a bond at a specific time given a specific scenario. This can be easily extended to more exotic instruments thanks to the high maintenability of the implementation (C++ Quantlib for the pricing engine, inputs split in Java/Groovy, R for the cube/cubelet stats,..).</a:t>
             </a:r>
             <a:endParaRPr b="0" i="0" sz="2000" u="none" cap="none" strike="noStrike">
               <a:solidFill>
@@ -15555,7 +15579,7 @@
           <a:effectLst>
             <a:outerShdw blurRad="57150" rotWithShape="0" algn="bl" dir="5400000" dist="19050">
               <a:srgbClr val="000000">
-                <a:alpha val="48235"/>
+                <a:alpha val="47843"/>
               </a:srgbClr>
             </a:outerShdw>
           </a:effectLst>
@@ -15629,7 +15653,7 @@
           <a:effectLst>
             <a:outerShdw blurRad="57150" rotWithShape="0" algn="bl" dir="5400000" dist="19050">
               <a:srgbClr val="000000">
-                <a:alpha val="48235"/>
+                <a:alpha val="47843"/>
               </a:srgbClr>
             </a:outerShdw>
           </a:effectLst>
@@ -15703,7 +15727,7 @@
           <a:effectLst>
             <a:outerShdw blurRad="57150" rotWithShape="0" algn="bl" dir="5400000" dist="19050">
               <a:srgbClr val="000000">
-                <a:alpha val="48235"/>
+                <a:alpha val="47843"/>
               </a:srgbClr>
             </a:outerShdw>
           </a:effectLst>
@@ -15777,7 +15801,7 @@
           <a:effectLst>
             <a:outerShdw blurRad="57150" rotWithShape="0" algn="bl" dir="5400000" dist="19050">
               <a:srgbClr val="000000">
-                <a:alpha val="48235"/>
+                <a:alpha val="47843"/>
               </a:srgbClr>
             </a:outerShdw>
           </a:effectLst>
@@ -15851,7 +15875,7 @@
           <a:effectLst>
             <a:outerShdw blurRad="57150" rotWithShape="0" algn="bl" dir="5400000" dist="19050">
               <a:srgbClr val="000000">
-                <a:alpha val="48235"/>
+                <a:alpha val="47843"/>
               </a:srgbClr>
             </a:outerShdw>
           </a:effectLst>
@@ -15925,7 +15949,7 @@
           <a:effectLst>
             <a:outerShdw blurRad="57150" rotWithShape="0" algn="bl" dir="5400000" dist="19050">
               <a:srgbClr val="000000">
-                <a:alpha val="48235"/>
+                <a:alpha val="47843"/>
               </a:srgbClr>
             </a:outerShdw>
           </a:effectLst>
@@ -15999,7 +16023,7 @@
           <a:effectLst>
             <a:outerShdw blurRad="57150" rotWithShape="0" algn="bl" dir="5400000" dist="19050">
               <a:srgbClr val="000000">
-                <a:alpha val="48235"/>
+                <a:alpha val="47843"/>
               </a:srgbClr>
             </a:outerShdw>
           </a:effectLst>
@@ -16073,7 +16097,7 @@
           <a:effectLst>
             <a:outerShdw blurRad="57150" rotWithShape="0" algn="bl" dir="5400000" dist="19050">
               <a:srgbClr val="000000">
-                <a:alpha val="48235"/>
+                <a:alpha val="47843"/>
               </a:srgbClr>
             </a:outerShdw>
           </a:effectLst>
@@ -16147,7 +16171,7 @@
           <a:effectLst>
             <a:outerShdw blurRad="57150" rotWithShape="0" algn="bl" dir="5400000" dist="19050">
               <a:srgbClr val="000000">
-                <a:alpha val="48235"/>
+                <a:alpha val="47843"/>
               </a:srgbClr>
             </a:outerShdw>
           </a:effectLst>
@@ -16313,7 +16337,7 @@
           <a:effectLst>
             <a:outerShdw blurRad="57150" rotWithShape="0" algn="bl" dir="5400000" dist="19050">
               <a:srgbClr val="000000">
-                <a:alpha val="48235"/>
+                <a:alpha val="47843"/>
               </a:srgbClr>
             </a:outerShdw>
           </a:effectLst>
@@ -16387,7 +16411,7 @@
           <a:effectLst>
             <a:outerShdw blurRad="57150" rotWithShape="0" algn="bl" dir="5400000" dist="19050">
               <a:srgbClr val="000000">
-                <a:alpha val="48235"/>
+                <a:alpha val="47843"/>
               </a:srgbClr>
             </a:outerShdw>
           </a:effectLst>
@@ -16461,7 +16485,7 @@
           <a:effectLst>
             <a:outerShdw blurRad="57150" rotWithShape="0" algn="bl" dir="5400000" dist="19050">
               <a:srgbClr val="000000">
-                <a:alpha val="48235"/>
+                <a:alpha val="47843"/>
               </a:srgbClr>
             </a:outerShdw>
           </a:effectLst>
@@ -16535,7 +16559,7 @@
           <a:effectLst>
             <a:outerShdw blurRad="57150" rotWithShape="0" algn="bl" dir="5400000" dist="19050">
               <a:srgbClr val="000000">
-                <a:alpha val="48235"/>
+                <a:alpha val="47843"/>
               </a:srgbClr>
             </a:outerShdw>
           </a:effectLst>
@@ -16609,7 +16633,7 @@
           <a:effectLst>
             <a:outerShdw blurRad="57150" rotWithShape="0" algn="bl" dir="5400000" dist="19050">
               <a:srgbClr val="000000">
-                <a:alpha val="48235"/>
+                <a:alpha val="47843"/>
               </a:srgbClr>
             </a:outerShdw>
           </a:effectLst>
@@ -16683,7 +16707,7 @@
           <a:effectLst>
             <a:outerShdw blurRad="57150" rotWithShape="0" algn="bl" dir="5400000" dist="19050">
               <a:srgbClr val="000000">
-                <a:alpha val="48235"/>
+                <a:alpha val="47843"/>
               </a:srgbClr>
             </a:outerShdw>
           </a:effectLst>
@@ -16757,7 +16781,7 @@
           <a:effectLst>
             <a:outerShdw blurRad="57150" rotWithShape="0" algn="bl" dir="5400000" dist="19050">
               <a:srgbClr val="000000">
-                <a:alpha val="48235"/>
+                <a:alpha val="47843"/>
               </a:srgbClr>
             </a:outerShdw>
           </a:effectLst>
@@ -16831,7 +16855,7 @@
           <a:effectLst>
             <a:outerShdw blurRad="57150" rotWithShape="0" algn="bl" dir="5400000" dist="19050">
               <a:srgbClr val="000000">
-                <a:alpha val="48235"/>
+                <a:alpha val="47843"/>
               </a:srgbClr>
             </a:outerShdw>
           </a:effectLst>
@@ -16905,7 +16929,7 @@
           <a:effectLst>
             <a:outerShdw blurRad="57150" rotWithShape="0" algn="bl" dir="5400000" dist="19050">
               <a:srgbClr val="000000">
-                <a:alpha val="48235"/>
+                <a:alpha val="47843"/>
               </a:srgbClr>
             </a:outerShdw>
           </a:effectLst>
@@ -16979,7 +17003,7 @@
           <a:effectLst>
             <a:outerShdw blurRad="57150" rotWithShape="0" algn="bl" dir="5400000" dist="19050">
               <a:srgbClr val="000000">
-                <a:alpha val="48235"/>
+                <a:alpha val="47843"/>
               </a:srgbClr>
             </a:outerShdw>
           </a:effectLst>
@@ -17053,7 +17077,7 @@
           <a:effectLst>
             <a:outerShdw blurRad="57150" rotWithShape="0" algn="bl" dir="5400000" dist="19050">
               <a:srgbClr val="000000">
-                <a:alpha val="48235"/>
+                <a:alpha val="47843"/>
               </a:srgbClr>
             </a:outerShdw>
           </a:effectLst>
@@ -17127,7 +17151,7 @@
           <a:effectLst>
             <a:outerShdw blurRad="57150" rotWithShape="0" algn="bl" dir="5400000" dist="19050">
               <a:srgbClr val="000000">
-                <a:alpha val="48235"/>
+                <a:alpha val="47843"/>
               </a:srgbClr>
             </a:outerShdw>
           </a:effectLst>
@@ -17201,7 +17225,7 @@
           <a:effectLst>
             <a:outerShdw blurRad="57150" rotWithShape="0" algn="bl" dir="5400000" dist="19050">
               <a:srgbClr val="000000">
-                <a:alpha val="48235"/>
+                <a:alpha val="47843"/>
               </a:srgbClr>
             </a:outerShdw>
           </a:effectLst>
@@ -17590,7 +17614,7 @@
           <a:effectLst>
             <a:outerShdw blurRad="57150" rotWithShape="0" algn="bl" dir="5400000" dist="19050">
               <a:srgbClr val="000000">
-                <a:alpha val="48235"/>
+                <a:alpha val="47843"/>
               </a:srgbClr>
             </a:outerShdw>
           </a:effectLst>
@@ -17664,7 +17688,7 @@
           <a:effectLst>
             <a:outerShdw blurRad="57150" rotWithShape="0" algn="bl" dir="5400000" dist="19050">
               <a:srgbClr val="000000">
-                <a:alpha val="48235"/>
+                <a:alpha val="47843"/>
               </a:srgbClr>
             </a:outerShdw>
           </a:effectLst>
@@ -17738,7 +17762,7 @@
           <a:effectLst>
             <a:outerShdw blurRad="57150" rotWithShape="0" algn="bl" dir="5400000" dist="19050">
               <a:srgbClr val="000000">
-                <a:alpha val="48235"/>
+                <a:alpha val="47843"/>
               </a:srgbClr>
             </a:outerShdw>
           </a:effectLst>
@@ -17812,7 +17836,7 @@
           <a:effectLst>
             <a:outerShdw blurRad="57150" rotWithShape="0" algn="bl" dir="5400000" dist="19050">
               <a:srgbClr val="000000">
-                <a:alpha val="48235"/>
+                <a:alpha val="47843"/>
               </a:srgbClr>
             </a:outerShdw>
           </a:effectLst>
@@ -17886,7 +17910,7 @@
           <a:effectLst>
             <a:outerShdw blurRad="57150" rotWithShape="0" algn="bl" dir="5400000" dist="19050">
               <a:srgbClr val="000000">
-                <a:alpha val="48235"/>
+                <a:alpha val="47843"/>
               </a:srgbClr>
             </a:outerShdw>
           </a:effectLst>
@@ -17960,7 +17984,7 @@
           <a:effectLst>
             <a:outerShdw blurRad="57150" rotWithShape="0" algn="bl" dir="5400000" dist="19050">
               <a:srgbClr val="000000">
-                <a:alpha val="48235"/>
+                <a:alpha val="47843"/>
               </a:srgbClr>
             </a:outerShdw>
           </a:effectLst>
@@ -18034,7 +18058,7 @@
           <a:effectLst>
             <a:outerShdw blurRad="57150" rotWithShape="0" algn="bl" dir="5400000" dist="19050">
               <a:srgbClr val="000000">
-                <a:alpha val="48235"/>
+                <a:alpha val="47843"/>
               </a:srgbClr>
             </a:outerShdw>
           </a:effectLst>
@@ -18108,7 +18132,7 @@
           <a:effectLst>
             <a:outerShdw blurRad="57150" rotWithShape="0" algn="bl" dir="5400000" dist="19050">
               <a:srgbClr val="000000">
-                <a:alpha val="48235"/>
+                <a:alpha val="47843"/>
               </a:srgbClr>
             </a:outerShdw>
           </a:effectLst>
@@ -18182,7 +18206,7 @@
           <a:effectLst>
             <a:outerShdw blurRad="57150" rotWithShape="0" algn="bl" dir="5400000" dist="19050">
               <a:srgbClr val="000000">
-                <a:alpha val="48235"/>
+                <a:alpha val="47843"/>
               </a:srgbClr>
             </a:outerShdw>
           </a:effectLst>
@@ -18256,7 +18280,7 @@
           <a:effectLst>
             <a:outerShdw blurRad="57150" rotWithShape="0" algn="bl" dir="5400000" dist="19050">
               <a:srgbClr val="000000">
-                <a:alpha val="48235"/>
+                <a:alpha val="47843"/>
               </a:srgbClr>
             </a:outerShdw>
           </a:effectLst>
@@ -18330,7 +18354,7 @@
           <a:effectLst>
             <a:outerShdw blurRad="57150" rotWithShape="0" algn="bl" dir="5400000" dist="19050">
               <a:srgbClr val="000000">
-                <a:alpha val="48235"/>
+                <a:alpha val="47843"/>
               </a:srgbClr>
             </a:outerShdw>
           </a:effectLst>
@@ -18404,7 +18428,7 @@
           <a:effectLst>
             <a:outerShdw blurRad="57150" rotWithShape="0" algn="bl" dir="5400000" dist="19050">
               <a:srgbClr val="000000">
-                <a:alpha val="48235"/>
+                <a:alpha val="47843"/>
               </a:srgbClr>
             </a:outerShdw>
           </a:effectLst>
@@ -18478,7 +18502,7 @@
           <a:effectLst>
             <a:outerShdw blurRad="57150" rotWithShape="0" algn="bl" dir="5400000" dist="19050">
               <a:srgbClr val="000000">
-                <a:alpha val="48235"/>
+                <a:alpha val="47843"/>
               </a:srgbClr>
             </a:outerShdw>
           </a:effectLst>
@@ -18552,7 +18576,7 @@
           <a:effectLst>
             <a:outerShdw blurRad="57150" rotWithShape="0" algn="bl" dir="5400000" dist="19050">
               <a:srgbClr val="000000">
-                <a:alpha val="48235"/>
+                <a:alpha val="47843"/>
               </a:srgbClr>
             </a:outerShdw>
           </a:effectLst>
@@ -18626,7 +18650,7 @@
           <a:effectLst>
             <a:outerShdw blurRad="57150" rotWithShape="0" algn="bl" dir="5400000" dist="19050">
               <a:srgbClr val="000000">
-                <a:alpha val="48235"/>
+                <a:alpha val="47843"/>
               </a:srgbClr>
             </a:outerShdw>
           </a:effectLst>
@@ -18700,7 +18724,7 @@
           <a:effectLst>
             <a:outerShdw blurRad="57150" rotWithShape="0" algn="bl" dir="5400000" dist="19050">
               <a:srgbClr val="000000">
-                <a:alpha val="48235"/>
+                <a:alpha val="47843"/>
               </a:srgbClr>
             </a:outerShdw>
           </a:effectLst>
@@ -18774,7 +18798,7 @@
           <a:effectLst>
             <a:outerShdw blurRad="57150" rotWithShape="0" algn="bl" dir="5400000" dist="19050">
               <a:srgbClr val="000000">
-                <a:alpha val="48235"/>
+                <a:alpha val="47843"/>
               </a:srgbClr>
             </a:outerShdw>
           </a:effectLst>
@@ -18848,7 +18872,7 @@
           <a:effectLst>
             <a:outerShdw blurRad="57150" rotWithShape="0" algn="bl" dir="5400000" dist="19050">
               <a:srgbClr val="000000">
-                <a:alpha val="48235"/>
+                <a:alpha val="47843"/>
               </a:srgbClr>
             </a:outerShdw>
           </a:effectLst>
@@ -18922,7 +18946,7 @@
           <a:effectLst>
             <a:outerShdw blurRad="57150" rotWithShape="0" algn="bl" dir="5400000" dist="19050">
               <a:srgbClr val="000000">
-                <a:alpha val="48235"/>
+                <a:alpha val="47843"/>
               </a:srgbClr>
             </a:outerShdw>
           </a:effectLst>
@@ -18996,7 +19020,7 @@
           <a:effectLst>
             <a:outerShdw blurRad="57150" rotWithShape="0" algn="bl" dir="5400000" dist="19050">
               <a:srgbClr val="000000">
-                <a:alpha val="48235"/>
+                <a:alpha val="47843"/>
               </a:srgbClr>
             </a:outerShdw>
           </a:effectLst>
@@ -19070,7 +19094,7 @@
           <a:effectLst>
             <a:outerShdw blurRad="57150" rotWithShape="0" algn="bl" dir="5400000" dist="19050">
               <a:srgbClr val="000000">
-                <a:alpha val="48235"/>
+                <a:alpha val="47843"/>
               </a:srgbClr>
             </a:outerShdw>
           </a:effectLst>
@@ -19144,7 +19168,7 @@
           <a:effectLst>
             <a:outerShdw blurRad="57150" rotWithShape="0" algn="bl" dir="5400000" dist="19050">
               <a:srgbClr val="000000">
-                <a:alpha val="48235"/>
+                <a:alpha val="47843"/>
               </a:srgbClr>
             </a:outerShdw>
           </a:effectLst>
@@ -19218,7 +19242,7 @@
           <a:effectLst>
             <a:outerShdw blurRad="57150" rotWithShape="0" algn="bl" dir="5400000" dist="19050">
               <a:srgbClr val="000000">
-                <a:alpha val="48235"/>
+                <a:alpha val="47843"/>
               </a:srgbClr>
             </a:outerShdw>
           </a:effectLst>
@@ -19292,7 +19316,7 @@
           <a:effectLst>
             <a:outerShdw blurRad="57150" rotWithShape="0" algn="bl" dir="5400000" dist="19050">
               <a:srgbClr val="000000">
-                <a:alpha val="48235"/>
+                <a:alpha val="47843"/>
               </a:srgbClr>
             </a:outerShdw>
           </a:effectLst>
@@ -19366,7 +19390,7 @@
           <a:effectLst>
             <a:outerShdw blurRad="57150" rotWithShape="0" algn="bl" dir="5400000" dist="19050">
               <a:srgbClr val="000000">
-                <a:alpha val="48235"/>
+                <a:alpha val="47843"/>
               </a:srgbClr>
             </a:outerShdw>
           </a:effectLst>
@@ -19440,7 +19464,7 @@
           <a:effectLst>
             <a:outerShdw blurRad="57150" rotWithShape="0" algn="bl" dir="5400000" dist="19050">
               <a:srgbClr val="000000">
-                <a:alpha val="48235"/>
+                <a:alpha val="47843"/>
               </a:srgbClr>
             </a:outerShdw>
           </a:effectLst>
@@ -19514,7 +19538,7 @@
           <a:effectLst>
             <a:outerShdw blurRad="57150" rotWithShape="0" algn="bl" dir="5400000" dist="19050">
               <a:srgbClr val="000000">
-                <a:alpha val="48235"/>
+                <a:alpha val="47843"/>
               </a:srgbClr>
             </a:outerShdw>
           </a:effectLst>
@@ -22233,31 +22257,7 @@
                 <a:cs typeface="Helvetica Neue"/>
                 <a:sym typeface="Helvetica Neue"/>
               </a:rPr>
-              <a:t>Estimates the Monte Carlo Value at Risk (MC VaR) of a portfolio. We use the geometric Brownian motion (GBM) method to simulate stock price paths, but more </a:t>
-            </a:r>
-            <a:r>
-              <a:rPr lang="en-US" sz="2000">
-                <a:solidFill>
-                  <a:schemeClr val="dk1"/>
-                </a:solidFill>
-                <a:latin typeface="Helvetica Neue"/>
-                <a:ea typeface="Helvetica Neue"/>
-                <a:cs typeface="Helvetica Neue"/>
-                <a:sym typeface="Helvetica Neue"/>
-              </a:rPr>
-              <a:t>exotic </a:t>
-            </a:r>
-            <a:r>
-              <a:rPr b="0" i="0" lang="en-US" sz="2000" u="none" cap="none" strike="noStrike">
-                <a:solidFill>
-                  <a:schemeClr val="dk1"/>
-                </a:solidFill>
-                <a:latin typeface="Helvetica Neue"/>
-                <a:ea typeface="Helvetica Neue"/>
-                <a:cs typeface="Helvetica Neue"/>
-                <a:sym typeface="Helvetica Neue"/>
-              </a:rPr>
-              <a:t>assets can be integrated thanks to the Quantlib C++ lib.</a:t>
+              <a:t>Estimates the Monte Carlo Value at Risk (MC VaR) of a portfolio. We use the geometric Brownian motion (GBM) method to simulate stock price paths, but more exotic assets can be integrated thanks to the Quantlib C++ lib.</a:t>
             </a:r>
             <a:endParaRPr b="0" i="0" sz="2000" u="none" cap="none" strike="noStrike">
               <a:solidFill>
@@ -22296,17 +22296,25 @@
           </a:bodyPr>
           <a:lstStyle/>
           <a:p>
-            <a:pPr indent="0" lvl="0" marL="0" rtl="0" algn="l">
+            <a:pPr indent="0" lvl="0" marL="0" marR="0" rtl="0" algn="l">
+              <a:lnSpc>
+                <a:spcPct val="100000"/>
+              </a:lnSpc>
               <a:spcBef>
                 <a:spcPts val="800"/>
               </a:spcBef>
               <a:spcAft>
                 <a:spcPts val="0"/>
               </a:spcAft>
+              <a:buClr>
+                <a:srgbClr val="000000"/>
+              </a:buClr>
+              <a:buSzPts val="1400"/>
+              <a:buFont typeface="Arial"/>
               <a:buNone/>
             </a:pPr>
             <a:r>
-              <a:rPr lang="en-US">
+              <a:rPr b="0" i="0" lang="en-US" sz="1400" u="none" cap="none" strike="noStrike">
                 <a:solidFill>
                   <a:schemeClr val="dk1"/>
                 </a:solidFill>
@@ -22317,7 +22325,15 @@
               </a:rPr>
               <a:t>&lt;start price&gt;, &lt;riskless rate&gt;, &lt;volatility rate&gt;,&lt;weight&gt;</a:t>
             </a:r>
-            <a:endParaRPr/>
+            <a:endParaRPr b="0" i="0" sz="1400" u="none" cap="none" strike="noStrike">
+              <a:solidFill>
+                <a:srgbClr val="000000"/>
+              </a:solidFill>
+              <a:latin typeface="Arial"/>
+              <a:ea typeface="Arial"/>
+              <a:cs typeface="Arial"/>
+              <a:sym typeface="Arial"/>
+            </a:endParaRPr>
           </a:p>
         </p:txBody>
       </p:sp>
@@ -23063,39 +23079,7 @@
                 <a:cs typeface="Arial"/>
                 <a:sym typeface="Arial"/>
               </a:rPr>
-              <a:t>The interactive version of the Monte_Carlo_VaR_portfolio workflow allows the user to add more MC simulations to the </a:t>
-            </a:r>
-            <a:r>
-              <a:rPr lang="en-US" sz="1800"/>
-              <a:t>current </a:t>
-            </a:r>
-            <a:r>
-              <a:rPr b="0" i="0" lang="en-US" sz="1800" u="none" cap="none" strike="noStrike">
-                <a:solidFill>
-                  <a:srgbClr val="000000"/>
-                </a:solidFill>
-                <a:latin typeface="Arial"/>
-                <a:ea typeface="Arial"/>
-                <a:cs typeface="Arial"/>
-                <a:sym typeface="Arial"/>
-              </a:rPr>
-              <a:t>results, for a more accurate VaR. </a:t>
-            </a:r>
-            <a:r>
-              <a:rPr lang="en-US" sz="1800"/>
-              <a:t>“T</a:t>
-            </a:r>
-            <a:r>
-              <a:rPr b="0" i="0" lang="en-US" sz="1800" u="none" cap="none" strike="noStrike">
-                <a:solidFill>
-                  <a:srgbClr val="000000"/>
-                </a:solidFill>
-                <a:latin typeface="Arial"/>
-                <a:ea typeface="Arial"/>
-                <a:cs typeface="Arial"/>
-                <a:sym typeface="Arial"/>
-              </a:rPr>
-              <a:t>he estimated VaR can be refined incrementally.”</a:t>
+              <a:t>The interactive version of the Monte_Carlo_VaR_portfolio workflow allows the user to add more MC simulations to the current results, for a more accurate VaR. “The estimated VaR can be refined incrementally.”</a:t>
             </a:r>
             <a:endParaRPr b="0" i="0" sz="1800" u="none" cap="none" strike="noStrike">
               <a:solidFill>
@@ -23339,31 +23323,7 @@
                 <a:cs typeface="Helvetica Neue"/>
                 <a:sym typeface="Helvetica Neue"/>
               </a:rPr>
-              <a:t>Estimates the incremental VaR (iVaR) for each asset of the portfolio. iVaR quantifies the risk a position (or sub-portfolio) is adding to a portfolio. </a:t>
-            </a:r>
-            <a:r>
-              <a:rPr lang="en-US" sz="2000">
-                <a:solidFill>
-                  <a:schemeClr val="dk1"/>
-                </a:solidFill>
-                <a:latin typeface="Helvetica Neue"/>
-                <a:ea typeface="Helvetica Neue"/>
-                <a:cs typeface="Helvetica Neue"/>
-                <a:sym typeface="Helvetica Neue"/>
-              </a:rPr>
-              <a:t>T</a:t>
-            </a:r>
-            <a:r>
-              <a:rPr b="0" i="0" lang="en-US" sz="2000" u="none" cap="none" strike="noStrike">
-                <a:solidFill>
-                  <a:schemeClr val="dk1"/>
-                </a:solidFill>
-                <a:latin typeface="Helvetica Neue"/>
-                <a:ea typeface="Helvetica Neue"/>
-                <a:cs typeface="Helvetica Neue"/>
-                <a:sym typeface="Helvetica Neue"/>
-              </a:rPr>
-              <a:t>he iVaR related to an asset Y, is the difference between the portfolio VaR with and without Y.</a:t>
+              <a:t>Estimates the incremental VaR (iVaR) for each asset of the portfolio. iVaR quantifies the risk a position (or sub-portfolio) is adding to a portfolio. The iVaR related to an asset Y, is the difference between the portfolio VaR with and without Y.</a:t>
             </a:r>
             <a:endParaRPr b="0" i="0" sz="2000" u="none" cap="none" strike="noStrike">
               <a:solidFill>
@@ -23764,47 +23724,7 @@
                 <a:cs typeface="Arial"/>
                 <a:sym typeface="Arial"/>
               </a:rPr>
-              <a:t>(left branch) </a:t>
-            </a:r>
-            <a:r>
-              <a:rPr lang="en-US">
-                <a:solidFill>
-                  <a:schemeClr val="dk1"/>
-                </a:solidFill>
-              </a:rPr>
-              <a:t>This</a:t>
-            </a:r>
-            <a:r>
-              <a:rPr b="0" i="0" lang="en-US" sz="1400" u="none" cap="none" strike="noStrike">
-                <a:solidFill>
-                  <a:schemeClr val="dk1"/>
-                </a:solidFill>
-                <a:latin typeface="Arial"/>
-                <a:ea typeface="Arial"/>
-                <a:cs typeface="Arial"/>
-                <a:sym typeface="Arial"/>
-              </a:rPr>
-              <a:t> task submit</a:t>
-            </a:r>
-            <a:r>
-              <a:rPr lang="en-US">
-                <a:solidFill>
-                  <a:schemeClr val="dk1"/>
-                </a:solidFill>
-              </a:rPr>
-              <a:t>s the</a:t>
-            </a:r>
-            <a:r>
-              <a:rPr b="0" i="0" lang="en-US" sz="1400" u="none" cap="none" strike="noStrike">
-                <a:solidFill>
-                  <a:schemeClr val="dk1"/>
-                </a:solidFill>
-                <a:latin typeface="Arial"/>
-                <a:ea typeface="Arial"/>
-                <a:cs typeface="Arial"/>
-                <a:sym typeface="Arial"/>
-              </a:rPr>
-              <a:t> Monte_Carlo_VaR_portfolio wkw by considering all assets specified by the user</a:t>
+              <a:t>(left branch) This task submits the Monte_Carlo_VaR_portfolio wkw by considering all assets specified by the user</a:t>
             </a:r>
             <a:endParaRPr b="0" i="0" sz="1400" u="none" cap="none" strike="noStrike">
               <a:solidFill>
@@ -24087,23 +24007,7 @@
                 <a:cs typeface="Arial"/>
                 <a:sym typeface="Arial"/>
               </a:rPr>
-              <a:t>) with </a:t>
-            </a:r>
-            <a:r>
-              <a:rPr lang="en-US"/>
-              <a:t>an</a:t>
-            </a:r>
-            <a:r>
-              <a:rPr b="0" i="0" lang="en-US" sz="1400" u="none" cap="none" strike="noStrike">
-                <a:solidFill>
-                  <a:srgbClr val="000000"/>
-                </a:solidFill>
-                <a:latin typeface="Arial"/>
-                <a:ea typeface="Arial"/>
-                <a:cs typeface="Arial"/>
-                <a:sym typeface="Arial"/>
-              </a:rPr>
-              <a:t> instanciated asset params file as input.</a:t>
+              <a:t>) with an instanciated asset params file as input.</a:t>
             </a:r>
             <a:endParaRPr b="0" i="0" sz="1400" u="none" cap="none" strike="noStrike">
               <a:solidFill>

</xml_diff>

<commit_message>
Add wkw param control for stress testing wkws + update doc (#1240)
* Add wkw param control for stress testing wkws + update doc

* Add control on nb steps params in stress testing wkws
</commit_message>
<xml_diff>
--- a/Finance/resources/doc/risk-valuation-proactive.pptx
+++ b/Finance/resources/doc/risk-valuation-proactive.pptx
@@ -268,7 +268,7 @@
   </p:defaultTextStyle>
   <p:extLst>
     <p:ext uri="http://customooxmlschemas.google.com/">
-      <go:slidesCustomData xmlns:go="http://customooxmlschemas.google.com/" r:id="rId26" roundtripDataSignature="AMtx7miktY/zWApcvN7ITPhTkLkqclC16g=="/>
+      <go:slidesCustomData xmlns:go="http://customooxmlschemas.google.com/" r:id="rId26" roundtripDataSignature="AMtx7mgLcIYSHxTYJrq1XrARL9zF5UBS/Q=="/>
     </p:ext>
   </p:extLst>
 </p:presentation>
@@ -10406,31 +10406,7 @@
                 <a:cs typeface="Helvetica Neue"/>
                 <a:sym typeface="Helvetica Neue"/>
               </a:rPr>
-              <a:t>Estimates the portfolio PnLs (Profits and Losses) over stressed risk free rates and </a:t>
-            </a:r>
-            <a:r>
-              <a:rPr lang="en-US" sz="2400">
-                <a:solidFill>
-                  <a:schemeClr val="dk1"/>
-                </a:solidFill>
-                <a:latin typeface="Helvetica Neue"/>
-                <a:ea typeface="Helvetica Neue"/>
-                <a:cs typeface="Helvetica Neue"/>
-                <a:sym typeface="Helvetica Neue"/>
-              </a:rPr>
-              <a:t>volatilities</a:t>
-            </a:r>
-            <a:r>
-              <a:rPr b="0" i="0" lang="en-US" sz="2400" u="none" cap="none" strike="noStrike">
-                <a:solidFill>
-                  <a:schemeClr val="dk1"/>
-                </a:solidFill>
-                <a:latin typeface="Helvetica Neue"/>
-                <a:ea typeface="Helvetica Neue"/>
-                <a:cs typeface="Helvetica Neue"/>
-                <a:sym typeface="Helvetica Neue"/>
-              </a:rPr>
-              <a:t>.</a:t>
+              <a:t>Estimates the portfolio PnLs (Profits and Losses) over stressed risk free rates and volatilities.</a:t>
             </a:r>
             <a:endParaRPr b="0" i="0" sz="1400" u="none" cap="none" strike="noStrike">
               <a:solidFill>
@@ -10450,17 +10426,18 @@
           <p:cNvPicPr preferRelativeResize="0"/>
           <p:nvPr/>
         </p:nvPicPr>
-        <p:blipFill rotWithShape="1">
+        <p:blipFill>
           <a:blip r:embed="rId3">
             <a:alphaModFix/>
           </a:blip>
-          <a:srcRect b="0" l="0" r="0" t="0"/>
-          <a:stretch/>
+          <a:stretch>
+            <a:fillRect/>
+          </a:stretch>
         </p:blipFill>
         <p:spPr>
           <a:xfrm>
-            <a:off x="152400" y="3213242"/>
-            <a:ext cx="12852400" cy="4377758"/>
+            <a:off x="47625" y="3285892"/>
+            <a:ext cx="12909551" cy="5791008"/>
           </a:xfrm>
           <a:prstGeom prst="rect">
             <a:avLst/>
@@ -10596,6 +10573,10 @@
               <a:buNone/>
             </a:pPr>
             <a:r>
+              <a:rPr lang="en-US" sz="1800"/>
+              <a:t>Generates all the combinations &lt;stressed risk free rate, stressed volatility&gt; according to their min,max,step user parameters. </a:t>
+            </a:r>
+            <a:r>
               <a:rPr b="0" i="0" lang="en-US" sz="1800" u="none" cap="none" strike="noStrike">
                 <a:solidFill>
                   <a:srgbClr val="000000"/>
@@ -10605,7 +10586,27 @@
                 <a:cs typeface="Arial"/>
                 <a:sym typeface="Arial"/>
               </a:rPr>
-              <a:t>Estimates the number of MC simulations per replicated task. The number of replicated tasks must divide the total number of simulations</a:t>
+              <a:t>The number of replicated tasks must divide the number of </a:t>
+            </a:r>
+            <a:r>
+              <a:rPr lang="en-US" sz="1800"/>
+              <a:t>combinations, i.e. the number of </a:t>
+            </a:r>
+            <a:r>
+              <a:rPr lang="en-US" sz="1800"/>
+              <a:t>scenarios</a:t>
+            </a:r>
+            <a:r>
+              <a:rPr b="0" i="0" lang="en-US" sz="1800" u="none" cap="none" strike="noStrike">
+                <a:solidFill>
+                  <a:srgbClr val="000000"/>
+                </a:solidFill>
+                <a:latin typeface="Arial"/>
+                <a:ea typeface="Arial"/>
+                <a:cs typeface="Arial"/>
+                <a:sym typeface="Arial"/>
+              </a:rPr>
+              <a:t> </a:t>
             </a:r>
             <a:endParaRPr b="0" i="0" sz="1800" u="none" cap="none" strike="noStrike">
               <a:solidFill>
@@ -10729,6 +10730,10 @@
               <a:buNone/>
             </a:pPr>
             <a:r>
+              <a:rPr lang="en-US" sz="1800"/>
+              <a:t>E</a:t>
+            </a:r>
+            <a:r>
               <a:rPr b="0" i="0" lang="en-US" sz="1800" u="none" cap="none" strike="noStrike">
                 <a:solidFill>
                   <a:srgbClr val="000000"/>
@@ -10738,11 +10743,11 @@
                 <a:cs typeface="Arial"/>
                 <a:sym typeface="Arial"/>
               </a:rPr>
-              <a:t>Using Quanlib, each replicated task processes a subset of the MC simulations and deduces the PnL (profit and loss) of each simulated path. An expected PnL is estimated per risk free rate and volatility stressed percentage. Each task </a:t>
+              <a:t>ach replicated task processes a subset of the </a:t>
             </a:r>
             <a:r>
               <a:rPr lang="en-US" sz="1800"/>
-              <a:t>writes the estimated </a:t>
+              <a:t>scenarios</a:t>
             </a:r>
             <a:r>
               <a:rPr b="0" i="0" lang="en-US" sz="1800" u="none" cap="none" strike="noStrike">
@@ -10754,7 +10759,115 @@
                 <a:cs typeface="Arial"/>
                 <a:sym typeface="Arial"/>
               </a:rPr>
-              <a:t>PnLs into a dedicated file</a:t>
+              <a:t> and estimates</a:t>
+            </a:r>
+            <a:r>
+              <a:rPr lang="en-US" sz="1800"/>
+              <a:t> per </a:t>
+            </a:r>
+            <a:r>
+              <a:rPr lang="en-US" sz="1800"/>
+              <a:t>scenario, the mean/expected portfolio Profit and Loss (P&amp;L) over the given number of</a:t>
+            </a:r>
+            <a:r>
+              <a:rPr lang="en-US" sz="1800"/>
+              <a:t> </a:t>
+            </a:r>
+            <a:r>
+              <a:rPr b="0" i="0" lang="en-US" sz="1800" u="none" cap="none" strike="noStrike">
+                <a:solidFill>
+                  <a:srgbClr val="000000"/>
+                </a:solidFill>
+                <a:latin typeface="Arial"/>
+                <a:ea typeface="Arial"/>
+                <a:cs typeface="Arial"/>
+                <a:sym typeface="Arial"/>
+              </a:rPr>
+              <a:t>MC simulations. These </a:t>
+            </a:r>
+            <a:r>
+              <a:rPr lang="en-US" sz="1800"/>
+              <a:t>simulations</a:t>
+            </a:r>
+            <a:r>
+              <a:rPr b="0" i="0" lang="en-US" sz="1800" u="none" cap="none" strike="noStrike">
+                <a:solidFill>
+                  <a:srgbClr val="000000"/>
+                </a:solidFill>
+                <a:latin typeface="Arial"/>
+                <a:ea typeface="Arial"/>
+                <a:cs typeface="Arial"/>
+                <a:sym typeface="Arial"/>
+              </a:rPr>
+              <a:t> are proc</a:t>
+            </a:r>
+            <a:r>
+              <a:rPr lang="en-US" sz="1800"/>
+              <a:t>essed in C++/Quantlib.</a:t>
+            </a:r>
+            <a:r>
+              <a:rPr b="0" i="0" lang="en-US" sz="1800" u="none" cap="none" strike="noStrike">
+                <a:solidFill>
+                  <a:srgbClr val="000000"/>
+                </a:solidFill>
+                <a:latin typeface="Arial"/>
+                <a:ea typeface="Arial"/>
+                <a:cs typeface="Arial"/>
+                <a:sym typeface="Arial"/>
+              </a:rPr>
+              <a:t> Each task writes </a:t>
+            </a:r>
+            <a:r>
+              <a:rPr lang="en-US" sz="1800">
+                <a:solidFill>
+                  <a:schemeClr val="dk1"/>
+                </a:solidFill>
+              </a:rPr>
+              <a:t>into a dedicated file </a:t>
+            </a:r>
+            <a:r>
+              <a:rPr b="0" i="0" lang="en-US" sz="1800" u="none" cap="none" strike="noStrike">
+                <a:solidFill>
+                  <a:srgbClr val="000000"/>
+                </a:solidFill>
+                <a:latin typeface="Arial"/>
+                <a:ea typeface="Arial"/>
+                <a:cs typeface="Arial"/>
+                <a:sym typeface="Arial"/>
+              </a:rPr>
+              <a:t>all its estimated P</a:t>
+            </a:r>
+            <a:r>
+              <a:rPr lang="en-US" sz="1800"/>
+              <a:t>&amp;</a:t>
+            </a:r>
+            <a:r>
+              <a:rPr b="0" i="0" lang="en-US" sz="1800" u="none" cap="none" strike="noStrike">
+                <a:solidFill>
+                  <a:srgbClr val="000000"/>
+                </a:solidFill>
+                <a:latin typeface="Arial"/>
+                <a:ea typeface="Arial"/>
+                <a:cs typeface="Arial"/>
+                <a:sym typeface="Arial"/>
+              </a:rPr>
+              <a:t>Ls</a:t>
+            </a:r>
+            <a:r>
+              <a:rPr lang="en-US" sz="1800"/>
+              <a:t> (</a:t>
+            </a:r>
+            <a:r>
+              <a:rPr b="0" i="0" lang="en-US" sz="1800" u="none" cap="none" strike="noStrike">
+                <a:solidFill>
+                  <a:srgbClr val="000000"/>
+                </a:solidFill>
+                <a:latin typeface="Arial"/>
+                <a:ea typeface="Arial"/>
+                <a:cs typeface="Arial"/>
+                <a:sym typeface="Arial"/>
+              </a:rPr>
+              <a:t>a P&amp;L per senario) </a:t>
             </a:r>
             <a:endParaRPr b="0" i="0" sz="1800" u="none" cap="none" strike="noStrike">
               <a:solidFill>
@@ -10829,38 +10942,7 @@
             </a:endParaRPr>
           </a:p>
           <a:p>
-            <a:pPr indent="0" lvl="0" marL="0" marR="0" rtl="0" algn="r">
-              <a:lnSpc>
-                <a:spcPct val="100000"/>
-              </a:lnSpc>
-              <a:spcBef>
-                <a:spcPts val="0"/>
-              </a:spcBef>
-              <a:spcAft>
-                <a:spcPts val="0"/>
-              </a:spcAft>
-              <a:buClr>
-                <a:srgbClr val="000000"/>
-              </a:buClr>
-              <a:buSzPts val="1800"/>
-              <a:buFont typeface="Arial"/>
-              <a:buNone/>
-            </a:pPr>
-            <a:r>
-              <a:t/>
-            </a:r>
-            <a:endParaRPr b="0" i="0" sz="1800" u="none" cap="none" strike="noStrike">
-              <a:solidFill>
-                <a:srgbClr val="000000"/>
-              </a:solidFill>
-              <a:latin typeface="Arial"/>
-              <a:ea typeface="Arial"/>
-              <a:cs typeface="Arial"/>
-              <a:sym typeface="Arial"/>
-            </a:endParaRPr>
-          </a:p>
-          <a:p>
-            <a:pPr indent="0" lvl="0" marL="0" marR="0" rtl="0" algn="r">
+            <a:pPr indent="0" lvl="0" marL="0" marR="0" rtl="0" algn="l">
               <a:lnSpc>
                 <a:spcPct val="100000"/>
               </a:lnSpc>
@@ -11661,39 +11743,7 @@
                 <a:cs typeface="Arial"/>
                 <a:sym typeface="Arial"/>
               </a:rPr>
-              <a:t>The interactive version of the Stress_Testing_Monte_Carlo_Value_Portfolio</a:t>
-            </a:r>
-            <a:r>
-              <a:rPr lang="en-US" sz="1800"/>
-              <a:t> </a:t>
-            </a:r>
-            <a:r>
-              <a:rPr b="0" i="0" lang="en-US" sz="1800" u="none" cap="none" strike="noStrike">
-                <a:solidFill>
-                  <a:srgbClr val="000000"/>
-                </a:solidFill>
-                <a:latin typeface="Arial"/>
-                <a:ea typeface="Arial"/>
-                <a:cs typeface="Arial"/>
-                <a:sym typeface="Arial"/>
-              </a:rPr>
-              <a:t>workflow allows the user to add more MC simulations to each estimated </a:t>
-            </a:r>
-            <a:r>
-              <a:rPr lang="en-US" sz="1800"/>
-              <a:t>stressed portfolio P&amp;L</a:t>
-            </a:r>
-            <a:r>
-              <a:rPr b="0" i="0" lang="en-US" sz="1800" u="none" cap="none" strike="noStrike">
-                <a:solidFill>
-                  <a:srgbClr val="000000"/>
-                </a:solidFill>
-                <a:latin typeface="Arial"/>
-                <a:ea typeface="Arial"/>
-                <a:cs typeface="Arial"/>
-                <a:sym typeface="Arial"/>
-              </a:rPr>
-              <a:t>.</a:t>
+              <a:t>The interactive version of the Stress_Testing_Monte_Carlo_Value_Portfolio workflow allows the user to add more MC simulations to each estimated stressed portfolio P&amp;L.</a:t>
             </a:r>
             <a:endParaRPr b="0" i="0" sz="1800" u="none" cap="none" strike="noStrike">
               <a:solidFill>
@@ -11713,13 +11763,12 @@
           <p:cNvPicPr preferRelativeResize="0"/>
           <p:nvPr/>
         </p:nvPicPr>
-        <p:blipFill>
+        <p:blipFill rotWithShape="1">
           <a:blip r:embed="rId3">
             <a:alphaModFix/>
           </a:blip>
-          <a:stretch>
-            <a:fillRect/>
-          </a:stretch>
+          <a:srcRect b="0" l="0" r="0" t="0"/>
+          <a:stretch/>
         </p:blipFill>
         <p:spPr>
           <a:xfrm>
@@ -11741,13 +11790,12 @@
           <p:cNvPicPr preferRelativeResize="0"/>
           <p:nvPr/>
         </p:nvPicPr>
-        <p:blipFill>
+        <p:blipFill rotWithShape="1">
           <a:blip r:embed="rId4">
             <a:alphaModFix/>
           </a:blip>
-          <a:stretch>
-            <a:fillRect/>
-          </a:stretch>
+          <a:srcRect b="0" l="0" r="0" t="0"/>
+          <a:stretch/>
         </p:blipFill>
         <p:spPr>
           <a:xfrm>
@@ -11819,7 +11867,7 @@
           <a:effectLst>
             <a:outerShdw blurRad="57150" rotWithShape="0" algn="bl" dir="5400000" dist="19050">
               <a:srgbClr val="000000">
-                <a:alpha val="48235"/>
+                <a:alpha val="47843"/>
               </a:srgbClr>
             </a:outerShdw>
           </a:effectLst>
@@ -11893,7 +11941,7 @@
           <a:effectLst>
             <a:outerShdw blurRad="57150" rotWithShape="0" algn="bl" dir="5400000" dist="19050">
               <a:srgbClr val="000000">
-                <a:alpha val="48235"/>
+                <a:alpha val="47843"/>
               </a:srgbClr>
             </a:outerShdw>
           </a:effectLst>
@@ -11967,7 +12015,7 @@
           <a:effectLst>
             <a:outerShdw blurRad="57150" rotWithShape="0" algn="bl" dir="5400000" dist="19050">
               <a:srgbClr val="000000">
-                <a:alpha val="48235"/>
+                <a:alpha val="47843"/>
               </a:srgbClr>
             </a:outerShdw>
           </a:effectLst>
@@ -12041,7 +12089,7 @@
           <a:effectLst>
             <a:outerShdw blurRad="57150" rotWithShape="0" algn="bl" dir="5400000" dist="19050">
               <a:srgbClr val="000000">
-                <a:alpha val="48235"/>
+                <a:alpha val="47843"/>
               </a:srgbClr>
             </a:outerShdw>
           </a:effectLst>
@@ -12115,7 +12163,7 @@
           <a:effectLst>
             <a:outerShdw blurRad="57150" rotWithShape="0" algn="bl" dir="5400000" dist="19050">
               <a:srgbClr val="000000">
-                <a:alpha val="48235"/>
+                <a:alpha val="47843"/>
               </a:srgbClr>
             </a:outerShdw>
           </a:effectLst>
@@ -12189,7 +12237,7 @@
           <a:effectLst>
             <a:outerShdw blurRad="57150" rotWithShape="0" algn="bl" dir="5400000" dist="19050">
               <a:srgbClr val="000000">
-                <a:alpha val="48235"/>
+                <a:alpha val="47843"/>
               </a:srgbClr>
             </a:outerShdw>
           </a:effectLst>
@@ -12263,7 +12311,7 @@
           <a:effectLst>
             <a:outerShdw blurRad="57150" rotWithShape="0" algn="bl" dir="5400000" dist="19050">
               <a:srgbClr val="000000">
-                <a:alpha val="48235"/>
+                <a:alpha val="47843"/>
               </a:srgbClr>
             </a:outerShdw>
           </a:effectLst>
@@ -12337,7 +12385,7 @@
           <a:effectLst>
             <a:outerShdw blurRad="57150" rotWithShape="0" algn="bl" dir="5400000" dist="19050">
               <a:srgbClr val="000000">
-                <a:alpha val="48235"/>
+                <a:alpha val="47843"/>
               </a:srgbClr>
             </a:outerShdw>
           </a:effectLst>
@@ -12411,7 +12459,7 @@
           <a:effectLst>
             <a:outerShdw blurRad="57150" rotWithShape="0" algn="bl" dir="5400000" dist="19050">
               <a:srgbClr val="000000">
-                <a:alpha val="48235"/>
+                <a:alpha val="47843"/>
               </a:srgbClr>
             </a:outerShdw>
           </a:effectLst>
@@ -12485,7 +12533,7 @@
           <a:effectLst>
             <a:outerShdw blurRad="57150" rotWithShape="0" algn="bl" dir="5400000" dist="19050">
               <a:srgbClr val="000000">
-                <a:alpha val="48235"/>
+                <a:alpha val="47843"/>
               </a:srgbClr>
             </a:outerShdw>
           </a:effectLst>
@@ -12559,7 +12607,7 @@
           <a:effectLst>
             <a:outerShdw blurRad="57150" rotWithShape="0" algn="bl" dir="5400000" dist="19050">
               <a:srgbClr val="000000">
-                <a:alpha val="48235"/>
+                <a:alpha val="47843"/>
               </a:srgbClr>
             </a:outerShdw>
           </a:effectLst>
@@ -12633,7 +12681,7 @@
           <a:effectLst>
             <a:outerShdw blurRad="57150" rotWithShape="0" algn="bl" dir="5400000" dist="19050">
               <a:srgbClr val="000000">
-                <a:alpha val="48235"/>
+                <a:alpha val="47843"/>
               </a:srgbClr>
             </a:outerShdw>
           </a:effectLst>
@@ -12707,7 +12755,7 @@
           <a:effectLst>
             <a:outerShdw blurRad="57150" rotWithShape="0" algn="bl" dir="5400000" dist="19050">
               <a:srgbClr val="000000">
-                <a:alpha val="48235"/>
+                <a:alpha val="47843"/>
               </a:srgbClr>
             </a:outerShdw>
           </a:effectLst>
@@ -12781,7 +12829,7 @@
           <a:effectLst>
             <a:outerShdw blurRad="57150" rotWithShape="0" algn="bl" dir="5400000" dist="19050">
               <a:srgbClr val="000000">
-                <a:alpha val="48235"/>
+                <a:alpha val="47843"/>
               </a:srgbClr>
             </a:outerShdw>
           </a:effectLst>
@@ -12855,7 +12903,7 @@
           <a:effectLst>
             <a:outerShdw blurRad="57150" rotWithShape="0" algn="bl" dir="5400000" dist="19050">
               <a:srgbClr val="000000">
-                <a:alpha val="48235"/>
+                <a:alpha val="47843"/>
               </a:srgbClr>
             </a:outerShdw>
           </a:effectLst>
@@ -12929,7 +12977,7 @@
           <a:effectLst>
             <a:outerShdw blurRad="57150" rotWithShape="0" algn="bl" dir="5400000" dist="19050">
               <a:srgbClr val="000000">
-                <a:alpha val="48235"/>
+                <a:alpha val="47843"/>
               </a:srgbClr>
             </a:outerShdw>
           </a:effectLst>
@@ -13003,7 +13051,7 @@
           <a:effectLst>
             <a:outerShdw blurRad="57150" rotWithShape="0" algn="bl" dir="5400000" dist="19050">
               <a:srgbClr val="000000">
-                <a:alpha val="48235"/>
+                <a:alpha val="47843"/>
               </a:srgbClr>
             </a:outerShdw>
           </a:effectLst>
@@ -13077,7 +13125,7 @@
           <a:effectLst>
             <a:outerShdw blurRad="57150" rotWithShape="0" algn="bl" dir="5400000" dist="19050">
               <a:srgbClr val="000000">
-                <a:alpha val="48235"/>
+                <a:alpha val="47843"/>
               </a:srgbClr>
             </a:outerShdw>
           </a:effectLst>
@@ -13151,7 +13199,7 @@
           <a:effectLst>
             <a:outerShdw blurRad="57150" rotWithShape="0" algn="bl" dir="5400000" dist="19050">
               <a:srgbClr val="000000">
-                <a:alpha val="48235"/>
+                <a:alpha val="47843"/>
               </a:srgbClr>
             </a:outerShdw>
           </a:effectLst>
@@ -13225,7 +13273,7 @@
           <a:effectLst>
             <a:outerShdw blurRad="57150" rotWithShape="0" algn="bl" dir="5400000" dist="19050">
               <a:srgbClr val="000000">
-                <a:alpha val="48235"/>
+                <a:alpha val="47843"/>
               </a:srgbClr>
             </a:outerShdw>
           </a:effectLst>
@@ -13299,7 +13347,7 @@
           <a:effectLst>
             <a:outerShdw blurRad="57150" rotWithShape="0" algn="bl" dir="5400000" dist="19050">
               <a:srgbClr val="000000">
-                <a:alpha val="48235"/>
+                <a:alpha val="47843"/>
               </a:srgbClr>
             </a:outerShdw>
           </a:effectLst>
@@ -13373,7 +13421,7 @@
           <a:effectLst>
             <a:outerShdw blurRad="57150" rotWithShape="0" algn="bl" dir="5400000" dist="19050">
               <a:srgbClr val="000000">
-                <a:alpha val="48235"/>
+                <a:alpha val="47843"/>
               </a:srgbClr>
             </a:outerShdw>
           </a:effectLst>
@@ -13447,7 +13495,7 @@
           <a:effectLst>
             <a:outerShdw blurRad="57150" rotWithShape="0" algn="bl" dir="5400000" dist="19050">
               <a:srgbClr val="000000">
-                <a:alpha val="48235"/>
+                <a:alpha val="47843"/>
               </a:srgbClr>
             </a:outerShdw>
           </a:effectLst>
@@ -13521,7 +13569,7 @@
           <a:effectLst>
             <a:outerShdw blurRad="57150" rotWithShape="0" algn="bl" dir="5400000" dist="19050">
               <a:srgbClr val="000000">
-                <a:alpha val="48235"/>
+                <a:alpha val="47843"/>
               </a:srgbClr>
             </a:outerShdw>
           </a:effectLst>
@@ -13595,7 +13643,7 @@
           <a:effectLst>
             <a:outerShdw blurRad="57150" rotWithShape="0" algn="bl" dir="5400000" dist="19050">
               <a:srgbClr val="000000">
-                <a:alpha val="48235"/>
+                <a:alpha val="47843"/>
               </a:srgbClr>
             </a:outerShdw>
           </a:effectLst>
@@ -13669,7 +13717,7 @@
           <a:effectLst>
             <a:outerShdw blurRad="57150" rotWithShape="0" algn="bl" dir="5400000" dist="19050">
               <a:srgbClr val="000000">
-                <a:alpha val="48235"/>
+                <a:alpha val="47843"/>
               </a:srgbClr>
             </a:outerShdw>
           </a:effectLst>
@@ -13743,7 +13791,7 @@
           <a:effectLst>
             <a:outerShdw blurRad="57150" rotWithShape="0" algn="bl" dir="5400000" dist="19050">
               <a:srgbClr val="000000">
-                <a:alpha val="48235"/>
+                <a:alpha val="47843"/>
               </a:srgbClr>
             </a:outerShdw>
           </a:effectLst>
@@ -13817,7 +13865,7 @@
           <a:effectLst>
             <a:outerShdw blurRad="57150" rotWithShape="0" algn="bl" dir="5400000" dist="19050">
               <a:srgbClr val="000000">
-                <a:alpha val="48235"/>
+                <a:alpha val="47843"/>
               </a:srgbClr>
             </a:outerShdw>
           </a:effectLst>
@@ -13891,7 +13939,7 @@
           <a:effectLst>
             <a:outerShdw blurRad="57150" rotWithShape="0" algn="bl" dir="5400000" dist="19050">
               <a:srgbClr val="000000">
-                <a:alpha val="48235"/>
+                <a:alpha val="47843"/>
               </a:srgbClr>
             </a:outerShdw>
           </a:effectLst>
@@ -13965,7 +14013,7 @@
           <a:effectLst>
             <a:outerShdw blurRad="57150" rotWithShape="0" algn="bl" dir="5400000" dist="19050">
               <a:srgbClr val="000000">
-                <a:alpha val="48235"/>
+                <a:alpha val="47843"/>
               </a:srgbClr>
             </a:outerShdw>
           </a:effectLst>
@@ -14039,7 +14087,7 @@
           <a:effectLst>
             <a:outerShdw blurRad="57150" rotWithShape="0" algn="bl" dir="5400000" dist="19050">
               <a:srgbClr val="000000">
-                <a:alpha val="48235"/>
+                <a:alpha val="47843"/>
               </a:srgbClr>
             </a:outerShdw>
           </a:effectLst>
@@ -14113,7 +14161,7 @@
           <a:effectLst>
             <a:outerShdw blurRad="57150" rotWithShape="0" algn="bl" dir="5400000" dist="19050">
               <a:srgbClr val="000000">
-                <a:alpha val="48235"/>
+                <a:alpha val="47843"/>
               </a:srgbClr>
             </a:outerShdw>
           </a:effectLst>
@@ -14187,7 +14235,7 @@
           <a:effectLst>
             <a:outerShdw blurRad="57150" rotWithShape="0" algn="bl" dir="5400000" dist="19050">
               <a:srgbClr val="000000">
-                <a:alpha val="48235"/>
+                <a:alpha val="47843"/>
               </a:srgbClr>
             </a:outerShdw>
           </a:effectLst>
@@ -14261,7 +14309,7 @@
           <a:effectLst>
             <a:outerShdw blurRad="57150" rotWithShape="0" algn="bl" dir="5400000" dist="19050">
               <a:srgbClr val="000000">
-                <a:alpha val="48235"/>
+                <a:alpha val="47843"/>
               </a:srgbClr>
             </a:outerShdw>
           </a:effectLst>
@@ -14335,7 +14383,7 @@
           <a:effectLst>
             <a:outerShdw blurRad="57150" rotWithShape="0" algn="bl" dir="5400000" dist="19050">
               <a:srgbClr val="000000">
-                <a:alpha val="48235"/>
+                <a:alpha val="47843"/>
               </a:srgbClr>
             </a:outerShdw>
           </a:effectLst>
@@ -14409,7 +14457,7 @@
           <a:effectLst>
             <a:outerShdw blurRad="57150" rotWithShape="0" algn="bl" dir="5400000" dist="19050">
               <a:srgbClr val="000000">
-                <a:alpha val="48235"/>
+                <a:alpha val="47843"/>
               </a:srgbClr>
             </a:outerShdw>
           </a:effectLst>
@@ -14483,7 +14531,7 @@
           <a:effectLst>
             <a:outerShdw blurRad="57150" rotWithShape="0" algn="bl" dir="5400000" dist="19050">
               <a:srgbClr val="000000">
-                <a:alpha val="48235"/>
+                <a:alpha val="47843"/>
               </a:srgbClr>
             </a:outerShdw>
           </a:effectLst>
@@ -14557,7 +14605,7 @@
           <a:effectLst>
             <a:outerShdw blurRad="57150" rotWithShape="0" algn="bl" dir="5400000" dist="19050">
               <a:srgbClr val="000000">
-                <a:alpha val="48235"/>
+                <a:alpha val="47843"/>
               </a:srgbClr>
             </a:outerShdw>
           </a:effectLst>
@@ -14631,7 +14679,7 @@
           <a:effectLst>
             <a:outerShdw blurRad="57150" rotWithShape="0" algn="bl" dir="5400000" dist="19050">
               <a:srgbClr val="000000">
-                <a:alpha val="48235"/>
+                <a:alpha val="47843"/>
               </a:srgbClr>
             </a:outerShdw>
           </a:effectLst>
@@ -14705,7 +14753,7 @@
           <a:effectLst>
             <a:outerShdw blurRad="57150" rotWithShape="0" algn="bl" dir="5400000" dist="19050">
               <a:srgbClr val="000000">
-                <a:alpha val="48235"/>
+                <a:alpha val="47843"/>
               </a:srgbClr>
             </a:outerShdw>
           </a:effectLst>
@@ -14779,7 +14827,7 @@
           <a:effectLst>
             <a:outerShdw blurRad="57150" rotWithShape="0" algn="bl" dir="5400000" dist="19050">
               <a:srgbClr val="000000">
-                <a:alpha val="48235"/>
+                <a:alpha val="47843"/>
               </a:srgbClr>
             </a:outerShdw>
           </a:effectLst>
@@ -14853,7 +14901,7 @@
           <a:effectLst>
             <a:outerShdw blurRad="57150" rotWithShape="0" algn="bl" dir="5400000" dist="19050">
               <a:srgbClr val="000000">
-                <a:alpha val="48235"/>
+                <a:alpha val="47843"/>
               </a:srgbClr>
             </a:outerShdw>
           </a:effectLst>
@@ -14927,7 +14975,7 @@
           <a:effectLst>
             <a:outerShdw blurRad="57150" rotWithShape="0" algn="bl" dir="5400000" dist="19050">
               <a:srgbClr val="000000">
-                <a:alpha val="48235"/>
+                <a:alpha val="47843"/>
               </a:srgbClr>
             </a:outerShdw>
           </a:effectLst>
@@ -15001,7 +15049,7 @@
           <a:effectLst>
             <a:outerShdw blurRad="57150" rotWithShape="0" algn="bl" dir="5400000" dist="19050">
               <a:srgbClr val="000000">
-                <a:alpha val="48235"/>
+                <a:alpha val="47843"/>
               </a:srgbClr>
             </a:outerShdw>
           </a:effectLst>
@@ -15156,31 +15204,7 @@
                 <a:cs typeface="Helvetica Neue"/>
                 <a:sym typeface="Helvetica Neue"/>
               </a:rPr>
-              <a:t>Estimates a Mark-to-Future (MtF) cube of a bond portfolio. Each cell of the cube </a:t>
-            </a:r>
-            <a:r>
-              <a:rPr lang="en-US" sz="2000">
-                <a:solidFill>
-                  <a:schemeClr val="dk1"/>
-                </a:solidFill>
-                <a:latin typeface="Helvetica Neue"/>
-                <a:ea typeface="Helvetica Neue"/>
-                <a:cs typeface="Helvetica Neue"/>
-                <a:sym typeface="Helvetica Neue"/>
-              </a:rPr>
-              <a:t>estimates</a:t>
-            </a:r>
-            <a:r>
-              <a:rPr b="0" i="0" lang="en-US" sz="2000" u="none" cap="none" strike="noStrike">
-                <a:solidFill>
-                  <a:schemeClr val="dk1"/>
-                </a:solidFill>
-                <a:latin typeface="Helvetica Neue"/>
-                <a:ea typeface="Helvetica Neue"/>
-                <a:cs typeface="Helvetica Neue"/>
-                <a:sym typeface="Helvetica Neue"/>
-              </a:rPr>
-              <a:t> the valuation of a bond at a specific time given a specific scenario. This can be easily extended to more exotic instruments thanks to the high maintenability of the implementation (C++ Quantlib for the pricing engine, inputs split in Java/Groovy, R for the cube/cubelet stats,..).</a:t>
+              <a:t>Estimates a Mark-to-Future (MtF) cube of a bond portfolio. Each cell of the cube estimates the valuation of a bond at a specific time given a specific scenario. This can be easily extended to more exotic instruments thanks to the high maintenability of the implementation (C++ Quantlib for the pricing engine, inputs split in Java/Groovy, R for the cube/cubelet stats,..).</a:t>
             </a:r>
             <a:endParaRPr b="0" i="0" sz="2000" u="none" cap="none" strike="noStrike">
               <a:solidFill>
@@ -15555,7 +15579,7 @@
           <a:effectLst>
             <a:outerShdw blurRad="57150" rotWithShape="0" algn="bl" dir="5400000" dist="19050">
               <a:srgbClr val="000000">
-                <a:alpha val="48235"/>
+                <a:alpha val="47843"/>
               </a:srgbClr>
             </a:outerShdw>
           </a:effectLst>
@@ -15629,7 +15653,7 @@
           <a:effectLst>
             <a:outerShdw blurRad="57150" rotWithShape="0" algn="bl" dir="5400000" dist="19050">
               <a:srgbClr val="000000">
-                <a:alpha val="48235"/>
+                <a:alpha val="47843"/>
               </a:srgbClr>
             </a:outerShdw>
           </a:effectLst>
@@ -15703,7 +15727,7 @@
           <a:effectLst>
             <a:outerShdw blurRad="57150" rotWithShape="0" algn="bl" dir="5400000" dist="19050">
               <a:srgbClr val="000000">
-                <a:alpha val="48235"/>
+                <a:alpha val="47843"/>
               </a:srgbClr>
             </a:outerShdw>
           </a:effectLst>
@@ -15777,7 +15801,7 @@
           <a:effectLst>
             <a:outerShdw blurRad="57150" rotWithShape="0" algn="bl" dir="5400000" dist="19050">
               <a:srgbClr val="000000">
-                <a:alpha val="48235"/>
+                <a:alpha val="47843"/>
               </a:srgbClr>
             </a:outerShdw>
           </a:effectLst>
@@ -15851,7 +15875,7 @@
           <a:effectLst>
             <a:outerShdw blurRad="57150" rotWithShape="0" algn="bl" dir="5400000" dist="19050">
               <a:srgbClr val="000000">
-                <a:alpha val="48235"/>
+                <a:alpha val="47843"/>
               </a:srgbClr>
             </a:outerShdw>
           </a:effectLst>
@@ -15925,7 +15949,7 @@
           <a:effectLst>
             <a:outerShdw blurRad="57150" rotWithShape="0" algn="bl" dir="5400000" dist="19050">
               <a:srgbClr val="000000">
-                <a:alpha val="48235"/>
+                <a:alpha val="47843"/>
               </a:srgbClr>
             </a:outerShdw>
           </a:effectLst>
@@ -15999,7 +16023,7 @@
           <a:effectLst>
             <a:outerShdw blurRad="57150" rotWithShape="0" algn="bl" dir="5400000" dist="19050">
               <a:srgbClr val="000000">
-                <a:alpha val="48235"/>
+                <a:alpha val="47843"/>
               </a:srgbClr>
             </a:outerShdw>
           </a:effectLst>
@@ -16073,7 +16097,7 @@
           <a:effectLst>
             <a:outerShdw blurRad="57150" rotWithShape="0" algn="bl" dir="5400000" dist="19050">
               <a:srgbClr val="000000">
-                <a:alpha val="48235"/>
+                <a:alpha val="47843"/>
               </a:srgbClr>
             </a:outerShdw>
           </a:effectLst>
@@ -16147,7 +16171,7 @@
           <a:effectLst>
             <a:outerShdw blurRad="57150" rotWithShape="0" algn="bl" dir="5400000" dist="19050">
               <a:srgbClr val="000000">
-                <a:alpha val="48235"/>
+                <a:alpha val="47843"/>
               </a:srgbClr>
             </a:outerShdw>
           </a:effectLst>
@@ -16313,7 +16337,7 @@
           <a:effectLst>
             <a:outerShdw blurRad="57150" rotWithShape="0" algn="bl" dir="5400000" dist="19050">
               <a:srgbClr val="000000">
-                <a:alpha val="48235"/>
+                <a:alpha val="47843"/>
               </a:srgbClr>
             </a:outerShdw>
           </a:effectLst>
@@ -16387,7 +16411,7 @@
           <a:effectLst>
             <a:outerShdw blurRad="57150" rotWithShape="0" algn="bl" dir="5400000" dist="19050">
               <a:srgbClr val="000000">
-                <a:alpha val="48235"/>
+                <a:alpha val="47843"/>
               </a:srgbClr>
             </a:outerShdw>
           </a:effectLst>
@@ -16461,7 +16485,7 @@
           <a:effectLst>
             <a:outerShdw blurRad="57150" rotWithShape="0" algn="bl" dir="5400000" dist="19050">
               <a:srgbClr val="000000">
-                <a:alpha val="48235"/>
+                <a:alpha val="47843"/>
               </a:srgbClr>
             </a:outerShdw>
           </a:effectLst>
@@ -16535,7 +16559,7 @@
           <a:effectLst>
             <a:outerShdw blurRad="57150" rotWithShape="0" algn="bl" dir="5400000" dist="19050">
               <a:srgbClr val="000000">
-                <a:alpha val="48235"/>
+                <a:alpha val="47843"/>
               </a:srgbClr>
             </a:outerShdw>
           </a:effectLst>
@@ -16609,7 +16633,7 @@
           <a:effectLst>
             <a:outerShdw blurRad="57150" rotWithShape="0" algn="bl" dir="5400000" dist="19050">
               <a:srgbClr val="000000">
-                <a:alpha val="48235"/>
+                <a:alpha val="47843"/>
               </a:srgbClr>
             </a:outerShdw>
           </a:effectLst>
@@ -16683,7 +16707,7 @@
           <a:effectLst>
             <a:outerShdw blurRad="57150" rotWithShape="0" algn="bl" dir="5400000" dist="19050">
               <a:srgbClr val="000000">
-                <a:alpha val="48235"/>
+                <a:alpha val="47843"/>
               </a:srgbClr>
             </a:outerShdw>
           </a:effectLst>
@@ -16757,7 +16781,7 @@
           <a:effectLst>
             <a:outerShdw blurRad="57150" rotWithShape="0" algn="bl" dir="5400000" dist="19050">
               <a:srgbClr val="000000">
-                <a:alpha val="48235"/>
+                <a:alpha val="47843"/>
               </a:srgbClr>
             </a:outerShdw>
           </a:effectLst>
@@ -16831,7 +16855,7 @@
           <a:effectLst>
             <a:outerShdw blurRad="57150" rotWithShape="0" algn="bl" dir="5400000" dist="19050">
               <a:srgbClr val="000000">
-                <a:alpha val="48235"/>
+                <a:alpha val="47843"/>
               </a:srgbClr>
             </a:outerShdw>
           </a:effectLst>
@@ -16905,7 +16929,7 @@
           <a:effectLst>
             <a:outerShdw blurRad="57150" rotWithShape="0" algn="bl" dir="5400000" dist="19050">
               <a:srgbClr val="000000">
-                <a:alpha val="48235"/>
+                <a:alpha val="47843"/>
               </a:srgbClr>
             </a:outerShdw>
           </a:effectLst>
@@ -16979,7 +17003,7 @@
           <a:effectLst>
             <a:outerShdw blurRad="57150" rotWithShape="0" algn="bl" dir="5400000" dist="19050">
               <a:srgbClr val="000000">
-                <a:alpha val="48235"/>
+                <a:alpha val="47843"/>
               </a:srgbClr>
             </a:outerShdw>
           </a:effectLst>
@@ -17053,7 +17077,7 @@
           <a:effectLst>
             <a:outerShdw blurRad="57150" rotWithShape="0" algn="bl" dir="5400000" dist="19050">
               <a:srgbClr val="000000">
-                <a:alpha val="48235"/>
+                <a:alpha val="47843"/>
               </a:srgbClr>
             </a:outerShdw>
           </a:effectLst>
@@ -17127,7 +17151,7 @@
           <a:effectLst>
             <a:outerShdw blurRad="57150" rotWithShape="0" algn="bl" dir="5400000" dist="19050">
               <a:srgbClr val="000000">
-                <a:alpha val="48235"/>
+                <a:alpha val="47843"/>
               </a:srgbClr>
             </a:outerShdw>
           </a:effectLst>
@@ -17201,7 +17225,7 @@
           <a:effectLst>
             <a:outerShdw blurRad="57150" rotWithShape="0" algn="bl" dir="5400000" dist="19050">
               <a:srgbClr val="000000">
-                <a:alpha val="48235"/>
+                <a:alpha val="47843"/>
               </a:srgbClr>
             </a:outerShdw>
           </a:effectLst>
@@ -17590,7 +17614,7 @@
           <a:effectLst>
             <a:outerShdw blurRad="57150" rotWithShape="0" algn="bl" dir="5400000" dist="19050">
               <a:srgbClr val="000000">
-                <a:alpha val="48235"/>
+                <a:alpha val="47843"/>
               </a:srgbClr>
             </a:outerShdw>
           </a:effectLst>
@@ -17664,7 +17688,7 @@
           <a:effectLst>
             <a:outerShdw blurRad="57150" rotWithShape="0" algn="bl" dir="5400000" dist="19050">
               <a:srgbClr val="000000">
-                <a:alpha val="48235"/>
+                <a:alpha val="47843"/>
               </a:srgbClr>
             </a:outerShdw>
           </a:effectLst>
@@ -17738,7 +17762,7 @@
           <a:effectLst>
             <a:outerShdw blurRad="57150" rotWithShape="0" algn="bl" dir="5400000" dist="19050">
               <a:srgbClr val="000000">
-                <a:alpha val="48235"/>
+                <a:alpha val="47843"/>
               </a:srgbClr>
             </a:outerShdw>
           </a:effectLst>
@@ -17812,7 +17836,7 @@
           <a:effectLst>
             <a:outerShdw blurRad="57150" rotWithShape="0" algn="bl" dir="5400000" dist="19050">
               <a:srgbClr val="000000">
-                <a:alpha val="48235"/>
+                <a:alpha val="47843"/>
               </a:srgbClr>
             </a:outerShdw>
           </a:effectLst>
@@ -17886,7 +17910,7 @@
           <a:effectLst>
             <a:outerShdw blurRad="57150" rotWithShape="0" algn="bl" dir="5400000" dist="19050">
               <a:srgbClr val="000000">
-                <a:alpha val="48235"/>
+                <a:alpha val="47843"/>
               </a:srgbClr>
             </a:outerShdw>
           </a:effectLst>
@@ -17960,7 +17984,7 @@
           <a:effectLst>
             <a:outerShdw blurRad="57150" rotWithShape="0" algn="bl" dir="5400000" dist="19050">
               <a:srgbClr val="000000">
-                <a:alpha val="48235"/>
+                <a:alpha val="47843"/>
               </a:srgbClr>
             </a:outerShdw>
           </a:effectLst>
@@ -18034,7 +18058,7 @@
           <a:effectLst>
             <a:outerShdw blurRad="57150" rotWithShape="0" algn="bl" dir="5400000" dist="19050">
               <a:srgbClr val="000000">
-                <a:alpha val="48235"/>
+                <a:alpha val="47843"/>
               </a:srgbClr>
             </a:outerShdw>
           </a:effectLst>
@@ -18108,7 +18132,7 @@
           <a:effectLst>
             <a:outerShdw blurRad="57150" rotWithShape="0" algn="bl" dir="5400000" dist="19050">
               <a:srgbClr val="000000">
-                <a:alpha val="48235"/>
+                <a:alpha val="47843"/>
               </a:srgbClr>
             </a:outerShdw>
           </a:effectLst>
@@ -18182,7 +18206,7 @@
           <a:effectLst>
             <a:outerShdw blurRad="57150" rotWithShape="0" algn="bl" dir="5400000" dist="19050">
               <a:srgbClr val="000000">
-                <a:alpha val="48235"/>
+                <a:alpha val="47843"/>
               </a:srgbClr>
             </a:outerShdw>
           </a:effectLst>
@@ -18256,7 +18280,7 @@
           <a:effectLst>
             <a:outerShdw blurRad="57150" rotWithShape="0" algn="bl" dir="5400000" dist="19050">
               <a:srgbClr val="000000">
-                <a:alpha val="48235"/>
+                <a:alpha val="47843"/>
               </a:srgbClr>
             </a:outerShdw>
           </a:effectLst>
@@ -18330,7 +18354,7 @@
           <a:effectLst>
             <a:outerShdw blurRad="57150" rotWithShape="0" algn="bl" dir="5400000" dist="19050">
               <a:srgbClr val="000000">
-                <a:alpha val="48235"/>
+                <a:alpha val="47843"/>
               </a:srgbClr>
             </a:outerShdw>
           </a:effectLst>
@@ -18404,7 +18428,7 @@
           <a:effectLst>
             <a:outerShdw blurRad="57150" rotWithShape="0" algn="bl" dir="5400000" dist="19050">
               <a:srgbClr val="000000">
-                <a:alpha val="48235"/>
+                <a:alpha val="47843"/>
               </a:srgbClr>
             </a:outerShdw>
           </a:effectLst>
@@ -18478,7 +18502,7 @@
           <a:effectLst>
             <a:outerShdw blurRad="57150" rotWithShape="0" algn="bl" dir="5400000" dist="19050">
               <a:srgbClr val="000000">
-                <a:alpha val="48235"/>
+                <a:alpha val="47843"/>
               </a:srgbClr>
             </a:outerShdw>
           </a:effectLst>
@@ -18552,7 +18576,7 @@
           <a:effectLst>
             <a:outerShdw blurRad="57150" rotWithShape="0" algn="bl" dir="5400000" dist="19050">
               <a:srgbClr val="000000">
-                <a:alpha val="48235"/>
+                <a:alpha val="47843"/>
               </a:srgbClr>
             </a:outerShdw>
           </a:effectLst>
@@ -18626,7 +18650,7 @@
           <a:effectLst>
             <a:outerShdw blurRad="57150" rotWithShape="0" algn="bl" dir="5400000" dist="19050">
               <a:srgbClr val="000000">
-                <a:alpha val="48235"/>
+                <a:alpha val="47843"/>
               </a:srgbClr>
             </a:outerShdw>
           </a:effectLst>
@@ -18700,7 +18724,7 @@
           <a:effectLst>
             <a:outerShdw blurRad="57150" rotWithShape="0" algn="bl" dir="5400000" dist="19050">
               <a:srgbClr val="000000">
-                <a:alpha val="48235"/>
+                <a:alpha val="47843"/>
               </a:srgbClr>
             </a:outerShdw>
           </a:effectLst>
@@ -18774,7 +18798,7 @@
           <a:effectLst>
             <a:outerShdw blurRad="57150" rotWithShape="0" algn="bl" dir="5400000" dist="19050">
               <a:srgbClr val="000000">
-                <a:alpha val="48235"/>
+                <a:alpha val="47843"/>
               </a:srgbClr>
             </a:outerShdw>
           </a:effectLst>
@@ -18848,7 +18872,7 @@
           <a:effectLst>
             <a:outerShdw blurRad="57150" rotWithShape="0" algn="bl" dir="5400000" dist="19050">
               <a:srgbClr val="000000">
-                <a:alpha val="48235"/>
+                <a:alpha val="47843"/>
               </a:srgbClr>
             </a:outerShdw>
           </a:effectLst>
@@ -18922,7 +18946,7 @@
           <a:effectLst>
             <a:outerShdw blurRad="57150" rotWithShape="0" algn="bl" dir="5400000" dist="19050">
               <a:srgbClr val="000000">
-                <a:alpha val="48235"/>
+                <a:alpha val="47843"/>
               </a:srgbClr>
             </a:outerShdw>
           </a:effectLst>
@@ -18996,7 +19020,7 @@
           <a:effectLst>
             <a:outerShdw blurRad="57150" rotWithShape="0" algn="bl" dir="5400000" dist="19050">
               <a:srgbClr val="000000">
-                <a:alpha val="48235"/>
+                <a:alpha val="47843"/>
               </a:srgbClr>
             </a:outerShdw>
           </a:effectLst>
@@ -19070,7 +19094,7 @@
           <a:effectLst>
             <a:outerShdw blurRad="57150" rotWithShape="0" algn="bl" dir="5400000" dist="19050">
               <a:srgbClr val="000000">
-                <a:alpha val="48235"/>
+                <a:alpha val="47843"/>
               </a:srgbClr>
             </a:outerShdw>
           </a:effectLst>
@@ -19144,7 +19168,7 @@
           <a:effectLst>
             <a:outerShdw blurRad="57150" rotWithShape="0" algn="bl" dir="5400000" dist="19050">
               <a:srgbClr val="000000">
-                <a:alpha val="48235"/>
+                <a:alpha val="47843"/>
               </a:srgbClr>
             </a:outerShdw>
           </a:effectLst>
@@ -19218,7 +19242,7 @@
           <a:effectLst>
             <a:outerShdw blurRad="57150" rotWithShape="0" algn="bl" dir="5400000" dist="19050">
               <a:srgbClr val="000000">
-                <a:alpha val="48235"/>
+                <a:alpha val="47843"/>
               </a:srgbClr>
             </a:outerShdw>
           </a:effectLst>
@@ -19292,7 +19316,7 @@
           <a:effectLst>
             <a:outerShdw blurRad="57150" rotWithShape="0" algn="bl" dir="5400000" dist="19050">
               <a:srgbClr val="000000">
-                <a:alpha val="48235"/>
+                <a:alpha val="47843"/>
               </a:srgbClr>
             </a:outerShdw>
           </a:effectLst>
@@ -19366,7 +19390,7 @@
           <a:effectLst>
             <a:outerShdw blurRad="57150" rotWithShape="0" algn="bl" dir="5400000" dist="19050">
               <a:srgbClr val="000000">
-                <a:alpha val="48235"/>
+                <a:alpha val="47843"/>
               </a:srgbClr>
             </a:outerShdw>
           </a:effectLst>
@@ -19440,7 +19464,7 @@
           <a:effectLst>
             <a:outerShdw blurRad="57150" rotWithShape="0" algn="bl" dir="5400000" dist="19050">
               <a:srgbClr val="000000">
-                <a:alpha val="48235"/>
+                <a:alpha val="47843"/>
               </a:srgbClr>
             </a:outerShdw>
           </a:effectLst>
@@ -19514,7 +19538,7 @@
           <a:effectLst>
             <a:outerShdw blurRad="57150" rotWithShape="0" algn="bl" dir="5400000" dist="19050">
               <a:srgbClr val="000000">
-                <a:alpha val="48235"/>
+                <a:alpha val="47843"/>
               </a:srgbClr>
             </a:outerShdw>
           </a:effectLst>
@@ -22233,31 +22257,7 @@
                 <a:cs typeface="Helvetica Neue"/>
                 <a:sym typeface="Helvetica Neue"/>
               </a:rPr>
-              <a:t>Estimates the Monte Carlo Value at Risk (MC VaR) of a portfolio. We use the geometric Brownian motion (GBM) method to simulate stock price paths, but more </a:t>
-            </a:r>
-            <a:r>
-              <a:rPr lang="en-US" sz="2000">
-                <a:solidFill>
-                  <a:schemeClr val="dk1"/>
-                </a:solidFill>
-                <a:latin typeface="Helvetica Neue"/>
-                <a:ea typeface="Helvetica Neue"/>
-                <a:cs typeface="Helvetica Neue"/>
-                <a:sym typeface="Helvetica Neue"/>
-              </a:rPr>
-              <a:t>exotic </a:t>
-            </a:r>
-            <a:r>
-              <a:rPr b="0" i="0" lang="en-US" sz="2000" u="none" cap="none" strike="noStrike">
-                <a:solidFill>
-                  <a:schemeClr val="dk1"/>
-                </a:solidFill>
-                <a:latin typeface="Helvetica Neue"/>
-                <a:ea typeface="Helvetica Neue"/>
-                <a:cs typeface="Helvetica Neue"/>
-                <a:sym typeface="Helvetica Neue"/>
-              </a:rPr>
-              <a:t>assets can be integrated thanks to the Quantlib C++ lib.</a:t>
+              <a:t>Estimates the Monte Carlo Value at Risk (MC VaR) of a portfolio. We use the geometric Brownian motion (GBM) method to simulate stock price paths, but more exotic assets can be integrated thanks to the Quantlib C++ lib.</a:t>
             </a:r>
             <a:endParaRPr b="0" i="0" sz="2000" u="none" cap="none" strike="noStrike">
               <a:solidFill>
@@ -22296,17 +22296,25 @@
           </a:bodyPr>
           <a:lstStyle/>
           <a:p>
-            <a:pPr indent="0" lvl="0" marL="0" rtl="0" algn="l">
+            <a:pPr indent="0" lvl="0" marL="0" marR="0" rtl="0" algn="l">
+              <a:lnSpc>
+                <a:spcPct val="100000"/>
+              </a:lnSpc>
               <a:spcBef>
                 <a:spcPts val="800"/>
               </a:spcBef>
               <a:spcAft>
                 <a:spcPts val="0"/>
               </a:spcAft>
+              <a:buClr>
+                <a:srgbClr val="000000"/>
+              </a:buClr>
+              <a:buSzPts val="1400"/>
+              <a:buFont typeface="Arial"/>
               <a:buNone/>
             </a:pPr>
             <a:r>
-              <a:rPr lang="en-US">
+              <a:rPr b="0" i="0" lang="en-US" sz="1400" u="none" cap="none" strike="noStrike">
                 <a:solidFill>
                   <a:schemeClr val="dk1"/>
                 </a:solidFill>
@@ -22317,7 +22325,15 @@
               </a:rPr>
               <a:t>&lt;start price&gt;, &lt;riskless rate&gt;, &lt;volatility rate&gt;,&lt;weight&gt;</a:t>
             </a:r>
-            <a:endParaRPr/>
+            <a:endParaRPr b="0" i="0" sz="1400" u="none" cap="none" strike="noStrike">
+              <a:solidFill>
+                <a:srgbClr val="000000"/>
+              </a:solidFill>
+              <a:latin typeface="Arial"/>
+              <a:ea typeface="Arial"/>
+              <a:cs typeface="Arial"/>
+              <a:sym typeface="Arial"/>
+            </a:endParaRPr>
           </a:p>
         </p:txBody>
       </p:sp>
@@ -23063,39 +23079,7 @@
                 <a:cs typeface="Arial"/>
                 <a:sym typeface="Arial"/>
               </a:rPr>
-              <a:t>The interactive version of the Monte_Carlo_VaR_portfolio workflow allows the user to add more MC simulations to the </a:t>
-            </a:r>
-            <a:r>
-              <a:rPr lang="en-US" sz="1800"/>
-              <a:t>current </a:t>
-            </a:r>
-            <a:r>
-              <a:rPr b="0" i="0" lang="en-US" sz="1800" u="none" cap="none" strike="noStrike">
-                <a:solidFill>
-                  <a:srgbClr val="000000"/>
-                </a:solidFill>
-                <a:latin typeface="Arial"/>
-                <a:ea typeface="Arial"/>
-                <a:cs typeface="Arial"/>
-                <a:sym typeface="Arial"/>
-              </a:rPr>
-              <a:t>results, for a more accurate VaR. </a:t>
-            </a:r>
-            <a:r>
-              <a:rPr lang="en-US" sz="1800"/>
-              <a:t>“T</a:t>
-            </a:r>
-            <a:r>
-              <a:rPr b="0" i="0" lang="en-US" sz="1800" u="none" cap="none" strike="noStrike">
-                <a:solidFill>
-                  <a:srgbClr val="000000"/>
-                </a:solidFill>
-                <a:latin typeface="Arial"/>
-                <a:ea typeface="Arial"/>
-                <a:cs typeface="Arial"/>
-                <a:sym typeface="Arial"/>
-              </a:rPr>
-              <a:t>he estimated VaR can be refined incrementally.”</a:t>
+              <a:t>The interactive version of the Monte_Carlo_VaR_portfolio workflow allows the user to add more MC simulations to the current results, for a more accurate VaR. “The estimated VaR can be refined incrementally.”</a:t>
             </a:r>
             <a:endParaRPr b="0" i="0" sz="1800" u="none" cap="none" strike="noStrike">
               <a:solidFill>
@@ -23339,31 +23323,7 @@
                 <a:cs typeface="Helvetica Neue"/>
                 <a:sym typeface="Helvetica Neue"/>
               </a:rPr>
-              <a:t>Estimates the incremental VaR (iVaR) for each asset of the portfolio. iVaR quantifies the risk a position (or sub-portfolio) is adding to a portfolio. </a:t>
-            </a:r>
-            <a:r>
-              <a:rPr lang="en-US" sz="2000">
-                <a:solidFill>
-                  <a:schemeClr val="dk1"/>
-                </a:solidFill>
-                <a:latin typeface="Helvetica Neue"/>
-                <a:ea typeface="Helvetica Neue"/>
-                <a:cs typeface="Helvetica Neue"/>
-                <a:sym typeface="Helvetica Neue"/>
-              </a:rPr>
-              <a:t>T</a:t>
-            </a:r>
-            <a:r>
-              <a:rPr b="0" i="0" lang="en-US" sz="2000" u="none" cap="none" strike="noStrike">
-                <a:solidFill>
-                  <a:schemeClr val="dk1"/>
-                </a:solidFill>
-                <a:latin typeface="Helvetica Neue"/>
-                <a:ea typeface="Helvetica Neue"/>
-                <a:cs typeface="Helvetica Neue"/>
-                <a:sym typeface="Helvetica Neue"/>
-              </a:rPr>
-              <a:t>he iVaR related to an asset Y, is the difference between the portfolio VaR with and without Y.</a:t>
+              <a:t>Estimates the incremental VaR (iVaR) for each asset of the portfolio. iVaR quantifies the risk a position (or sub-portfolio) is adding to a portfolio. The iVaR related to an asset Y, is the difference between the portfolio VaR with and without Y.</a:t>
             </a:r>
             <a:endParaRPr b="0" i="0" sz="2000" u="none" cap="none" strike="noStrike">
               <a:solidFill>
@@ -23764,47 +23724,7 @@
                 <a:cs typeface="Arial"/>
                 <a:sym typeface="Arial"/>
               </a:rPr>
-              <a:t>(left branch) </a:t>
-            </a:r>
-            <a:r>
-              <a:rPr lang="en-US">
-                <a:solidFill>
-                  <a:schemeClr val="dk1"/>
-                </a:solidFill>
-              </a:rPr>
-              <a:t>This</a:t>
-            </a:r>
-            <a:r>
-              <a:rPr b="0" i="0" lang="en-US" sz="1400" u="none" cap="none" strike="noStrike">
-                <a:solidFill>
-                  <a:schemeClr val="dk1"/>
-                </a:solidFill>
-                <a:latin typeface="Arial"/>
-                <a:ea typeface="Arial"/>
-                <a:cs typeface="Arial"/>
-                <a:sym typeface="Arial"/>
-              </a:rPr>
-              <a:t> task submit</a:t>
-            </a:r>
-            <a:r>
-              <a:rPr lang="en-US">
-                <a:solidFill>
-                  <a:schemeClr val="dk1"/>
-                </a:solidFill>
-              </a:rPr>
-              <a:t>s the</a:t>
-            </a:r>
-            <a:r>
-              <a:rPr b="0" i="0" lang="en-US" sz="1400" u="none" cap="none" strike="noStrike">
-                <a:solidFill>
-                  <a:schemeClr val="dk1"/>
-                </a:solidFill>
-                <a:latin typeface="Arial"/>
-                <a:ea typeface="Arial"/>
-                <a:cs typeface="Arial"/>
-                <a:sym typeface="Arial"/>
-              </a:rPr>
-              <a:t> Monte_Carlo_VaR_portfolio wkw by considering all assets specified by the user</a:t>
+              <a:t>(left branch) This task submits the Monte_Carlo_VaR_portfolio wkw by considering all assets specified by the user</a:t>
             </a:r>
             <a:endParaRPr b="0" i="0" sz="1400" u="none" cap="none" strike="noStrike">
               <a:solidFill>
@@ -24087,23 +24007,7 @@
                 <a:cs typeface="Arial"/>
                 <a:sym typeface="Arial"/>
               </a:rPr>
-              <a:t>) with </a:t>
-            </a:r>
-            <a:r>
-              <a:rPr lang="en-US"/>
-              <a:t>an</a:t>
-            </a:r>
-            <a:r>
-              <a:rPr b="0" i="0" lang="en-US" sz="1400" u="none" cap="none" strike="noStrike">
-                <a:solidFill>
-                  <a:srgbClr val="000000"/>
-                </a:solidFill>
-                <a:latin typeface="Arial"/>
-                <a:ea typeface="Arial"/>
-                <a:cs typeface="Arial"/>
-                <a:sym typeface="Arial"/>
-              </a:rPr>
-              <a:t> instanciated asset params file as input.</a:t>
+              <a:t>) with an instanciated asset params file as input.</a:t>
             </a:r>
             <a:endParaRPr b="0" i="0" sz="1400" u="none" cap="none" strike="noStrike">
               <a:solidFill>

</xml_diff>

<commit_message>
Update MC VaR wkw to allow changing task number and node source in the signal
</commit_message>
<xml_diff>
--- a/Finance/resources/doc/risk-valuation-proactive.pptx
+++ b/Finance/resources/doc/risk-valuation-proactive.pptx
@@ -267,8 +267,8 @@
     </a:lvl9pPr>
   </p:defaultTextStyle>
   <p:extLst>
-    <p:ext uri="http://customooxmlschemas.google.com/">
-      <go:slidesCustomData xmlns:go="http://customooxmlschemas.google.com/" r:id="rId26" roundtripDataSignature="AMtx7mgLcIYSHxTYJrq1XrARL9zF5UBS/Q=="/>
+    <p:ext uri="GoogleSlidesCustomDataVersion2">
+      <go:slidesCustomData xmlns:go="http://customooxmlschemas.google.com/" r:id="rId26" roundtripDataSignature="AMtx7miUG9hGhwnYgyPDhGVjBW0SccQz4w=="/>
     </p:ext>
   </p:extLst>
 </p:presentation>
@@ -10426,13 +10426,12 @@
           <p:cNvPicPr preferRelativeResize="0"/>
           <p:nvPr/>
         </p:nvPicPr>
-        <p:blipFill>
+        <p:blipFill rotWithShape="1">
           <a:blip r:embed="rId3">
             <a:alphaModFix/>
           </a:blip>
-          <a:stretch>
-            <a:fillRect/>
-          </a:stretch>
+          <a:srcRect b="0" l="0" r="0" t="0"/>
+          <a:stretch/>
         </p:blipFill>
         <p:spPr>
           <a:xfrm>
@@ -10573,10 +10572,6 @@
               <a:buNone/>
             </a:pPr>
             <a:r>
-              <a:rPr lang="en-US" sz="1800"/>
-              <a:t>Generates all the combinations &lt;stressed risk free rate, stressed volatility&gt; according to their min,max,step user parameters. </a:t>
-            </a:r>
-            <a:r>
               <a:rPr b="0" i="0" lang="en-US" sz="1800" u="none" cap="none" strike="noStrike">
                 <a:solidFill>
                   <a:srgbClr val="000000"/>
@@ -10586,27 +10581,7 @@
                 <a:cs typeface="Arial"/>
                 <a:sym typeface="Arial"/>
               </a:rPr>
-              <a:t>The number of replicated tasks must divide the number of </a:t>
-            </a:r>
-            <a:r>
-              <a:rPr lang="en-US" sz="1800"/>
-              <a:t>combinations, i.e. the number of </a:t>
-            </a:r>
-            <a:r>
-              <a:rPr lang="en-US" sz="1800"/>
-              <a:t>scenarios</a:t>
-            </a:r>
-            <a:r>
-              <a:rPr b="0" i="0" lang="en-US" sz="1800" u="none" cap="none" strike="noStrike">
-                <a:solidFill>
-                  <a:srgbClr val="000000"/>
-                </a:solidFill>
-                <a:latin typeface="Arial"/>
-                <a:ea typeface="Arial"/>
-                <a:cs typeface="Arial"/>
-                <a:sym typeface="Arial"/>
-              </a:rPr>
-              <a:t> </a:t>
+              <a:t>Generates all the combinations &lt;stressed risk free rate, stressed volatility&gt; according to their min,max,step user parameters. The number of replicated tasks must divide the number of combinations, i.e. the number of scenarios </a:t>
             </a:r>
             <a:endParaRPr b="0" i="0" sz="1800" u="none" cap="none" strike="noStrike">
               <a:solidFill>
@@ -10730,10 +10705,6 @@
               <a:buNone/>
             </a:pPr>
             <a:r>
-              <a:rPr lang="en-US" sz="1800"/>
-              <a:t>E</a:t>
-            </a:r>
-            <a:r>
               <a:rPr b="0" i="0" lang="en-US" sz="1800" u="none" cap="none" strike="noStrike">
                 <a:solidFill>
                   <a:srgbClr val="000000"/>
@@ -10743,35 +10714,19 @@
                 <a:cs typeface="Arial"/>
                 <a:sym typeface="Arial"/>
               </a:rPr>
-              <a:t>ach replicated task processes a subset of the </a:t>
-            </a:r>
-            <a:r>
-              <a:rPr lang="en-US" sz="1800"/>
-              <a:t>scenarios</a:t>
+              <a:t>Each replicated task processes a subset of the scenarios and estimates per scenario, the mean/expected portfolio Profit and Loss (P&amp;L) over the given number of MC simulations. These simulations are processed in C++/Quantlib. Each task writes </a:t>
             </a:r>
             <a:r>
               <a:rPr b="0" i="0" lang="en-US" sz="1800" u="none" cap="none" strike="noStrike">
                 <a:solidFill>
-                  <a:srgbClr val="000000"/>
+                  <a:schemeClr val="dk1"/>
                 </a:solidFill>
                 <a:latin typeface="Arial"/>
                 <a:ea typeface="Arial"/>
                 <a:cs typeface="Arial"/>
                 <a:sym typeface="Arial"/>
               </a:rPr>
-              <a:t> and estimates</a:t>
-            </a:r>
-            <a:r>
-              <a:rPr lang="en-US" sz="1800"/>
-              <a:t> per </a:t>
-            </a:r>
-            <a:r>
-              <a:rPr lang="en-US" sz="1800"/>
-              <a:t>scenario, the mean/expected portfolio Profit and Loss (P&amp;L) over the given number of</a:t>
-            </a:r>
-            <a:r>
-              <a:rPr lang="en-US" sz="1800"/>
-              <a:t> </a:t>
+              <a:t>into a dedicated file </a:t>
             </a:r>
             <a:r>
               <a:rPr b="0" i="0" lang="en-US" sz="1800" u="none" cap="none" strike="noStrike">
@@ -10783,91 +10738,7 @@
                 <a:cs typeface="Arial"/>
                 <a:sym typeface="Arial"/>
               </a:rPr>
-              <a:t>MC simulations. These </a:t>
-            </a:r>
-            <a:r>
-              <a:rPr lang="en-US" sz="1800"/>
-              <a:t>simulations</a:t>
-            </a:r>
-            <a:r>
-              <a:rPr b="0" i="0" lang="en-US" sz="1800" u="none" cap="none" strike="noStrike">
-                <a:solidFill>
-                  <a:srgbClr val="000000"/>
-                </a:solidFill>
-                <a:latin typeface="Arial"/>
-                <a:ea typeface="Arial"/>
-                <a:cs typeface="Arial"/>
-                <a:sym typeface="Arial"/>
-              </a:rPr>
-              <a:t> are proc</a:t>
-            </a:r>
-            <a:r>
-              <a:rPr lang="en-US" sz="1800"/>
-              <a:t>essed in C++/Quantlib.</a:t>
-            </a:r>
-            <a:r>
-              <a:rPr b="0" i="0" lang="en-US" sz="1800" u="none" cap="none" strike="noStrike">
-                <a:solidFill>
-                  <a:srgbClr val="000000"/>
-                </a:solidFill>
-                <a:latin typeface="Arial"/>
-                <a:ea typeface="Arial"/>
-                <a:cs typeface="Arial"/>
-                <a:sym typeface="Arial"/>
-              </a:rPr>
-              <a:t> Each task writes </a:t>
-            </a:r>
-            <a:r>
-              <a:rPr lang="en-US" sz="1800">
-                <a:solidFill>
-                  <a:schemeClr val="dk1"/>
-                </a:solidFill>
-              </a:rPr>
-              <a:t>into a dedicated file </a:t>
-            </a:r>
-            <a:r>
-              <a:rPr b="0" i="0" lang="en-US" sz="1800" u="none" cap="none" strike="noStrike">
-                <a:solidFill>
-                  <a:srgbClr val="000000"/>
-                </a:solidFill>
-                <a:latin typeface="Arial"/>
-                <a:ea typeface="Arial"/>
-                <a:cs typeface="Arial"/>
-                <a:sym typeface="Arial"/>
-              </a:rPr>
-              <a:t>all its estimated P</a:t>
-            </a:r>
-            <a:r>
-              <a:rPr lang="en-US" sz="1800"/>
-              <a:t>&amp;</a:t>
-            </a:r>
-            <a:r>
-              <a:rPr b="0" i="0" lang="en-US" sz="1800" u="none" cap="none" strike="noStrike">
-                <a:solidFill>
-                  <a:srgbClr val="000000"/>
-                </a:solidFill>
-                <a:latin typeface="Arial"/>
-                <a:ea typeface="Arial"/>
-                <a:cs typeface="Arial"/>
-                <a:sym typeface="Arial"/>
-              </a:rPr>
-              <a:t>Ls</a:t>
-            </a:r>
-            <a:r>
-              <a:rPr lang="en-US" sz="1800"/>
-              <a:t> (</a:t>
-            </a:r>
-            <a:r>
-              <a:rPr b="0" i="0" lang="en-US" sz="1800" u="none" cap="none" strike="noStrike">
-                <a:solidFill>
-                  <a:srgbClr val="000000"/>
-                </a:solidFill>
-                <a:latin typeface="Arial"/>
-                <a:ea typeface="Arial"/>
-                <a:cs typeface="Arial"/>
-                <a:sym typeface="Arial"/>
-              </a:rPr>
-              <a:t>a P&amp;L per senario) </a:t>
+              <a:t>all its estimated P&amp;Ls (a P&amp;L per senario) </a:t>
             </a:r>
             <a:endParaRPr b="0" i="0" sz="1800" u="none" cap="none" strike="noStrike">
               <a:solidFill>
@@ -11867,7 +11738,7 @@
           <a:effectLst>
             <a:outerShdw blurRad="57150" rotWithShape="0" algn="bl" dir="5400000" dist="19050">
               <a:srgbClr val="000000">
-                <a:alpha val="47843"/>
+                <a:alpha val="47450"/>
               </a:srgbClr>
             </a:outerShdw>
           </a:effectLst>
@@ -11941,7 +11812,7 @@
           <a:effectLst>
             <a:outerShdw blurRad="57150" rotWithShape="0" algn="bl" dir="5400000" dist="19050">
               <a:srgbClr val="000000">
-                <a:alpha val="47843"/>
+                <a:alpha val="47450"/>
               </a:srgbClr>
             </a:outerShdw>
           </a:effectLst>
@@ -12015,7 +11886,7 @@
           <a:effectLst>
             <a:outerShdw blurRad="57150" rotWithShape="0" algn="bl" dir="5400000" dist="19050">
               <a:srgbClr val="000000">
-                <a:alpha val="47843"/>
+                <a:alpha val="47450"/>
               </a:srgbClr>
             </a:outerShdw>
           </a:effectLst>
@@ -12089,7 +11960,7 @@
           <a:effectLst>
             <a:outerShdw blurRad="57150" rotWithShape="0" algn="bl" dir="5400000" dist="19050">
               <a:srgbClr val="000000">
-                <a:alpha val="47843"/>
+                <a:alpha val="47450"/>
               </a:srgbClr>
             </a:outerShdw>
           </a:effectLst>
@@ -12163,7 +12034,7 @@
           <a:effectLst>
             <a:outerShdw blurRad="57150" rotWithShape="0" algn="bl" dir="5400000" dist="19050">
               <a:srgbClr val="000000">
-                <a:alpha val="47843"/>
+                <a:alpha val="47450"/>
               </a:srgbClr>
             </a:outerShdw>
           </a:effectLst>
@@ -12237,7 +12108,7 @@
           <a:effectLst>
             <a:outerShdw blurRad="57150" rotWithShape="0" algn="bl" dir="5400000" dist="19050">
               <a:srgbClr val="000000">
-                <a:alpha val="47843"/>
+                <a:alpha val="47450"/>
               </a:srgbClr>
             </a:outerShdw>
           </a:effectLst>
@@ -12311,7 +12182,7 @@
           <a:effectLst>
             <a:outerShdw blurRad="57150" rotWithShape="0" algn="bl" dir="5400000" dist="19050">
               <a:srgbClr val="000000">
-                <a:alpha val="47843"/>
+                <a:alpha val="47450"/>
               </a:srgbClr>
             </a:outerShdw>
           </a:effectLst>
@@ -12385,7 +12256,7 @@
           <a:effectLst>
             <a:outerShdw blurRad="57150" rotWithShape="0" algn="bl" dir="5400000" dist="19050">
               <a:srgbClr val="000000">
-                <a:alpha val="47843"/>
+                <a:alpha val="47450"/>
               </a:srgbClr>
             </a:outerShdw>
           </a:effectLst>
@@ -12459,7 +12330,7 @@
           <a:effectLst>
             <a:outerShdw blurRad="57150" rotWithShape="0" algn="bl" dir="5400000" dist="19050">
               <a:srgbClr val="000000">
-                <a:alpha val="47843"/>
+                <a:alpha val="47450"/>
               </a:srgbClr>
             </a:outerShdw>
           </a:effectLst>
@@ -12533,7 +12404,7 @@
           <a:effectLst>
             <a:outerShdw blurRad="57150" rotWithShape="0" algn="bl" dir="5400000" dist="19050">
               <a:srgbClr val="000000">
-                <a:alpha val="47843"/>
+                <a:alpha val="47450"/>
               </a:srgbClr>
             </a:outerShdw>
           </a:effectLst>
@@ -12607,7 +12478,7 @@
           <a:effectLst>
             <a:outerShdw blurRad="57150" rotWithShape="0" algn="bl" dir="5400000" dist="19050">
               <a:srgbClr val="000000">
-                <a:alpha val="47843"/>
+                <a:alpha val="47450"/>
               </a:srgbClr>
             </a:outerShdw>
           </a:effectLst>
@@ -12681,7 +12552,7 @@
           <a:effectLst>
             <a:outerShdw blurRad="57150" rotWithShape="0" algn="bl" dir="5400000" dist="19050">
               <a:srgbClr val="000000">
-                <a:alpha val="47843"/>
+                <a:alpha val="47450"/>
               </a:srgbClr>
             </a:outerShdw>
           </a:effectLst>
@@ -12755,7 +12626,7 @@
           <a:effectLst>
             <a:outerShdw blurRad="57150" rotWithShape="0" algn="bl" dir="5400000" dist="19050">
               <a:srgbClr val="000000">
-                <a:alpha val="47843"/>
+                <a:alpha val="47450"/>
               </a:srgbClr>
             </a:outerShdw>
           </a:effectLst>
@@ -12829,7 +12700,7 @@
           <a:effectLst>
             <a:outerShdw blurRad="57150" rotWithShape="0" algn="bl" dir="5400000" dist="19050">
               <a:srgbClr val="000000">
-                <a:alpha val="47843"/>
+                <a:alpha val="47450"/>
               </a:srgbClr>
             </a:outerShdw>
           </a:effectLst>
@@ -12903,7 +12774,7 @@
           <a:effectLst>
             <a:outerShdw blurRad="57150" rotWithShape="0" algn="bl" dir="5400000" dist="19050">
               <a:srgbClr val="000000">
-                <a:alpha val="47843"/>
+                <a:alpha val="47450"/>
               </a:srgbClr>
             </a:outerShdw>
           </a:effectLst>
@@ -12977,7 +12848,7 @@
           <a:effectLst>
             <a:outerShdw blurRad="57150" rotWithShape="0" algn="bl" dir="5400000" dist="19050">
               <a:srgbClr val="000000">
-                <a:alpha val="47843"/>
+                <a:alpha val="47450"/>
               </a:srgbClr>
             </a:outerShdw>
           </a:effectLst>
@@ -13051,7 +12922,7 @@
           <a:effectLst>
             <a:outerShdw blurRad="57150" rotWithShape="0" algn="bl" dir="5400000" dist="19050">
               <a:srgbClr val="000000">
-                <a:alpha val="47843"/>
+                <a:alpha val="47450"/>
               </a:srgbClr>
             </a:outerShdw>
           </a:effectLst>
@@ -13125,7 +12996,7 @@
           <a:effectLst>
             <a:outerShdw blurRad="57150" rotWithShape="0" algn="bl" dir="5400000" dist="19050">
               <a:srgbClr val="000000">
-                <a:alpha val="47843"/>
+                <a:alpha val="47450"/>
               </a:srgbClr>
             </a:outerShdw>
           </a:effectLst>
@@ -13199,7 +13070,7 @@
           <a:effectLst>
             <a:outerShdw blurRad="57150" rotWithShape="0" algn="bl" dir="5400000" dist="19050">
               <a:srgbClr val="000000">
-                <a:alpha val="47843"/>
+                <a:alpha val="47450"/>
               </a:srgbClr>
             </a:outerShdw>
           </a:effectLst>
@@ -13273,7 +13144,7 @@
           <a:effectLst>
             <a:outerShdw blurRad="57150" rotWithShape="0" algn="bl" dir="5400000" dist="19050">
               <a:srgbClr val="000000">
-                <a:alpha val="47843"/>
+                <a:alpha val="47450"/>
               </a:srgbClr>
             </a:outerShdw>
           </a:effectLst>
@@ -13347,7 +13218,7 @@
           <a:effectLst>
             <a:outerShdw blurRad="57150" rotWithShape="0" algn="bl" dir="5400000" dist="19050">
               <a:srgbClr val="000000">
-                <a:alpha val="47843"/>
+                <a:alpha val="47450"/>
               </a:srgbClr>
             </a:outerShdw>
           </a:effectLst>
@@ -13421,7 +13292,7 @@
           <a:effectLst>
             <a:outerShdw blurRad="57150" rotWithShape="0" algn="bl" dir="5400000" dist="19050">
               <a:srgbClr val="000000">
-                <a:alpha val="47843"/>
+                <a:alpha val="47450"/>
               </a:srgbClr>
             </a:outerShdw>
           </a:effectLst>
@@ -13495,7 +13366,7 @@
           <a:effectLst>
             <a:outerShdw blurRad="57150" rotWithShape="0" algn="bl" dir="5400000" dist="19050">
               <a:srgbClr val="000000">
-                <a:alpha val="47843"/>
+                <a:alpha val="47450"/>
               </a:srgbClr>
             </a:outerShdw>
           </a:effectLst>
@@ -13569,7 +13440,7 @@
           <a:effectLst>
             <a:outerShdw blurRad="57150" rotWithShape="0" algn="bl" dir="5400000" dist="19050">
               <a:srgbClr val="000000">
-                <a:alpha val="47843"/>
+                <a:alpha val="47450"/>
               </a:srgbClr>
             </a:outerShdw>
           </a:effectLst>
@@ -13643,7 +13514,7 @@
           <a:effectLst>
             <a:outerShdw blurRad="57150" rotWithShape="0" algn="bl" dir="5400000" dist="19050">
               <a:srgbClr val="000000">
-                <a:alpha val="47843"/>
+                <a:alpha val="47450"/>
               </a:srgbClr>
             </a:outerShdw>
           </a:effectLst>
@@ -13717,7 +13588,7 @@
           <a:effectLst>
             <a:outerShdw blurRad="57150" rotWithShape="0" algn="bl" dir="5400000" dist="19050">
               <a:srgbClr val="000000">
-                <a:alpha val="47843"/>
+                <a:alpha val="47450"/>
               </a:srgbClr>
             </a:outerShdw>
           </a:effectLst>
@@ -13791,7 +13662,7 @@
           <a:effectLst>
             <a:outerShdw blurRad="57150" rotWithShape="0" algn="bl" dir="5400000" dist="19050">
               <a:srgbClr val="000000">
-                <a:alpha val="47843"/>
+                <a:alpha val="47450"/>
               </a:srgbClr>
             </a:outerShdw>
           </a:effectLst>
@@ -13865,7 +13736,7 @@
           <a:effectLst>
             <a:outerShdw blurRad="57150" rotWithShape="0" algn="bl" dir="5400000" dist="19050">
               <a:srgbClr val="000000">
-                <a:alpha val="47843"/>
+                <a:alpha val="47450"/>
               </a:srgbClr>
             </a:outerShdw>
           </a:effectLst>
@@ -13939,7 +13810,7 @@
           <a:effectLst>
             <a:outerShdw blurRad="57150" rotWithShape="0" algn="bl" dir="5400000" dist="19050">
               <a:srgbClr val="000000">
-                <a:alpha val="47843"/>
+                <a:alpha val="47450"/>
               </a:srgbClr>
             </a:outerShdw>
           </a:effectLst>
@@ -14013,7 +13884,7 @@
           <a:effectLst>
             <a:outerShdw blurRad="57150" rotWithShape="0" algn="bl" dir="5400000" dist="19050">
               <a:srgbClr val="000000">
-                <a:alpha val="47843"/>
+                <a:alpha val="47450"/>
               </a:srgbClr>
             </a:outerShdw>
           </a:effectLst>
@@ -14087,7 +13958,7 @@
           <a:effectLst>
             <a:outerShdw blurRad="57150" rotWithShape="0" algn="bl" dir="5400000" dist="19050">
               <a:srgbClr val="000000">
-                <a:alpha val="47843"/>
+                <a:alpha val="47450"/>
               </a:srgbClr>
             </a:outerShdw>
           </a:effectLst>
@@ -14161,7 +14032,7 @@
           <a:effectLst>
             <a:outerShdw blurRad="57150" rotWithShape="0" algn="bl" dir="5400000" dist="19050">
               <a:srgbClr val="000000">
-                <a:alpha val="47843"/>
+                <a:alpha val="47450"/>
               </a:srgbClr>
             </a:outerShdw>
           </a:effectLst>
@@ -14235,7 +14106,7 @@
           <a:effectLst>
             <a:outerShdw blurRad="57150" rotWithShape="0" algn="bl" dir="5400000" dist="19050">
               <a:srgbClr val="000000">
-                <a:alpha val="47843"/>
+                <a:alpha val="47450"/>
               </a:srgbClr>
             </a:outerShdw>
           </a:effectLst>
@@ -14309,7 +14180,7 @@
           <a:effectLst>
             <a:outerShdw blurRad="57150" rotWithShape="0" algn="bl" dir="5400000" dist="19050">
               <a:srgbClr val="000000">
-                <a:alpha val="47843"/>
+                <a:alpha val="47450"/>
               </a:srgbClr>
             </a:outerShdw>
           </a:effectLst>
@@ -14383,7 +14254,7 @@
           <a:effectLst>
             <a:outerShdw blurRad="57150" rotWithShape="0" algn="bl" dir="5400000" dist="19050">
               <a:srgbClr val="000000">
-                <a:alpha val="47843"/>
+                <a:alpha val="47450"/>
               </a:srgbClr>
             </a:outerShdw>
           </a:effectLst>
@@ -14457,7 +14328,7 @@
           <a:effectLst>
             <a:outerShdw blurRad="57150" rotWithShape="0" algn="bl" dir="5400000" dist="19050">
               <a:srgbClr val="000000">
-                <a:alpha val="47843"/>
+                <a:alpha val="47450"/>
               </a:srgbClr>
             </a:outerShdw>
           </a:effectLst>
@@ -14531,7 +14402,7 @@
           <a:effectLst>
             <a:outerShdw blurRad="57150" rotWithShape="0" algn="bl" dir="5400000" dist="19050">
               <a:srgbClr val="000000">
-                <a:alpha val="47843"/>
+                <a:alpha val="47450"/>
               </a:srgbClr>
             </a:outerShdw>
           </a:effectLst>
@@ -14605,7 +14476,7 @@
           <a:effectLst>
             <a:outerShdw blurRad="57150" rotWithShape="0" algn="bl" dir="5400000" dist="19050">
               <a:srgbClr val="000000">
-                <a:alpha val="47843"/>
+                <a:alpha val="47450"/>
               </a:srgbClr>
             </a:outerShdw>
           </a:effectLst>
@@ -14679,7 +14550,7 @@
           <a:effectLst>
             <a:outerShdw blurRad="57150" rotWithShape="0" algn="bl" dir="5400000" dist="19050">
               <a:srgbClr val="000000">
-                <a:alpha val="47843"/>
+                <a:alpha val="47450"/>
               </a:srgbClr>
             </a:outerShdw>
           </a:effectLst>
@@ -14753,7 +14624,7 @@
           <a:effectLst>
             <a:outerShdw blurRad="57150" rotWithShape="0" algn="bl" dir="5400000" dist="19050">
               <a:srgbClr val="000000">
-                <a:alpha val="47843"/>
+                <a:alpha val="47450"/>
               </a:srgbClr>
             </a:outerShdw>
           </a:effectLst>
@@ -14827,7 +14698,7 @@
           <a:effectLst>
             <a:outerShdw blurRad="57150" rotWithShape="0" algn="bl" dir="5400000" dist="19050">
               <a:srgbClr val="000000">
-                <a:alpha val="47843"/>
+                <a:alpha val="47450"/>
               </a:srgbClr>
             </a:outerShdw>
           </a:effectLst>
@@ -14901,7 +14772,7 @@
           <a:effectLst>
             <a:outerShdw blurRad="57150" rotWithShape="0" algn="bl" dir="5400000" dist="19050">
               <a:srgbClr val="000000">
-                <a:alpha val="47843"/>
+                <a:alpha val="47450"/>
               </a:srgbClr>
             </a:outerShdw>
           </a:effectLst>
@@ -14975,7 +14846,7 @@
           <a:effectLst>
             <a:outerShdw blurRad="57150" rotWithShape="0" algn="bl" dir="5400000" dist="19050">
               <a:srgbClr val="000000">
-                <a:alpha val="47843"/>
+                <a:alpha val="47450"/>
               </a:srgbClr>
             </a:outerShdw>
           </a:effectLst>
@@ -15049,7 +14920,7 @@
           <a:effectLst>
             <a:outerShdw blurRad="57150" rotWithShape="0" algn="bl" dir="5400000" dist="19050">
               <a:srgbClr val="000000">
-                <a:alpha val="47843"/>
+                <a:alpha val="47450"/>
               </a:srgbClr>
             </a:outerShdw>
           </a:effectLst>
@@ -15579,7 +15450,7 @@
           <a:effectLst>
             <a:outerShdw blurRad="57150" rotWithShape="0" algn="bl" dir="5400000" dist="19050">
               <a:srgbClr val="000000">
-                <a:alpha val="47843"/>
+                <a:alpha val="47450"/>
               </a:srgbClr>
             </a:outerShdw>
           </a:effectLst>
@@ -15653,7 +15524,7 @@
           <a:effectLst>
             <a:outerShdw blurRad="57150" rotWithShape="0" algn="bl" dir="5400000" dist="19050">
               <a:srgbClr val="000000">
-                <a:alpha val="47843"/>
+                <a:alpha val="47450"/>
               </a:srgbClr>
             </a:outerShdw>
           </a:effectLst>
@@ -15727,7 +15598,7 @@
           <a:effectLst>
             <a:outerShdw blurRad="57150" rotWithShape="0" algn="bl" dir="5400000" dist="19050">
               <a:srgbClr val="000000">
-                <a:alpha val="47843"/>
+                <a:alpha val="47450"/>
               </a:srgbClr>
             </a:outerShdw>
           </a:effectLst>
@@ -15801,7 +15672,7 @@
           <a:effectLst>
             <a:outerShdw blurRad="57150" rotWithShape="0" algn="bl" dir="5400000" dist="19050">
               <a:srgbClr val="000000">
-                <a:alpha val="47843"/>
+                <a:alpha val="47450"/>
               </a:srgbClr>
             </a:outerShdw>
           </a:effectLst>
@@ -15875,7 +15746,7 @@
           <a:effectLst>
             <a:outerShdw blurRad="57150" rotWithShape="0" algn="bl" dir="5400000" dist="19050">
               <a:srgbClr val="000000">
-                <a:alpha val="47843"/>
+                <a:alpha val="47450"/>
               </a:srgbClr>
             </a:outerShdw>
           </a:effectLst>
@@ -15949,7 +15820,7 @@
           <a:effectLst>
             <a:outerShdw blurRad="57150" rotWithShape="0" algn="bl" dir="5400000" dist="19050">
               <a:srgbClr val="000000">
-                <a:alpha val="47843"/>
+                <a:alpha val="47450"/>
               </a:srgbClr>
             </a:outerShdw>
           </a:effectLst>
@@ -16023,7 +15894,7 @@
           <a:effectLst>
             <a:outerShdw blurRad="57150" rotWithShape="0" algn="bl" dir="5400000" dist="19050">
               <a:srgbClr val="000000">
-                <a:alpha val="47843"/>
+                <a:alpha val="47450"/>
               </a:srgbClr>
             </a:outerShdw>
           </a:effectLst>
@@ -16097,7 +15968,7 @@
           <a:effectLst>
             <a:outerShdw blurRad="57150" rotWithShape="0" algn="bl" dir="5400000" dist="19050">
               <a:srgbClr val="000000">
-                <a:alpha val="47843"/>
+                <a:alpha val="47450"/>
               </a:srgbClr>
             </a:outerShdw>
           </a:effectLst>
@@ -16171,7 +16042,7 @@
           <a:effectLst>
             <a:outerShdw blurRad="57150" rotWithShape="0" algn="bl" dir="5400000" dist="19050">
               <a:srgbClr val="000000">
-                <a:alpha val="47843"/>
+                <a:alpha val="47450"/>
               </a:srgbClr>
             </a:outerShdw>
           </a:effectLst>
@@ -16337,7 +16208,7 @@
           <a:effectLst>
             <a:outerShdw blurRad="57150" rotWithShape="0" algn="bl" dir="5400000" dist="19050">
               <a:srgbClr val="000000">
-                <a:alpha val="47843"/>
+                <a:alpha val="47450"/>
               </a:srgbClr>
             </a:outerShdw>
           </a:effectLst>
@@ -16411,7 +16282,7 @@
           <a:effectLst>
             <a:outerShdw blurRad="57150" rotWithShape="0" algn="bl" dir="5400000" dist="19050">
               <a:srgbClr val="000000">
-                <a:alpha val="47843"/>
+                <a:alpha val="47450"/>
               </a:srgbClr>
             </a:outerShdw>
           </a:effectLst>
@@ -16485,7 +16356,7 @@
           <a:effectLst>
             <a:outerShdw blurRad="57150" rotWithShape="0" algn="bl" dir="5400000" dist="19050">
               <a:srgbClr val="000000">
-                <a:alpha val="47843"/>
+                <a:alpha val="47450"/>
               </a:srgbClr>
             </a:outerShdw>
           </a:effectLst>
@@ -16559,7 +16430,7 @@
           <a:effectLst>
             <a:outerShdw blurRad="57150" rotWithShape="0" algn="bl" dir="5400000" dist="19050">
               <a:srgbClr val="000000">
-                <a:alpha val="47843"/>
+                <a:alpha val="47450"/>
               </a:srgbClr>
             </a:outerShdw>
           </a:effectLst>
@@ -16633,7 +16504,7 @@
           <a:effectLst>
             <a:outerShdw blurRad="57150" rotWithShape="0" algn="bl" dir="5400000" dist="19050">
               <a:srgbClr val="000000">
-                <a:alpha val="47843"/>
+                <a:alpha val="47450"/>
               </a:srgbClr>
             </a:outerShdw>
           </a:effectLst>
@@ -16707,7 +16578,7 @@
           <a:effectLst>
             <a:outerShdw blurRad="57150" rotWithShape="0" algn="bl" dir="5400000" dist="19050">
               <a:srgbClr val="000000">
-                <a:alpha val="47843"/>
+                <a:alpha val="47450"/>
               </a:srgbClr>
             </a:outerShdw>
           </a:effectLst>
@@ -16781,7 +16652,7 @@
           <a:effectLst>
             <a:outerShdw blurRad="57150" rotWithShape="0" algn="bl" dir="5400000" dist="19050">
               <a:srgbClr val="000000">
-                <a:alpha val="47843"/>
+                <a:alpha val="47450"/>
               </a:srgbClr>
             </a:outerShdw>
           </a:effectLst>
@@ -16855,7 +16726,7 @@
           <a:effectLst>
             <a:outerShdw blurRad="57150" rotWithShape="0" algn="bl" dir="5400000" dist="19050">
               <a:srgbClr val="000000">
-                <a:alpha val="47843"/>
+                <a:alpha val="47450"/>
               </a:srgbClr>
             </a:outerShdw>
           </a:effectLst>
@@ -16929,7 +16800,7 @@
           <a:effectLst>
             <a:outerShdw blurRad="57150" rotWithShape="0" algn="bl" dir="5400000" dist="19050">
               <a:srgbClr val="000000">
-                <a:alpha val="47843"/>
+                <a:alpha val="47450"/>
               </a:srgbClr>
             </a:outerShdw>
           </a:effectLst>
@@ -17003,7 +16874,7 @@
           <a:effectLst>
             <a:outerShdw blurRad="57150" rotWithShape="0" algn="bl" dir="5400000" dist="19050">
               <a:srgbClr val="000000">
-                <a:alpha val="47843"/>
+                <a:alpha val="47450"/>
               </a:srgbClr>
             </a:outerShdw>
           </a:effectLst>
@@ -17077,7 +16948,7 @@
           <a:effectLst>
             <a:outerShdw blurRad="57150" rotWithShape="0" algn="bl" dir="5400000" dist="19050">
               <a:srgbClr val="000000">
-                <a:alpha val="47843"/>
+                <a:alpha val="47450"/>
               </a:srgbClr>
             </a:outerShdw>
           </a:effectLst>
@@ -17151,7 +17022,7 @@
           <a:effectLst>
             <a:outerShdw blurRad="57150" rotWithShape="0" algn="bl" dir="5400000" dist="19050">
               <a:srgbClr val="000000">
-                <a:alpha val="47843"/>
+                <a:alpha val="47450"/>
               </a:srgbClr>
             </a:outerShdw>
           </a:effectLst>
@@ -17225,7 +17096,7 @@
           <a:effectLst>
             <a:outerShdw blurRad="57150" rotWithShape="0" algn="bl" dir="5400000" dist="19050">
               <a:srgbClr val="000000">
-                <a:alpha val="47843"/>
+                <a:alpha val="47450"/>
               </a:srgbClr>
             </a:outerShdw>
           </a:effectLst>
@@ -17614,7 +17485,7 @@
           <a:effectLst>
             <a:outerShdw blurRad="57150" rotWithShape="0" algn="bl" dir="5400000" dist="19050">
               <a:srgbClr val="000000">
-                <a:alpha val="47843"/>
+                <a:alpha val="47450"/>
               </a:srgbClr>
             </a:outerShdw>
           </a:effectLst>
@@ -17688,7 +17559,7 @@
           <a:effectLst>
             <a:outerShdw blurRad="57150" rotWithShape="0" algn="bl" dir="5400000" dist="19050">
               <a:srgbClr val="000000">
-                <a:alpha val="47843"/>
+                <a:alpha val="47450"/>
               </a:srgbClr>
             </a:outerShdw>
           </a:effectLst>
@@ -17762,7 +17633,7 @@
           <a:effectLst>
             <a:outerShdw blurRad="57150" rotWithShape="0" algn="bl" dir="5400000" dist="19050">
               <a:srgbClr val="000000">
-                <a:alpha val="47843"/>
+                <a:alpha val="47450"/>
               </a:srgbClr>
             </a:outerShdw>
           </a:effectLst>
@@ -17836,7 +17707,7 @@
           <a:effectLst>
             <a:outerShdw blurRad="57150" rotWithShape="0" algn="bl" dir="5400000" dist="19050">
               <a:srgbClr val="000000">
-                <a:alpha val="47843"/>
+                <a:alpha val="47450"/>
               </a:srgbClr>
             </a:outerShdw>
           </a:effectLst>
@@ -17910,7 +17781,7 @@
           <a:effectLst>
             <a:outerShdw blurRad="57150" rotWithShape="0" algn="bl" dir="5400000" dist="19050">
               <a:srgbClr val="000000">
-                <a:alpha val="47843"/>
+                <a:alpha val="47450"/>
               </a:srgbClr>
             </a:outerShdw>
           </a:effectLst>
@@ -17984,7 +17855,7 @@
           <a:effectLst>
             <a:outerShdw blurRad="57150" rotWithShape="0" algn="bl" dir="5400000" dist="19050">
               <a:srgbClr val="000000">
-                <a:alpha val="47843"/>
+                <a:alpha val="47450"/>
               </a:srgbClr>
             </a:outerShdw>
           </a:effectLst>
@@ -18058,7 +17929,7 @@
           <a:effectLst>
             <a:outerShdw blurRad="57150" rotWithShape="0" algn="bl" dir="5400000" dist="19050">
               <a:srgbClr val="000000">
-                <a:alpha val="47843"/>
+                <a:alpha val="47450"/>
               </a:srgbClr>
             </a:outerShdw>
           </a:effectLst>
@@ -18132,7 +18003,7 @@
           <a:effectLst>
             <a:outerShdw blurRad="57150" rotWithShape="0" algn="bl" dir="5400000" dist="19050">
               <a:srgbClr val="000000">
-                <a:alpha val="47843"/>
+                <a:alpha val="47450"/>
               </a:srgbClr>
             </a:outerShdw>
           </a:effectLst>
@@ -18206,7 +18077,7 @@
           <a:effectLst>
             <a:outerShdw blurRad="57150" rotWithShape="0" algn="bl" dir="5400000" dist="19050">
               <a:srgbClr val="000000">
-                <a:alpha val="47843"/>
+                <a:alpha val="47450"/>
               </a:srgbClr>
             </a:outerShdw>
           </a:effectLst>
@@ -18280,7 +18151,7 @@
           <a:effectLst>
             <a:outerShdw blurRad="57150" rotWithShape="0" algn="bl" dir="5400000" dist="19050">
               <a:srgbClr val="000000">
-                <a:alpha val="47843"/>
+                <a:alpha val="47450"/>
               </a:srgbClr>
             </a:outerShdw>
           </a:effectLst>
@@ -18354,7 +18225,7 @@
           <a:effectLst>
             <a:outerShdw blurRad="57150" rotWithShape="0" algn="bl" dir="5400000" dist="19050">
               <a:srgbClr val="000000">
-                <a:alpha val="47843"/>
+                <a:alpha val="47450"/>
               </a:srgbClr>
             </a:outerShdw>
           </a:effectLst>
@@ -18428,7 +18299,7 @@
           <a:effectLst>
             <a:outerShdw blurRad="57150" rotWithShape="0" algn="bl" dir="5400000" dist="19050">
               <a:srgbClr val="000000">
-                <a:alpha val="47843"/>
+                <a:alpha val="47450"/>
               </a:srgbClr>
             </a:outerShdw>
           </a:effectLst>
@@ -18502,7 +18373,7 @@
           <a:effectLst>
             <a:outerShdw blurRad="57150" rotWithShape="0" algn="bl" dir="5400000" dist="19050">
               <a:srgbClr val="000000">
-                <a:alpha val="47843"/>
+                <a:alpha val="47450"/>
               </a:srgbClr>
             </a:outerShdw>
           </a:effectLst>
@@ -18576,7 +18447,7 @@
           <a:effectLst>
             <a:outerShdw blurRad="57150" rotWithShape="0" algn="bl" dir="5400000" dist="19050">
               <a:srgbClr val="000000">
-                <a:alpha val="47843"/>
+                <a:alpha val="47450"/>
               </a:srgbClr>
             </a:outerShdw>
           </a:effectLst>
@@ -18650,7 +18521,7 @@
           <a:effectLst>
             <a:outerShdw blurRad="57150" rotWithShape="0" algn="bl" dir="5400000" dist="19050">
               <a:srgbClr val="000000">
-                <a:alpha val="47843"/>
+                <a:alpha val="47450"/>
               </a:srgbClr>
             </a:outerShdw>
           </a:effectLst>
@@ -18724,7 +18595,7 @@
           <a:effectLst>
             <a:outerShdw blurRad="57150" rotWithShape="0" algn="bl" dir="5400000" dist="19050">
               <a:srgbClr val="000000">
-                <a:alpha val="47843"/>
+                <a:alpha val="47450"/>
               </a:srgbClr>
             </a:outerShdw>
           </a:effectLst>
@@ -18798,7 +18669,7 @@
           <a:effectLst>
             <a:outerShdw blurRad="57150" rotWithShape="0" algn="bl" dir="5400000" dist="19050">
               <a:srgbClr val="000000">
-                <a:alpha val="47843"/>
+                <a:alpha val="47450"/>
               </a:srgbClr>
             </a:outerShdw>
           </a:effectLst>
@@ -18872,7 +18743,7 @@
           <a:effectLst>
             <a:outerShdw blurRad="57150" rotWithShape="0" algn="bl" dir="5400000" dist="19050">
               <a:srgbClr val="000000">
-                <a:alpha val="47843"/>
+                <a:alpha val="47450"/>
               </a:srgbClr>
             </a:outerShdw>
           </a:effectLst>
@@ -18946,7 +18817,7 @@
           <a:effectLst>
             <a:outerShdw blurRad="57150" rotWithShape="0" algn="bl" dir="5400000" dist="19050">
               <a:srgbClr val="000000">
-                <a:alpha val="47843"/>
+                <a:alpha val="47450"/>
               </a:srgbClr>
             </a:outerShdw>
           </a:effectLst>
@@ -19020,7 +18891,7 @@
           <a:effectLst>
             <a:outerShdw blurRad="57150" rotWithShape="0" algn="bl" dir="5400000" dist="19050">
               <a:srgbClr val="000000">
-                <a:alpha val="47843"/>
+                <a:alpha val="47450"/>
               </a:srgbClr>
             </a:outerShdw>
           </a:effectLst>
@@ -19094,7 +18965,7 @@
           <a:effectLst>
             <a:outerShdw blurRad="57150" rotWithShape="0" algn="bl" dir="5400000" dist="19050">
               <a:srgbClr val="000000">
-                <a:alpha val="47843"/>
+                <a:alpha val="47450"/>
               </a:srgbClr>
             </a:outerShdw>
           </a:effectLst>
@@ -19168,7 +19039,7 @@
           <a:effectLst>
             <a:outerShdw blurRad="57150" rotWithShape="0" algn="bl" dir="5400000" dist="19050">
               <a:srgbClr val="000000">
-                <a:alpha val="47843"/>
+                <a:alpha val="47450"/>
               </a:srgbClr>
             </a:outerShdw>
           </a:effectLst>
@@ -19242,7 +19113,7 @@
           <a:effectLst>
             <a:outerShdw blurRad="57150" rotWithShape="0" algn="bl" dir="5400000" dist="19050">
               <a:srgbClr val="000000">
-                <a:alpha val="47843"/>
+                <a:alpha val="47450"/>
               </a:srgbClr>
             </a:outerShdw>
           </a:effectLst>
@@ -19316,7 +19187,7 @@
           <a:effectLst>
             <a:outerShdw blurRad="57150" rotWithShape="0" algn="bl" dir="5400000" dist="19050">
               <a:srgbClr val="000000">
-                <a:alpha val="47843"/>
+                <a:alpha val="47450"/>
               </a:srgbClr>
             </a:outerShdw>
           </a:effectLst>
@@ -19390,7 +19261,7 @@
           <a:effectLst>
             <a:outerShdw blurRad="57150" rotWithShape="0" algn="bl" dir="5400000" dist="19050">
               <a:srgbClr val="000000">
-                <a:alpha val="47843"/>
+                <a:alpha val="47450"/>
               </a:srgbClr>
             </a:outerShdw>
           </a:effectLst>
@@ -19464,7 +19335,7 @@
           <a:effectLst>
             <a:outerShdw blurRad="57150" rotWithShape="0" algn="bl" dir="5400000" dist="19050">
               <a:srgbClr val="000000">
-                <a:alpha val="47843"/>
+                <a:alpha val="47450"/>
               </a:srgbClr>
             </a:outerShdw>
           </a:effectLst>
@@ -19538,7 +19409,7 @@
           <a:effectLst>
             <a:outerShdw blurRad="57150" rotWithShape="0" algn="bl" dir="5400000" dist="19050">
               <a:srgbClr val="000000">
-                <a:alpha val="47843"/>
+                <a:alpha val="47450"/>
               </a:srgbClr>
             </a:outerShdw>
           </a:effectLst>
@@ -23093,42 +22964,15 @@
           </a:p>
         </p:txBody>
       </p:sp>
-      <p:pic>
-        <p:nvPicPr>
-          <p:cNvPr id="99" name="Google Shape;99;g2031f0e9df4_0_9"/>
-          <p:cNvPicPr preferRelativeResize="0"/>
-          <p:nvPr/>
-        </p:nvPicPr>
-        <p:blipFill rotWithShape="1">
-          <a:blip r:embed="rId4">
-            <a:alphaModFix/>
-          </a:blip>
-          <a:srcRect b="0" l="0" r="0" t="0"/>
-          <a:stretch/>
-        </p:blipFill>
-        <p:spPr>
-          <a:xfrm>
-            <a:off x="0" y="7259705"/>
-            <a:ext cx="13004798" cy="2398645"/>
-          </a:xfrm>
-          <a:prstGeom prst="rect">
-            <a:avLst/>
-          </a:prstGeom>
-          <a:noFill/>
-          <a:ln>
-            <a:noFill/>
-          </a:ln>
-        </p:spPr>
-      </p:pic>
       <p:sp>
         <p:nvSpPr>
-          <p:cNvPr id="100" name="Google Shape;100;g2031f0e9df4_0_9"/>
+          <p:cNvPr id="99" name="Google Shape;99;g2031f0e9df4_0_9"/>
           <p:cNvSpPr txBox="1"/>
           <p:nvPr/>
         </p:nvSpPr>
         <p:spPr>
           <a:xfrm>
-            <a:off x="574975" y="6522600"/>
+            <a:off x="574975" y="6206050"/>
             <a:ext cx="11430300" cy="927600"/>
           </a:xfrm>
           <a:prstGeom prst="rect">
@@ -23186,6 +23030,34 @@
           </a:p>
         </p:txBody>
       </p:sp>
+      <p:pic>
+        <p:nvPicPr>
+          <p:cNvPr id="100" name="Google Shape;100;g2031f0e9df4_0_9"/>
+          <p:cNvPicPr preferRelativeResize="0"/>
+          <p:nvPr/>
+        </p:nvPicPr>
+        <p:blipFill>
+          <a:blip r:embed="rId4">
+            <a:alphaModFix/>
+          </a:blip>
+          <a:stretch>
+            <a:fillRect/>
+          </a:stretch>
+        </p:blipFill>
+        <p:spPr>
+          <a:xfrm>
+            <a:off x="610932" y="6694275"/>
+            <a:ext cx="11782935" cy="3142600"/>
+          </a:xfrm>
+          <a:prstGeom prst="rect">
+            <a:avLst/>
+          </a:prstGeom>
+          <a:noFill/>
+          <a:ln>
+            <a:noFill/>
+          </a:ln>
+        </p:spPr>
+      </p:pic>
     </p:spTree>
   </p:cSld>
   <p:clrMapOvr>

</xml_diff>

<commit_message>
Update MC VaR wkw to allow changing task number and node source in th… (#1316)
</commit_message>
<xml_diff>
--- a/Finance/resources/doc/risk-valuation-proactive.pptx
+++ b/Finance/resources/doc/risk-valuation-proactive.pptx
@@ -267,8 +267,8 @@
     </a:lvl9pPr>
   </p:defaultTextStyle>
   <p:extLst>
-    <p:ext uri="http://customooxmlschemas.google.com/">
-      <go:slidesCustomData xmlns:go="http://customooxmlschemas.google.com/" r:id="rId26" roundtripDataSignature="AMtx7mgLcIYSHxTYJrq1XrARL9zF5UBS/Q=="/>
+    <p:ext uri="GoogleSlidesCustomDataVersion2">
+      <go:slidesCustomData xmlns:go="http://customooxmlschemas.google.com/" r:id="rId26" roundtripDataSignature="AMtx7miUG9hGhwnYgyPDhGVjBW0SccQz4w=="/>
     </p:ext>
   </p:extLst>
 </p:presentation>
@@ -10426,13 +10426,12 @@
           <p:cNvPicPr preferRelativeResize="0"/>
           <p:nvPr/>
         </p:nvPicPr>
-        <p:blipFill>
+        <p:blipFill rotWithShape="1">
           <a:blip r:embed="rId3">
             <a:alphaModFix/>
           </a:blip>
-          <a:stretch>
-            <a:fillRect/>
-          </a:stretch>
+          <a:srcRect b="0" l="0" r="0" t="0"/>
+          <a:stretch/>
         </p:blipFill>
         <p:spPr>
           <a:xfrm>
@@ -10573,10 +10572,6 @@
               <a:buNone/>
             </a:pPr>
             <a:r>
-              <a:rPr lang="en-US" sz="1800"/>
-              <a:t>Generates all the combinations &lt;stressed risk free rate, stressed volatility&gt; according to their min,max,step user parameters. </a:t>
-            </a:r>
-            <a:r>
               <a:rPr b="0" i="0" lang="en-US" sz="1800" u="none" cap="none" strike="noStrike">
                 <a:solidFill>
                   <a:srgbClr val="000000"/>
@@ -10586,27 +10581,7 @@
                 <a:cs typeface="Arial"/>
                 <a:sym typeface="Arial"/>
               </a:rPr>
-              <a:t>The number of replicated tasks must divide the number of </a:t>
-            </a:r>
-            <a:r>
-              <a:rPr lang="en-US" sz="1800"/>
-              <a:t>combinations, i.e. the number of </a:t>
-            </a:r>
-            <a:r>
-              <a:rPr lang="en-US" sz="1800"/>
-              <a:t>scenarios</a:t>
-            </a:r>
-            <a:r>
-              <a:rPr b="0" i="0" lang="en-US" sz="1800" u="none" cap="none" strike="noStrike">
-                <a:solidFill>
-                  <a:srgbClr val="000000"/>
-                </a:solidFill>
-                <a:latin typeface="Arial"/>
-                <a:ea typeface="Arial"/>
-                <a:cs typeface="Arial"/>
-                <a:sym typeface="Arial"/>
-              </a:rPr>
-              <a:t> </a:t>
+              <a:t>Generates all the combinations &lt;stressed risk free rate, stressed volatility&gt; according to their min,max,step user parameters. The number of replicated tasks must divide the number of combinations, i.e. the number of scenarios </a:t>
             </a:r>
             <a:endParaRPr b="0" i="0" sz="1800" u="none" cap="none" strike="noStrike">
               <a:solidFill>
@@ -10730,10 +10705,6 @@
               <a:buNone/>
             </a:pPr>
             <a:r>
-              <a:rPr lang="en-US" sz="1800"/>
-              <a:t>E</a:t>
-            </a:r>
-            <a:r>
               <a:rPr b="0" i="0" lang="en-US" sz="1800" u="none" cap="none" strike="noStrike">
                 <a:solidFill>
                   <a:srgbClr val="000000"/>
@@ -10743,35 +10714,19 @@
                 <a:cs typeface="Arial"/>
                 <a:sym typeface="Arial"/>
               </a:rPr>
-              <a:t>ach replicated task processes a subset of the </a:t>
-            </a:r>
-            <a:r>
-              <a:rPr lang="en-US" sz="1800"/>
-              <a:t>scenarios</a:t>
+              <a:t>Each replicated task processes a subset of the scenarios and estimates per scenario, the mean/expected portfolio Profit and Loss (P&amp;L) over the given number of MC simulations. These simulations are processed in C++/Quantlib. Each task writes </a:t>
             </a:r>
             <a:r>
               <a:rPr b="0" i="0" lang="en-US" sz="1800" u="none" cap="none" strike="noStrike">
                 <a:solidFill>
-                  <a:srgbClr val="000000"/>
+                  <a:schemeClr val="dk1"/>
                 </a:solidFill>
                 <a:latin typeface="Arial"/>
                 <a:ea typeface="Arial"/>
                 <a:cs typeface="Arial"/>
                 <a:sym typeface="Arial"/>
               </a:rPr>
-              <a:t> and estimates</a:t>
-            </a:r>
-            <a:r>
-              <a:rPr lang="en-US" sz="1800"/>
-              <a:t> per </a:t>
-            </a:r>
-            <a:r>
-              <a:rPr lang="en-US" sz="1800"/>
-              <a:t>scenario, the mean/expected portfolio Profit and Loss (P&amp;L) over the given number of</a:t>
-            </a:r>
-            <a:r>
-              <a:rPr lang="en-US" sz="1800"/>
-              <a:t> </a:t>
+              <a:t>into a dedicated file </a:t>
             </a:r>
             <a:r>
               <a:rPr b="0" i="0" lang="en-US" sz="1800" u="none" cap="none" strike="noStrike">
@@ -10783,91 +10738,7 @@
                 <a:cs typeface="Arial"/>
                 <a:sym typeface="Arial"/>
               </a:rPr>
-              <a:t>MC simulations. These </a:t>
-            </a:r>
-            <a:r>
-              <a:rPr lang="en-US" sz="1800"/>
-              <a:t>simulations</a:t>
-            </a:r>
-            <a:r>
-              <a:rPr b="0" i="0" lang="en-US" sz="1800" u="none" cap="none" strike="noStrike">
-                <a:solidFill>
-                  <a:srgbClr val="000000"/>
-                </a:solidFill>
-                <a:latin typeface="Arial"/>
-                <a:ea typeface="Arial"/>
-                <a:cs typeface="Arial"/>
-                <a:sym typeface="Arial"/>
-              </a:rPr>
-              <a:t> are proc</a:t>
-            </a:r>
-            <a:r>
-              <a:rPr lang="en-US" sz="1800"/>
-              <a:t>essed in C++/Quantlib.</a:t>
-            </a:r>
-            <a:r>
-              <a:rPr b="0" i="0" lang="en-US" sz="1800" u="none" cap="none" strike="noStrike">
-                <a:solidFill>
-                  <a:srgbClr val="000000"/>
-                </a:solidFill>
-                <a:latin typeface="Arial"/>
-                <a:ea typeface="Arial"/>
-                <a:cs typeface="Arial"/>
-                <a:sym typeface="Arial"/>
-              </a:rPr>
-              <a:t> Each task writes </a:t>
-            </a:r>
-            <a:r>
-              <a:rPr lang="en-US" sz="1800">
-                <a:solidFill>
-                  <a:schemeClr val="dk1"/>
-                </a:solidFill>
-              </a:rPr>
-              <a:t>into a dedicated file </a:t>
-            </a:r>
-            <a:r>
-              <a:rPr b="0" i="0" lang="en-US" sz="1800" u="none" cap="none" strike="noStrike">
-                <a:solidFill>
-                  <a:srgbClr val="000000"/>
-                </a:solidFill>
-                <a:latin typeface="Arial"/>
-                <a:ea typeface="Arial"/>
-                <a:cs typeface="Arial"/>
-                <a:sym typeface="Arial"/>
-              </a:rPr>
-              <a:t>all its estimated P</a:t>
-            </a:r>
-            <a:r>
-              <a:rPr lang="en-US" sz="1800"/>
-              <a:t>&amp;</a:t>
-            </a:r>
-            <a:r>
-              <a:rPr b="0" i="0" lang="en-US" sz="1800" u="none" cap="none" strike="noStrike">
-                <a:solidFill>
-                  <a:srgbClr val="000000"/>
-                </a:solidFill>
-                <a:latin typeface="Arial"/>
-                <a:ea typeface="Arial"/>
-                <a:cs typeface="Arial"/>
-                <a:sym typeface="Arial"/>
-              </a:rPr>
-              <a:t>Ls</a:t>
-            </a:r>
-            <a:r>
-              <a:rPr lang="en-US" sz="1800"/>
-              <a:t> (</a:t>
-            </a:r>
-            <a:r>
-              <a:rPr b="0" i="0" lang="en-US" sz="1800" u="none" cap="none" strike="noStrike">
-                <a:solidFill>
-                  <a:srgbClr val="000000"/>
-                </a:solidFill>
-                <a:latin typeface="Arial"/>
-                <a:ea typeface="Arial"/>
-                <a:cs typeface="Arial"/>
-                <a:sym typeface="Arial"/>
-              </a:rPr>
-              <a:t>a P&amp;L per senario) </a:t>
+              <a:t>all its estimated P&amp;Ls (a P&amp;L per senario) </a:t>
             </a:r>
             <a:endParaRPr b="0" i="0" sz="1800" u="none" cap="none" strike="noStrike">
               <a:solidFill>
@@ -11867,7 +11738,7 @@
           <a:effectLst>
             <a:outerShdw blurRad="57150" rotWithShape="0" algn="bl" dir="5400000" dist="19050">
               <a:srgbClr val="000000">
-                <a:alpha val="47843"/>
+                <a:alpha val="47450"/>
               </a:srgbClr>
             </a:outerShdw>
           </a:effectLst>
@@ -11941,7 +11812,7 @@
           <a:effectLst>
             <a:outerShdw blurRad="57150" rotWithShape="0" algn="bl" dir="5400000" dist="19050">
               <a:srgbClr val="000000">
-                <a:alpha val="47843"/>
+                <a:alpha val="47450"/>
               </a:srgbClr>
             </a:outerShdw>
           </a:effectLst>
@@ -12015,7 +11886,7 @@
           <a:effectLst>
             <a:outerShdw blurRad="57150" rotWithShape="0" algn="bl" dir="5400000" dist="19050">
               <a:srgbClr val="000000">
-                <a:alpha val="47843"/>
+                <a:alpha val="47450"/>
               </a:srgbClr>
             </a:outerShdw>
           </a:effectLst>
@@ -12089,7 +11960,7 @@
           <a:effectLst>
             <a:outerShdw blurRad="57150" rotWithShape="0" algn="bl" dir="5400000" dist="19050">
               <a:srgbClr val="000000">
-                <a:alpha val="47843"/>
+                <a:alpha val="47450"/>
               </a:srgbClr>
             </a:outerShdw>
           </a:effectLst>
@@ -12163,7 +12034,7 @@
           <a:effectLst>
             <a:outerShdw blurRad="57150" rotWithShape="0" algn="bl" dir="5400000" dist="19050">
               <a:srgbClr val="000000">
-                <a:alpha val="47843"/>
+                <a:alpha val="47450"/>
               </a:srgbClr>
             </a:outerShdw>
           </a:effectLst>
@@ -12237,7 +12108,7 @@
           <a:effectLst>
             <a:outerShdw blurRad="57150" rotWithShape="0" algn="bl" dir="5400000" dist="19050">
               <a:srgbClr val="000000">
-                <a:alpha val="47843"/>
+                <a:alpha val="47450"/>
               </a:srgbClr>
             </a:outerShdw>
           </a:effectLst>
@@ -12311,7 +12182,7 @@
           <a:effectLst>
             <a:outerShdw blurRad="57150" rotWithShape="0" algn="bl" dir="5400000" dist="19050">
               <a:srgbClr val="000000">
-                <a:alpha val="47843"/>
+                <a:alpha val="47450"/>
               </a:srgbClr>
             </a:outerShdw>
           </a:effectLst>
@@ -12385,7 +12256,7 @@
           <a:effectLst>
             <a:outerShdw blurRad="57150" rotWithShape="0" algn="bl" dir="5400000" dist="19050">
               <a:srgbClr val="000000">
-                <a:alpha val="47843"/>
+                <a:alpha val="47450"/>
               </a:srgbClr>
             </a:outerShdw>
           </a:effectLst>
@@ -12459,7 +12330,7 @@
           <a:effectLst>
             <a:outerShdw blurRad="57150" rotWithShape="0" algn="bl" dir="5400000" dist="19050">
               <a:srgbClr val="000000">
-                <a:alpha val="47843"/>
+                <a:alpha val="47450"/>
               </a:srgbClr>
             </a:outerShdw>
           </a:effectLst>
@@ -12533,7 +12404,7 @@
           <a:effectLst>
             <a:outerShdw blurRad="57150" rotWithShape="0" algn="bl" dir="5400000" dist="19050">
               <a:srgbClr val="000000">
-                <a:alpha val="47843"/>
+                <a:alpha val="47450"/>
               </a:srgbClr>
             </a:outerShdw>
           </a:effectLst>
@@ -12607,7 +12478,7 @@
           <a:effectLst>
             <a:outerShdw blurRad="57150" rotWithShape="0" algn="bl" dir="5400000" dist="19050">
               <a:srgbClr val="000000">
-                <a:alpha val="47843"/>
+                <a:alpha val="47450"/>
               </a:srgbClr>
             </a:outerShdw>
           </a:effectLst>
@@ -12681,7 +12552,7 @@
           <a:effectLst>
             <a:outerShdw blurRad="57150" rotWithShape="0" algn="bl" dir="5400000" dist="19050">
               <a:srgbClr val="000000">
-                <a:alpha val="47843"/>
+                <a:alpha val="47450"/>
               </a:srgbClr>
             </a:outerShdw>
           </a:effectLst>
@@ -12755,7 +12626,7 @@
           <a:effectLst>
             <a:outerShdw blurRad="57150" rotWithShape="0" algn="bl" dir="5400000" dist="19050">
               <a:srgbClr val="000000">
-                <a:alpha val="47843"/>
+                <a:alpha val="47450"/>
               </a:srgbClr>
             </a:outerShdw>
           </a:effectLst>
@@ -12829,7 +12700,7 @@
           <a:effectLst>
             <a:outerShdw blurRad="57150" rotWithShape="0" algn="bl" dir="5400000" dist="19050">
               <a:srgbClr val="000000">
-                <a:alpha val="47843"/>
+                <a:alpha val="47450"/>
               </a:srgbClr>
             </a:outerShdw>
           </a:effectLst>
@@ -12903,7 +12774,7 @@
           <a:effectLst>
             <a:outerShdw blurRad="57150" rotWithShape="0" algn="bl" dir="5400000" dist="19050">
               <a:srgbClr val="000000">
-                <a:alpha val="47843"/>
+                <a:alpha val="47450"/>
               </a:srgbClr>
             </a:outerShdw>
           </a:effectLst>
@@ -12977,7 +12848,7 @@
           <a:effectLst>
             <a:outerShdw blurRad="57150" rotWithShape="0" algn="bl" dir="5400000" dist="19050">
               <a:srgbClr val="000000">
-                <a:alpha val="47843"/>
+                <a:alpha val="47450"/>
               </a:srgbClr>
             </a:outerShdw>
           </a:effectLst>
@@ -13051,7 +12922,7 @@
           <a:effectLst>
             <a:outerShdw blurRad="57150" rotWithShape="0" algn="bl" dir="5400000" dist="19050">
               <a:srgbClr val="000000">
-                <a:alpha val="47843"/>
+                <a:alpha val="47450"/>
               </a:srgbClr>
             </a:outerShdw>
           </a:effectLst>
@@ -13125,7 +12996,7 @@
           <a:effectLst>
             <a:outerShdw blurRad="57150" rotWithShape="0" algn="bl" dir="5400000" dist="19050">
               <a:srgbClr val="000000">
-                <a:alpha val="47843"/>
+                <a:alpha val="47450"/>
               </a:srgbClr>
             </a:outerShdw>
           </a:effectLst>
@@ -13199,7 +13070,7 @@
           <a:effectLst>
             <a:outerShdw blurRad="57150" rotWithShape="0" algn="bl" dir="5400000" dist="19050">
               <a:srgbClr val="000000">
-                <a:alpha val="47843"/>
+                <a:alpha val="47450"/>
               </a:srgbClr>
             </a:outerShdw>
           </a:effectLst>
@@ -13273,7 +13144,7 @@
           <a:effectLst>
             <a:outerShdw blurRad="57150" rotWithShape="0" algn="bl" dir="5400000" dist="19050">
               <a:srgbClr val="000000">
-                <a:alpha val="47843"/>
+                <a:alpha val="47450"/>
               </a:srgbClr>
             </a:outerShdw>
           </a:effectLst>
@@ -13347,7 +13218,7 @@
           <a:effectLst>
             <a:outerShdw blurRad="57150" rotWithShape="0" algn="bl" dir="5400000" dist="19050">
               <a:srgbClr val="000000">
-                <a:alpha val="47843"/>
+                <a:alpha val="47450"/>
               </a:srgbClr>
             </a:outerShdw>
           </a:effectLst>
@@ -13421,7 +13292,7 @@
           <a:effectLst>
             <a:outerShdw blurRad="57150" rotWithShape="0" algn="bl" dir="5400000" dist="19050">
               <a:srgbClr val="000000">
-                <a:alpha val="47843"/>
+                <a:alpha val="47450"/>
               </a:srgbClr>
             </a:outerShdw>
           </a:effectLst>
@@ -13495,7 +13366,7 @@
           <a:effectLst>
             <a:outerShdw blurRad="57150" rotWithShape="0" algn="bl" dir="5400000" dist="19050">
               <a:srgbClr val="000000">
-                <a:alpha val="47843"/>
+                <a:alpha val="47450"/>
               </a:srgbClr>
             </a:outerShdw>
           </a:effectLst>
@@ -13569,7 +13440,7 @@
           <a:effectLst>
             <a:outerShdw blurRad="57150" rotWithShape="0" algn="bl" dir="5400000" dist="19050">
               <a:srgbClr val="000000">
-                <a:alpha val="47843"/>
+                <a:alpha val="47450"/>
               </a:srgbClr>
             </a:outerShdw>
           </a:effectLst>
@@ -13643,7 +13514,7 @@
           <a:effectLst>
             <a:outerShdw blurRad="57150" rotWithShape="0" algn="bl" dir="5400000" dist="19050">
               <a:srgbClr val="000000">
-                <a:alpha val="47843"/>
+                <a:alpha val="47450"/>
               </a:srgbClr>
             </a:outerShdw>
           </a:effectLst>
@@ -13717,7 +13588,7 @@
           <a:effectLst>
             <a:outerShdw blurRad="57150" rotWithShape="0" algn="bl" dir="5400000" dist="19050">
               <a:srgbClr val="000000">
-                <a:alpha val="47843"/>
+                <a:alpha val="47450"/>
               </a:srgbClr>
             </a:outerShdw>
           </a:effectLst>
@@ -13791,7 +13662,7 @@
           <a:effectLst>
             <a:outerShdw blurRad="57150" rotWithShape="0" algn="bl" dir="5400000" dist="19050">
               <a:srgbClr val="000000">
-                <a:alpha val="47843"/>
+                <a:alpha val="47450"/>
               </a:srgbClr>
             </a:outerShdw>
           </a:effectLst>
@@ -13865,7 +13736,7 @@
           <a:effectLst>
             <a:outerShdw blurRad="57150" rotWithShape="0" algn="bl" dir="5400000" dist="19050">
               <a:srgbClr val="000000">
-                <a:alpha val="47843"/>
+                <a:alpha val="47450"/>
               </a:srgbClr>
             </a:outerShdw>
           </a:effectLst>
@@ -13939,7 +13810,7 @@
           <a:effectLst>
             <a:outerShdw blurRad="57150" rotWithShape="0" algn="bl" dir="5400000" dist="19050">
               <a:srgbClr val="000000">
-                <a:alpha val="47843"/>
+                <a:alpha val="47450"/>
               </a:srgbClr>
             </a:outerShdw>
           </a:effectLst>
@@ -14013,7 +13884,7 @@
           <a:effectLst>
             <a:outerShdw blurRad="57150" rotWithShape="0" algn="bl" dir="5400000" dist="19050">
               <a:srgbClr val="000000">
-                <a:alpha val="47843"/>
+                <a:alpha val="47450"/>
               </a:srgbClr>
             </a:outerShdw>
           </a:effectLst>
@@ -14087,7 +13958,7 @@
           <a:effectLst>
             <a:outerShdw blurRad="57150" rotWithShape="0" algn="bl" dir="5400000" dist="19050">
               <a:srgbClr val="000000">
-                <a:alpha val="47843"/>
+                <a:alpha val="47450"/>
               </a:srgbClr>
             </a:outerShdw>
           </a:effectLst>
@@ -14161,7 +14032,7 @@
           <a:effectLst>
             <a:outerShdw blurRad="57150" rotWithShape="0" algn="bl" dir="5400000" dist="19050">
               <a:srgbClr val="000000">
-                <a:alpha val="47843"/>
+                <a:alpha val="47450"/>
               </a:srgbClr>
             </a:outerShdw>
           </a:effectLst>
@@ -14235,7 +14106,7 @@
           <a:effectLst>
             <a:outerShdw blurRad="57150" rotWithShape="0" algn="bl" dir="5400000" dist="19050">
               <a:srgbClr val="000000">
-                <a:alpha val="47843"/>
+                <a:alpha val="47450"/>
               </a:srgbClr>
             </a:outerShdw>
           </a:effectLst>
@@ -14309,7 +14180,7 @@
           <a:effectLst>
             <a:outerShdw blurRad="57150" rotWithShape="0" algn="bl" dir="5400000" dist="19050">
               <a:srgbClr val="000000">
-                <a:alpha val="47843"/>
+                <a:alpha val="47450"/>
               </a:srgbClr>
             </a:outerShdw>
           </a:effectLst>
@@ -14383,7 +14254,7 @@
           <a:effectLst>
             <a:outerShdw blurRad="57150" rotWithShape="0" algn="bl" dir="5400000" dist="19050">
               <a:srgbClr val="000000">
-                <a:alpha val="47843"/>
+                <a:alpha val="47450"/>
               </a:srgbClr>
             </a:outerShdw>
           </a:effectLst>
@@ -14457,7 +14328,7 @@
           <a:effectLst>
             <a:outerShdw blurRad="57150" rotWithShape="0" algn="bl" dir="5400000" dist="19050">
               <a:srgbClr val="000000">
-                <a:alpha val="47843"/>
+                <a:alpha val="47450"/>
               </a:srgbClr>
             </a:outerShdw>
           </a:effectLst>
@@ -14531,7 +14402,7 @@
           <a:effectLst>
             <a:outerShdw blurRad="57150" rotWithShape="0" algn="bl" dir="5400000" dist="19050">
               <a:srgbClr val="000000">
-                <a:alpha val="47843"/>
+                <a:alpha val="47450"/>
               </a:srgbClr>
             </a:outerShdw>
           </a:effectLst>
@@ -14605,7 +14476,7 @@
           <a:effectLst>
             <a:outerShdw blurRad="57150" rotWithShape="0" algn="bl" dir="5400000" dist="19050">
               <a:srgbClr val="000000">
-                <a:alpha val="47843"/>
+                <a:alpha val="47450"/>
               </a:srgbClr>
             </a:outerShdw>
           </a:effectLst>
@@ -14679,7 +14550,7 @@
           <a:effectLst>
             <a:outerShdw blurRad="57150" rotWithShape="0" algn="bl" dir="5400000" dist="19050">
               <a:srgbClr val="000000">
-                <a:alpha val="47843"/>
+                <a:alpha val="47450"/>
               </a:srgbClr>
             </a:outerShdw>
           </a:effectLst>
@@ -14753,7 +14624,7 @@
           <a:effectLst>
             <a:outerShdw blurRad="57150" rotWithShape="0" algn="bl" dir="5400000" dist="19050">
               <a:srgbClr val="000000">
-                <a:alpha val="47843"/>
+                <a:alpha val="47450"/>
               </a:srgbClr>
             </a:outerShdw>
           </a:effectLst>
@@ -14827,7 +14698,7 @@
           <a:effectLst>
             <a:outerShdw blurRad="57150" rotWithShape="0" algn="bl" dir="5400000" dist="19050">
               <a:srgbClr val="000000">
-                <a:alpha val="47843"/>
+                <a:alpha val="47450"/>
               </a:srgbClr>
             </a:outerShdw>
           </a:effectLst>
@@ -14901,7 +14772,7 @@
           <a:effectLst>
             <a:outerShdw blurRad="57150" rotWithShape="0" algn="bl" dir="5400000" dist="19050">
               <a:srgbClr val="000000">
-                <a:alpha val="47843"/>
+                <a:alpha val="47450"/>
               </a:srgbClr>
             </a:outerShdw>
           </a:effectLst>
@@ -14975,7 +14846,7 @@
           <a:effectLst>
             <a:outerShdw blurRad="57150" rotWithShape="0" algn="bl" dir="5400000" dist="19050">
               <a:srgbClr val="000000">
-                <a:alpha val="47843"/>
+                <a:alpha val="47450"/>
               </a:srgbClr>
             </a:outerShdw>
           </a:effectLst>
@@ -15049,7 +14920,7 @@
           <a:effectLst>
             <a:outerShdw blurRad="57150" rotWithShape="0" algn="bl" dir="5400000" dist="19050">
               <a:srgbClr val="000000">
-                <a:alpha val="47843"/>
+                <a:alpha val="47450"/>
               </a:srgbClr>
             </a:outerShdw>
           </a:effectLst>
@@ -15579,7 +15450,7 @@
           <a:effectLst>
             <a:outerShdw blurRad="57150" rotWithShape="0" algn="bl" dir="5400000" dist="19050">
               <a:srgbClr val="000000">
-                <a:alpha val="47843"/>
+                <a:alpha val="47450"/>
               </a:srgbClr>
             </a:outerShdw>
           </a:effectLst>
@@ -15653,7 +15524,7 @@
           <a:effectLst>
             <a:outerShdw blurRad="57150" rotWithShape="0" algn="bl" dir="5400000" dist="19050">
               <a:srgbClr val="000000">
-                <a:alpha val="47843"/>
+                <a:alpha val="47450"/>
               </a:srgbClr>
             </a:outerShdw>
           </a:effectLst>
@@ -15727,7 +15598,7 @@
           <a:effectLst>
             <a:outerShdw blurRad="57150" rotWithShape="0" algn="bl" dir="5400000" dist="19050">
               <a:srgbClr val="000000">
-                <a:alpha val="47843"/>
+                <a:alpha val="47450"/>
               </a:srgbClr>
             </a:outerShdw>
           </a:effectLst>
@@ -15801,7 +15672,7 @@
           <a:effectLst>
             <a:outerShdw blurRad="57150" rotWithShape="0" algn="bl" dir="5400000" dist="19050">
               <a:srgbClr val="000000">
-                <a:alpha val="47843"/>
+                <a:alpha val="47450"/>
               </a:srgbClr>
             </a:outerShdw>
           </a:effectLst>
@@ -15875,7 +15746,7 @@
           <a:effectLst>
             <a:outerShdw blurRad="57150" rotWithShape="0" algn="bl" dir="5400000" dist="19050">
               <a:srgbClr val="000000">
-                <a:alpha val="47843"/>
+                <a:alpha val="47450"/>
               </a:srgbClr>
             </a:outerShdw>
           </a:effectLst>
@@ -15949,7 +15820,7 @@
           <a:effectLst>
             <a:outerShdw blurRad="57150" rotWithShape="0" algn="bl" dir="5400000" dist="19050">
               <a:srgbClr val="000000">
-                <a:alpha val="47843"/>
+                <a:alpha val="47450"/>
               </a:srgbClr>
             </a:outerShdw>
           </a:effectLst>
@@ -16023,7 +15894,7 @@
           <a:effectLst>
             <a:outerShdw blurRad="57150" rotWithShape="0" algn="bl" dir="5400000" dist="19050">
               <a:srgbClr val="000000">
-                <a:alpha val="47843"/>
+                <a:alpha val="47450"/>
               </a:srgbClr>
             </a:outerShdw>
           </a:effectLst>
@@ -16097,7 +15968,7 @@
           <a:effectLst>
             <a:outerShdw blurRad="57150" rotWithShape="0" algn="bl" dir="5400000" dist="19050">
               <a:srgbClr val="000000">
-                <a:alpha val="47843"/>
+                <a:alpha val="47450"/>
               </a:srgbClr>
             </a:outerShdw>
           </a:effectLst>
@@ -16171,7 +16042,7 @@
           <a:effectLst>
             <a:outerShdw blurRad="57150" rotWithShape="0" algn="bl" dir="5400000" dist="19050">
               <a:srgbClr val="000000">
-                <a:alpha val="47843"/>
+                <a:alpha val="47450"/>
               </a:srgbClr>
             </a:outerShdw>
           </a:effectLst>
@@ -16337,7 +16208,7 @@
           <a:effectLst>
             <a:outerShdw blurRad="57150" rotWithShape="0" algn="bl" dir="5400000" dist="19050">
               <a:srgbClr val="000000">
-                <a:alpha val="47843"/>
+                <a:alpha val="47450"/>
               </a:srgbClr>
             </a:outerShdw>
           </a:effectLst>
@@ -16411,7 +16282,7 @@
           <a:effectLst>
             <a:outerShdw blurRad="57150" rotWithShape="0" algn="bl" dir="5400000" dist="19050">
               <a:srgbClr val="000000">
-                <a:alpha val="47843"/>
+                <a:alpha val="47450"/>
               </a:srgbClr>
             </a:outerShdw>
           </a:effectLst>
@@ -16485,7 +16356,7 @@
           <a:effectLst>
             <a:outerShdw blurRad="57150" rotWithShape="0" algn="bl" dir="5400000" dist="19050">
               <a:srgbClr val="000000">
-                <a:alpha val="47843"/>
+                <a:alpha val="47450"/>
               </a:srgbClr>
             </a:outerShdw>
           </a:effectLst>
@@ -16559,7 +16430,7 @@
           <a:effectLst>
             <a:outerShdw blurRad="57150" rotWithShape="0" algn="bl" dir="5400000" dist="19050">
               <a:srgbClr val="000000">
-                <a:alpha val="47843"/>
+                <a:alpha val="47450"/>
               </a:srgbClr>
             </a:outerShdw>
           </a:effectLst>
@@ -16633,7 +16504,7 @@
           <a:effectLst>
             <a:outerShdw blurRad="57150" rotWithShape="0" algn="bl" dir="5400000" dist="19050">
               <a:srgbClr val="000000">
-                <a:alpha val="47843"/>
+                <a:alpha val="47450"/>
               </a:srgbClr>
             </a:outerShdw>
           </a:effectLst>
@@ -16707,7 +16578,7 @@
           <a:effectLst>
             <a:outerShdw blurRad="57150" rotWithShape="0" algn="bl" dir="5400000" dist="19050">
               <a:srgbClr val="000000">
-                <a:alpha val="47843"/>
+                <a:alpha val="47450"/>
               </a:srgbClr>
             </a:outerShdw>
           </a:effectLst>
@@ -16781,7 +16652,7 @@
           <a:effectLst>
             <a:outerShdw blurRad="57150" rotWithShape="0" algn="bl" dir="5400000" dist="19050">
               <a:srgbClr val="000000">
-                <a:alpha val="47843"/>
+                <a:alpha val="47450"/>
               </a:srgbClr>
             </a:outerShdw>
           </a:effectLst>
@@ -16855,7 +16726,7 @@
           <a:effectLst>
             <a:outerShdw blurRad="57150" rotWithShape="0" algn="bl" dir="5400000" dist="19050">
               <a:srgbClr val="000000">
-                <a:alpha val="47843"/>
+                <a:alpha val="47450"/>
               </a:srgbClr>
             </a:outerShdw>
           </a:effectLst>
@@ -16929,7 +16800,7 @@
           <a:effectLst>
             <a:outerShdw blurRad="57150" rotWithShape="0" algn="bl" dir="5400000" dist="19050">
               <a:srgbClr val="000000">
-                <a:alpha val="47843"/>
+                <a:alpha val="47450"/>
               </a:srgbClr>
             </a:outerShdw>
           </a:effectLst>
@@ -17003,7 +16874,7 @@
           <a:effectLst>
             <a:outerShdw blurRad="57150" rotWithShape="0" algn="bl" dir="5400000" dist="19050">
               <a:srgbClr val="000000">
-                <a:alpha val="47843"/>
+                <a:alpha val="47450"/>
               </a:srgbClr>
             </a:outerShdw>
           </a:effectLst>
@@ -17077,7 +16948,7 @@
           <a:effectLst>
             <a:outerShdw blurRad="57150" rotWithShape="0" algn="bl" dir="5400000" dist="19050">
               <a:srgbClr val="000000">
-                <a:alpha val="47843"/>
+                <a:alpha val="47450"/>
               </a:srgbClr>
             </a:outerShdw>
           </a:effectLst>
@@ -17151,7 +17022,7 @@
           <a:effectLst>
             <a:outerShdw blurRad="57150" rotWithShape="0" algn="bl" dir="5400000" dist="19050">
               <a:srgbClr val="000000">
-                <a:alpha val="47843"/>
+                <a:alpha val="47450"/>
               </a:srgbClr>
             </a:outerShdw>
           </a:effectLst>
@@ -17225,7 +17096,7 @@
           <a:effectLst>
             <a:outerShdw blurRad="57150" rotWithShape="0" algn="bl" dir="5400000" dist="19050">
               <a:srgbClr val="000000">
-                <a:alpha val="47843"/>
+                <a:alpha val="47450"/>
               </a:srgbClr>
             </a:outerShdw>
           </a:effectLst>
@@ -17614,7 +17485,7 @@
           <a:effectLst>
             <a:outerShdw blurRad="57150" rotWithShape="0" algn="bl" dir="5400000" dist="19050">
               <a:srgbClr val="000000">
-                <a:alpha val="47843"/>
+                <a:alpha val="47450"/>
               </a:srgbClr>
             </a:outerShdw>
           </a:effectLst>
@@ -17688,7 +17559,7 @@
           <a:effectLst>
             <a:outerShdw blurRad="57150" rotWithShape="0" algn="bl" dir="5400000" dist="19050">
               <a:srgbClr val="000000">
-                <a:alpha val="47843"/>
+                <a:alpha val="47450"/>
               </a:srgbClr>
             </a:outerShdw>
           </a:effectLst>
@@ -17762,7 +17633,7 @@
           <a:effectLst>
             <a:outerShdw blurRad="57150" rotWithShape="0" algn="bl" dir="5400000" dist="19050">
               <a:srgbClr val="000000">
-                <a:alpha val="47843"/>
+                <a:alpha val="47450"/>
               </a:srgbClr>
             </a:outerShdw>
           </a:effectLst>
@@ -17836,7 +17707,7 @@
           <a:effectLst>
             <a:outerShdw blurRad="57150" rotWithShape="0" algn="bl" dir="5400000" dist="19050">
               <a:srgbClr val="000000">
-                <a:alpha val="47843"/>
+                <a:alpha val="47450"/>
               </a:srgbClr>
             </a:outerShdw>
           </a:effectLst>
@@ -17910,7 +17781,7 @@
           <a:effectLst>
             <a:outerShdw blurRad="57150" rotWithShape="0" algn="bl" dir="5400000" dist="19050">
               <a:srgbClr val="000000">
-                <a:alpha val="47843"/>
+                <a:alpha val="47450"/>
               </a:srgbClr>
             </a:outerShdw>
           </a:effectLst>
@@ -17984,7 +17855,7 @@
           <a:effectLst>
             <a:outerShdw blurRad="57150" rotWithShape="0" algn="bl" dir="5400000" dist="19050">
               <a:srgbClr val="000000">
-                <a:alpha val="47843"/>
+                <a:alpha val="47450"/>
               </a:srgbClr>
             </a:outerShdw>
           </a:effectLst>
@@ -18058,7 +17929,7 @@
           <a:effectLst>
             <a:outerShdw blurRad="57150" rotWithShape="0" algn="bl" dir="5400000" dist="19050">
               <a:srgbClr val="000000">
-                <a:alpha val="47843"/>
+                <a:alpha val="47450"/>
               </a:srgbClr>
             </a:outerShdw>
           </a:effectLst>
@@ -18132,7 +18003,7 @@
           <a:effectLst>
             <a:outerShdw blurRad="57150" rotWithShape="0" algn="bl" dir="5400000" dist="19050">
               <a:srgbClr val="000000">
-                <a:alpha val="47843"/>
+                <a:alpha val="47450"/>
               </a:srgbClr>
             </a:outerShdw>
           </a:effectLst>
@@ -18206,7 +18077,7 @@
           <a:effectLst>
             <a:outerShdw blurRad="57150" rotWithShape="0" algn="bl" dir="5400000" dist="19050">
               <a:srgbClr val="000000">
-                <a:alpha val="47843"/>
+                <a:alpha val="47450"/>
               </a:srgbClr>
             </a:outerShdw>
           </a:effectLst>
@@ -18280,7 +18151,7 @@
           <a:effectLst>
             <a:outerShdw blurRad="57150" rotWithShape="0" algn="bl" dir="5400000" dist="19050">
               <a:srgbClr val="000000">
-                <a:alpha val="47843"/>
+                <a:alpha val="47450"/>
               </a:srgbClr>
             </a:outerShdw>
           </a:effectLst>
@@ -18354,7 +18225,7 @@
           <a:effectLst>
             <a:outerShdw blurRad="57150" rotWithShape="0" algn="bl" dir="5400000" dist="19050">
               <a:srgbClr val="000000">
-                <a:alpha val="47843"/>
+                <a:alpha val="47450"/>
               </a:srgbClr>
             </a:outerShdw>
           </a:effectLst>
@@ -18428,7 +18299,7 @@
           <a:effectLst>
             <a:outerShdw blurRad="57150" rotWithShape="0" algn="bl" dir="5400000" dist="19050">
               <a:srgbClr val="000000">
-                <a:alpha val="47843"/>
+                <a:alpha val="47450"/>
               </a:srgbClr>
             </a:outerShdw>
           </a:effectLst>
@@ -18502,7 +18373,7 @@
           <a:effectLst>
             <a:outerShdw blurRad="57150" rotWithShape="0" algn="bl" dir="5400000" dist="19050">
               <a:srgbClr val="000000">
-                <a:alpha val="47843"/>
+                <a:alpha val="47450"/>
               </a:srgbClr>
             </a:outerShdw>
           </a:effectLst>
@@ -18576,7 +18447,7 @@
           <a:effectLst>
             <a:outerShdw blurRad="57150" rotWithShape="0" algn="bl" dir="5400000" dist="19050">
               <a:srgbClr val="000000">
-                <a:alpha val="47843"/>
+                <a:alpha val="47450"/>
               </a:srgbClr>
             </a:outerShdw>
           </a:effectLst>
@@ -18650,7 +18521,7 @@
           <a:effectLst>
             <a:outerShdw blurRad="57150" rotWithShape="0" algn="bl" dir="5400000" dist="19050">
               <a:srgbClr val="000000">
-                <a:alpha val="47843"/>
+                <a:alpha val="47450"/>
               </a:srgbClr>
             </a:outerShdw>
           </a:effectLst>
@@ -18724,7 +18595,7 @@
           <a:effectLst>
             <a:outerShdw blurRad="57150" rotWithShape="0" algn="bl" dir="5400000" dist="19050">
               <a:srgbClr val="000000">
-                <a:alpha val="47843"/>
+                <a:alpha val="47450"/>
               </a:srgbClr>
             </a:outerShdw>
           </a:effectLst>
@@ -18798,7 +18669,7 @@
           <a:effectLst>
             <a:outerShdw blurRad="57150" rotWithShape="0" algn="bl" dir="5400000" dist="19050">
               <a:srgbClr val="000000">
-                <a:alpha val="47843"/>
+                <a:alpha val="47450"/>
               </a:srgbClr>
             </a:outerShdw>
           </a:effectLst>
@@ -18872,7 +18743,7 @@
           <a:effectLst>
             <a:outerShdw blurRad="57150" rotWithShape="0" algn="bl" dir="5400000" dist="19050">
               <a:srgbClr val="000000">
-                <a:alpha val="47843"/>
+                <a:alpha val="47450"/>
               </a:srgbClr>
             </a:outerShdw>
           </a:effectLst>
@@ -18946,7 +18817,7 @@
           <a:effectLst>
             <a:outerShdw blurRad="57150" rotWithShape="0" algn="bl" dir="5400000" dist="19050">
               <a:srgbClr val="000000">
-                <a:alpha val="47843"/>
+                <a:alpha val="47450"/>
               </a:srgbClr>
             </a:outerShdw>
           </a:effectLst>
@@ -19020,7 +18891,7 @@
           <a:effectLst>
             <a:outerShdw blurRad="57150" rotWithShape="0" algn="bl" dir="5400000" dist="19050">
               <a:srgbClr val="000000">
-                <a:alpha val="47843"/>
+                <a:alpha val="47450"/>
               </a:srgbClr>
             </a:outerShdw>
           </a:effectLst>
@@ -19094,7 +18965,7 @@
           <a:effectLst>
             <a:outerShdw blurRad="57150" rotWithShape="0" algn="bl" dir="5400000" dist="19050">
               <a:srgbClr val="000000">
-                <a:alpha val="47843"/>
+                <a:alpha val="47450"/>
               </a:srgbClr>
             </a:outerShdw>
           </a:effectLst>
@@ -19168,7 +19039,7 @@
           <a:effectLst>
             <a:outerShdw blurRad="57150" rotWithShape="0" algn="bl" dir="5400000" dist="19050">
               <a:srgbClr val="000000">
-                <a:alpha val="47843"/>
+                <a:alpha val="47450"/>
               </a:srgbClr>
             </a:outerShdw>
           </a:effectLst>
@@ -19242,7 +19113,7 @@
           <a:effectLst>
             <a:outerShdw blurRad="57150" rotWithShape="0" algn="bl" dir="5400000" dist="19050">
               <a:srgbClr val="000000">
-                <a:alpha val="47843"/>
+                <a:alpha val="47450"/>
               </a:srgbClr>
             </a:outerShdw>
           </a:effectLst>
@@ -19316,7 +19187,7 @@
           <a:effectLst>
             <a:outerShdw blurRad="57150" rotWithShape="0" algn="bl" dir="5400000" dist="19050">
               <a:srgbClr val="000000">
-                <a:alpha val="47843"/>
+                <a:alpha val="47450"/>
               </a:srgbClr>
             </a:outerShdw>
           </a:effectLst>
@@ -19390,7 +19261,7 @@
           <a:effectLst>
             <a:outerShdw blurRad="57150" rotWithShape="0" algn="bl" dir="5400000" dist="19050">
               <a:srgbClr val="000000">
-                <a:alpha val="47843"/>
+                <a:alpha val="47450"/>
               </a:srgbClr>
             </a:outerShdw>
           </a:effectLst>
@@ -19464,7 +19335,7 @@
           <a:effectLst>
             <a:outerShdw blurRad="57150" rotWithShape="0" algn="bl" dir="5400000" dist="19050">
               <a:srgbClr val="000000">
-                <a:alpha val="47843"/>
+                <a:alpha val="47450"/>
               </a:srgbClr>
             </a:outerShdw>
           </a:effectLst>
@@ -19538,7 +19409,7 @@
           <a:effectLst>
             <a:outerShdw blurRad="57150" rotWithShape="0" algn="bl" dir="5400000" dist="19050">
               <a:srgbClr val="000000">
-                <a:alpha val="47843"/>
+                <a:alpha val="47450"/>
               </a:srgbClr>
             </a:outerShdw>
           </a:effectLst>
@@ -23093,42 +22964,15 @@
           </a:p>
         </p:txBody>
       </p:sp>
-      <p:pic>
-        <p:nvPicPr>
-          <p:cNvPr id="99" name="Google Shape;99;g2031f0e9df4_0_9"/>
-          <p:cNvPicPr preferRelativeResize="0"/>
-          <p:nvPr/>
-        </p:nvPicPr>
-        <p:blipFill rotWithShape="1">
-          <a:blip r:embed="rId4">
-            <a:alphaModFix/>
-          </a:blip>
-          <a:srcRect b="0" l="0" r="0" t="0"/>
-          <a:stretch/>
-        </p:blipFill>
-        <p:spPr>
-          <a:xfrm>
-            <a:off x="0" y="7259705"/>
-            <a:ext cx="13004798" cy="2398645"/>
-          </a:xfrm>
-          <a:prstGeom prst="rect">
-            <a:avLst/>
-          </a:prstGeom>
-          <a:noFill/>
-          <a:ln>
-            <a:noFill/>
-          </a:ln>
-        </p:spPr>
-      </p:pic>
       <p:sp>
         <p:nvSpPr>
-          <p:cNvPr id="100" name="Google Shape;100;g2031f0e9df4_0_9"/>
+          <p:cNvPr id="99" name="Google Shape;99;g2031f0e9df4_0_9"/>
           <p:cNvSpPr txBox="1"/>
           <p:nvPr/>
         </p:nvSpPr>
         <p:spPr>
           <a:xfrm>
-            <a:off x="574975" y="6522600"/>
+            <a:off x="574975" y="6206050"/>
             <a:ext cx="11430300" cy="927600"/>
           </a:xfrm>
           <a:prstGeom prst="rect">
@@ -23186,6 +23030,34 @@
           </a:p>
         </p:txBody>
       </p:sp>
+      <p:pic>
+        <p:nvPicPr>
+          <p:cNvPr id="100" name="Google Shape;100;g2031f0e9df4_0_9"/>
+          <p:cNvPicPr preferRelativeResize="0"/>
+          <p:nvPr/>
+        </p:nvPicPr>
+        <p:blipFill>
+          <a:blip r:embed="rId4">
+            <a:alphaModFix/>
+          </a:blip>
+          <a:stretch>
+            <a:fillRect/>
+          </a:stretch>
+        </p:blipFill>
+        <p:spPr>
+          <a:xfrm>
+            <a:off x="610932" y="6694275"/>
+            <a:ext cx="11782935" cy="3142600"/>
+          </a:xfrm>
+          <a:prstGeom prst="rect">
+            <a:avLst/>
+          </a:prstGeom>
+          <a:noFill/>
+          <a:ln>
+            <a:noFill/>
+          </a:ln>
+        </p:spPr>
+      </p:pic>
     </p:spTree>
   </p:cSld>
   <p:clrMapOvr>

</xml_diff>

<commit_message>
Change the signal to relaunch simus in stress testing wkw
</commit_message>
<xml_diff>
--- a/Finance/resources/doc/risk-valuation-proactive.pptx
+++ b/Finance/resources/doc/risk-valuation-proactive.pptx
@@ -268,7 +268,7 @@
   </p:defaultTextStyle>
   <p:extLst>
     <p:ext uri="GoogleSlidesCustomDataVersion2">
-      <go:slidesCustomData xmlns:go="http://customooxmlschemas.google.com/" r:id="rId26" roundtripDataSignature="AMtx7miUG9hGhwnYgyPDhGVjBW0SccQz4w=="/>
+      <go:slidesCustomData xmlns:go="http://customooxmlschemas.google.com/" r:id="rId26" roundtripDataSignature="AMtx7mh5+hPHNZC/eadkp7v43Q8f0OhEVg=="/>
     </p:ext>
   </p:extLst>
 </p:presentation>
@@ -11614,7 +11614,23 @@
                 <a:cs typeface="Arial"/>
                 <a:sym typeface="Arial"/>
               </a:rPr>
-              <a:t>The interactive version of the Stress_Testing_Monte_Carlo_Value_Portfolio workflow allows the user to add more MC simulations to each estimated stressed portfolio P&amp;L.</a:t>
+              <a:t>The interactive version of the Stress_Testing_Monte_Carlo_Value_Portfolio workflow allows the user to </a:t>
+            </a:r>
+            <a:r>
+              <a:rPr lang="en-US" sz="1800"/>
+              <a:t>stress test the portfolio by considering a new set of parameters</a:t>
+            </a:r>
+            <a:r>
+              <a:rPr b="0" i="0" lang="en-US" sz="1800" u="none" cap="none" strike="noStrike">
+                <a:solidFill>
+                  <a:srgbClr val="000000"/>
+                </a:solidFill>
+                <a:latin typeface="Arial"/>
+                <a:ea typeface="Arial"/>
+                <a:cs typeface="Arial"/>
+                <a:sym typeface="Arial"/>
+              </a:rPr>
+              <a:t>.</a:t>
             </a:r>
             <a:endParaRPr b="0" i="0" sz="1800" u="none" cap="none" strike="noStrike">
               <a:solidFill>
@@ -11661,17 +11677,18 @@
           <p:cNvPicPr preferRelativeResize="0"/>
           <p:nvPr/>
         </p:nvPicPr>
-        <p:blipFill rotWithShape="1">
+        <p:blipFill>
           <a:blip r:embed="rId4">
             <a:alphaModFix/>
           </a:blip>
-          <a:srcRect b="0" l="0" r="0" t="0"/>
-          <a:stretch/>
+          <a:stretch>
+            <a:fillRect/>
+          </a:stretch>
         </p:blipFill>
         <p:spPr>
           <a:xfrm>
-            <a:off x="6521450" y="2117550"/>
-            <a:ext cx="6362700" cy="2152650"/>
+            <a:off x="5537988" y="2174888"/>
+            <a:ext cx="7229475" cy="2752725"/>
           </a:xfrm>
           <a:prstGeom prst="rect">
             <a:avLst/>
@@ -24230,6 +24247,285 @@
 </file>
 
 <file path=ppt/theme/theme1.xml><?xml version="1.0" encoding="utf-8"?>
+<a:theme xmlns:a="http://schemas.openxmlformats.org/drawingml/2006/main" xmlns:r="http://schemas.openxmlformats.org/officeDocument/2006/relationships">
+  <a:themeElements>
+    <a:clrScheme name="Default">
+      <a:dk1>
+        <a:srgbClr val="000000"/>
+      </a:dk1>
+      <a:lt1>
+        <a:srgbClr val="FFFFFF"/>
+      </a:lt1>
+      <a:dk2>
+        <a:srgbClr val="158158"/>
+      </a:dk2>
+      <a:lt2>
+        <a:srgbClr val="F3F3F3"/>
+      </a:lt2>
+      <a:accent1>
+        <a:srgbClr val="058DC7"/>
+      </a:accent1>
+      <a:accent2>
+        <a:srgbClr val="50B432"/>
+      </a:accent2>
+      <a:accent3>
+        <a:srgbClr val="ED561B"/>
+      </a:accent3>
+      <a:accent4>
+        <a:srgbClr val="EDEF00"/>
+      </a:accent4>
+      <a:accent5>
+        <a:srgbClr val="24CBE5"/>
+      </a:accent5>
+      <a:accent6>
+        <a:srgbClr val="64E572"/>
+      </a:accent6>
+      <a:hlink>
+        <a:srgbClr val="2200CC"/>
+      </a:hlink>
+      <a:folHlink>
+        <a:srgbClr val="551A8B"/>
+      </a:folHlink>
+    </a:clrScheme>
+    <a:fontScheme name="Office">
+      <a:majorFont>
+        <a:latin typeface="Arial"/>
+        <a:ea typeface=""/>
+        <a:cs typeface=""/>
+        <a:font script="Jpan" typeface="ＭＳ Ｐゴシック"/>
+        <a:font script="Hang" typeface="맑은 고딕"/>
+        <a:font script="Hans" typeface="宋体"/>
+        <a:font script="Hant" typeface="新細明體"/>
+        <a:font script="Arab" typeface="Times New Roman"/>
+        <a:font script="Hebr" typeface="Times New Roman"/>
+        <a:font script="Thai" typeface="Angsana New"/>
+        <a:font script="Ethi" typeface="Nyala"/>
+        <a:font script="Beng" typeface="Vrinda"/>
+        <a:font script="Gujr" typeface="Shruti"/>
+        <a:font script="Khmr" typeface="MoolBoran"/>
+        <a:font script="Knda" typeface="Tunga"/>
+        <a:font script="Guru" typeface="Raavi"/>
+        <a:font script="Cans" typeface="Euphemia"/>
+        <a:font script="Cher" typeface="Plantagenet Cherokee"/>
+        <a:font script="Yiii" typeface="Microsoft Yi Baiti"/>
+        <a:font script="Tibt" typeface="Microsoft Himalaya"/>
+        <a:font script="Thaa" typeface="MV Boli"/>
+        <a:font script="Deva" typeface="Mangal"/>
+        <a:font script="Telu" typeface="Gautami"/>
+        <a:font script="Taml" typeface="Latha"/>
+        <a:font script="Syrc" typeface="Estrangelo Edessa"/>
+        <a:font script="Orya" typeface="Kalinga"/>
+        <a:font script="Mlym" typeface="Kartika"/>
+        <a:font script="Laoo" typeface="DokChampa"/>
+        <a:font script="Sinh" typeface="Iskoola Pota"/>
+        <a:font script="Mong" typeface="Mongolian Baiti"/>
+        <a:font script="Viet" typeface="Times New Roman"/>
+        <a:font script="Uigh" typeface="Microsoft Uighur"/>
+        <a:font script="Geor" typeface="Sylfaen"/>
+      </a:majorFont>
+      <a:minorFont>
+        <a:latin typeface="Arial"/>
+        <a:ea typeface=""/>
+        <a:cs typeface=""/>
+        <a:font script="Jpan" typeface="ＭＳ Ｐゴシック"/>
+        <a:font script="Hang" typeface="맑은 고딕"/>
+        <a:font script="Hans" typeface="宋体"/>
+        <a:font script="Hant" typeface="新細明體"/>
+        <a:font script="Arab" typeface="Arial"/>
+        <a:font script="Hebr" typeface="Arial"/>
+        <a:font script="Thai" typeface="Cordia New"/>
+        <a:font script="Ethi" typeface="Nyala"/>
+        <a:font script="Beng" typeface="Vrinda"/>
+        <a:font script="Gujr" typeface="Shruti"/>
+        <a:font script="Khmr" typeface="DaunPenh"/>
+        <a:font script="Knda" typeface="Tunga"/>
+        <a:font script="Guru" typeface="Raavi"/>
+        <a:font script="Cans" typeface="Euphemia"/>
+        <a:font script="Cher" typeface="Plantagenet Cherokee"/>
+        <a:font script="Yiii" typeface="Microsoft Yi Baiti"/>
+        <a:font script="Tibt" typeface="Microsoft Himalaya"/>
+        <a:font script="Thaa" typeface="MV Boli"/>
+        <a:font script="Deva" typeface="Mangal"/>
+        <a:font script="Telu" typeface="Gautami"/>
+        <a:font script="Taml" typeface="Latha"/>
+        <a:font script="Syrc" typeface="Estrangelo Edessa"/>
+        <a:font script="Orya" typeface="Kalinga"/>
+        <a:font script="Mlym" typeface="Kartika"/>
+        <a:font script="Laoo" typeface="DokChampa"/>
+        <a:font script="Sinh" typeface="Iskoola Pota"/>
+        <a:font script="Mong" typeface="Mongolian Baiti"/>
+        <a:font script="Viet" typeface="Arial"/>
+        <a:font script="Uigh" typeface="Microsoft Uighur"/>
+        <a:font script="Geor" typeface="Sylfaen"/>
+      </a:minorFont>
+    </a:fontScheme>
+    <a:fmtScheme name="Office">
+      <a:fillStyleLst>
+        <a:solidFill>
+          <a:schemeClr val="phClr"/>
+        </a:solidFill>
+        <a:gradFill rotWithShape="1">
+          <a:gsLst>
+            <a:gs pos="0">
+              <a:schemeClr val="phClr">
+                <a:tint val="50000"/>
+                <a:satMod val="300000"/>
+              </a:schemeClr>
+            </a:gs>
+            <a:gs pos="35000">
+              <a:schemeClr val="phClr">
+                <a:tint val="37000"/>
+                <a:satMod val="300000"/>
+              </a:schemeClr>
+            </a:gs>
+            <a:gs pos="100000">
+              <a:schemeClr val="phClr">
+                <a:tint val="15000"/>
+                <a:satMod val="350000"/>
+              </a:schemeClr>
+            </a:gs>
+          </a:gsLst>
+          <a:lin ang="16200000" scaled="1"/>
+        </a:gradFill>
+        <a:gradFill rotWithShape="1">
+          <a:gsLst>
+            <a:gs pos="0">
+              <a:schemeClr val="phClr">
+                <a:tint val="100000"/>
+                <a:shade val="100000"/>
+                <a:satMod val="130000"/>
+              </a:schemeClr>
+            </a:gs>
+            <a:gs pos="100000">
+              <a:schemeClr val="phClr">
+                <a:tint val="50000"/>
+                <a:shade val="100000"/>
+                <a:satMod val="350000"/>
+              </a:schemeClr>
+            </a:gs>
+          </a:gsLst>
+          <a:lin ang="16200000" scaled="0"/>
+        </a:gradFill>
+      </a:fillStyleLst>
+      <a:lnStyleLst>
+        <a:ln w="9525" cap="flat" cmpd="sng" algn="ctr">
+          <a:solidFill>
+            <a:schemeClr val="phClr">
+              <a:shade val="95000"/>
+              <a:satMod val="105000"/>
+            </a:schemeClr>
+          </a:solidFill>
+          <a:prstDash val="solid"/>
+        </a:ln>
+        <a:ln w="25400" cap="flat" cmpd="sng" algn="ctr">
+          <a:solidFill>
+            <a:schemeClr val="phClr"/>
+          </a:solidFill>
+          <a:prstDash val="solid"/>
+        </a:ln>
+        <a:ln w="38100" cap="flat" cmpd="sng" algn="ctr">
+          <a:solidFill>
+            <a:schemeClr val="phClr"/>
+          </a:solidFill>
+          <a:prstDash val="solid"/>
+        </a:ln>
+      </a:lnStyleLst>
+      <a:effectStyleLst>
+        <a:effectStyle>
+          <a:effectLst>
+            <a:outerShdw blurRad="40000" dist="20000" dir="5400000" rotWithShape="0">
+              <a:srgbClr val="000000">
+                <a:alpha val="38000"/>
+              </a:srgbClr>
+            </a:outerShdw>
+          </a:effectLst>
+        </a:effectStyle>
+        <a:effectStyle>
+          <a:effectLst>
+            <a:outerShdw blurRad="40000" dist="23000" dir="5400000" rotWithShape="0">
+              <a:srgbClr val="000000">
+                <a:alpha val="35000"/>
+              </a:srgbClr>
+            </a:outerShdw>
+          </a:effectLst>
+        </a:effectStyle>
+        <a:effectStyle>
+          <a:effectLst>
+            <a:outerShdw blurRad="40000" dist="23000" dir="5400000" rotWithShape="0">
+              <a:srgbClr val="000000">
+                <a:alpha val="35000"/>
+              </a:srgbClr>
+            </a:outerShdw>
+          </a:effectLst>
+          <a:scene3d>
+            <a:camera prst="orthographicFront">
+              <a:rot lat="0" lon="0" rev="0"/>
+            </a:camera>
+            <a:lightRig rig="threePt" dir="t">
+              <a:rot lat="0" lon="0" rev="1200000"/>
+            </a:lightRig>
+          </a:scene3d>
+          <a:sp3d>
+            <a:bevelT w="63500" h="25400"/>
+          </a:sp3d>
+        </a:effectStyle>
+      </a:effectStyleLst>
+      <a:bgFillStyleLst>
+        <a:solidFill>
+          <a:schemeClr val="phClr"/>
+        </a:solidFill>
+        <a:gradFill rotWithShape="1">
+          <a:gsLst>
+            <a:gs pos="0">
+              <a:schemeClr val="phClr">
+                <a:tint val="40000"/>
+                <a:satMod val="350000"/>
+              </a:schemeClr>
+            </a:gs>
+            <a:gs pos="40000">
+              <a:schemeClr val="phClr">
+                <a:tint val="45000"/>
+                <a:shade val="99000"/>
+                <a:satMod val="350000"/>
+              </a:schemeClr>
+            </a:gs>
+            <a:gs pos="100000">
+              <a:schemeClr val="phClr">
+                <a:shade val="20000"/>
+                <a:satMod val="255000"/>
+              </a:schemeClr>
+            </a:gs>
+          </a:gsLst>
+          <a:path path="circle">
+            <a:fillToRect l="50000" t="-80000" r="50000" b="180000"/>
+          </a:path>
+        </a:gradFill>
+        <a:gradFill rotWithShape="1">
+          <a:gsLst>
+            <a:gs pos="0">
+              <a:schemeClr val="phClr">
+                <a:tint val="80000"/>
+                <a:satMod val="300000"/>
+              </a:schemeClr>
+            </a:gs>
+            <a:gs pos="100000">
+              <a:schemeClr val="phClr">
+                <a:shade val="30000"/>
+                <a:satMod val="200000"/>
+              </a:schemeClr>
+            </a:gs>
+          </a:gsLst>
+          <a:path path="circle">
+            <a:fillToRect l="50000" t="50000" r="50000" b="50000"/>
+          </a:path>
+        </a:gradFill>
+      </a:bgFillStyleLst>
+    </a:fmtScheme>
+  </a:themeElements>
+</a:theme>
+</file>
+
+<file path=ppt/theme/theme2.xml><?xml version="1.0" encoding="utf-8"?>
 <a:theme xmlns:a="http://schemas.openxmlformats.org/drawingml/2006/main" xmlns:r="http://schemas.openxmlformats.org/officeDocument/2006/relationships" name="1_Activeeon Presentation Template">
   <a:themeElements>
     <a:clrScheme name="AE Blue">
@@ -24506,283 +24802,4 @@
     </a:fmtScheme>
   </a:themeElements>
 </a:theme>
-</file>
-
-<file path=ppt/theme/theme2.xml><?xml version="1.0" encoding="utf-8"?>
-<a:theme xmlns:a="http://schemas.openxmlformats.org/drawingml/2006/main" xmlns:r="http://schemas.openxmlformats.org/officeDocument/2006/relationships">
-  <a:themeElements>
-    <a:clrScheme name="Default">
-      <a:dk1>
-        <a:srgbClr val="000000"/>
-      </a:dk1>
-      <a:lt1>
-        <a:srgbClr val="FFFFFF"/>
-      </a:lt1>
-      <a:dk2>
-        <a:srgbClr val="158158"/>
-      </a:dk2>
-      <a:lt2>
-        <a:srgbClr val="F3F3F3"/>
-      </a:lt2>
-      <a:accent1>
-        <a:srgbClr val="058DC7"/>
-      </a:accent1>
-      <a:accent2>
-        <a:srgbClr val="50B432"/>
-      </a:accent2>
-      <a:accent3>
-        <a:srgbClr val="ED561B"/>
-      </a:accent3>
-      <a:accent4>
-        <a:srgbClr val="EDEF00"/>
-      </a:accent4>
-      <a:accent5>
-        <a:srgbClr val="24CBE5"/>
-      </a:accent5>
-      <a:accent6>
-        <a:srgbClr val="64E572"/>
-      </a:accent6>
-      <a:hlink>
-        <a:srgbClr val="2200CC"/>
-      </a:hlink>
-      <a:folHlink>
-        <a:srgbClr val="551A8B"/>
-      </a:folHlink>
-    </a:clrScheme>
-    <a:fontScheme name="Office">
-      <a:majorFont>
-        <a:latin typeface="Arial"/>
-        <a:ea typeface=""/>
-        <a:cs typeface=""/>
-        <a:font script="Jpan" typeface="ＭＳ Ｐゴシック"/>
-        <a:font script="Hang" typeface="맑은 고딕"/>
-        <a:font script="Hans" typeface="宋体"/>
-        <a:font script="Hant" typeface="新細明體"/>
-        <a:font script="Arab" typeface="Times New Roman"/>
-        <a:font script="Hebr" typeface="Times New Roman"/>
-        <a:font script="Thai" typeface="Angsana New"/>
-        <a:font script="Ethi" typeface="Nyala"/>
-        <a:font script="Beng" typeface="Vrinda"/>
-        <a:font script="Gujr" typeface="Shruti"/>
-        <a:font script="Khmr" typeface="MoolBoran"/>
-        <a:font script="Knda" typeface="Tunga"/>
-        <a:font script="Guru" typeface="Raavi"/>
-        <a:font script="Cans" typeface="Euphemia"/>
-        <a:font script="Cher" typeface="Plantagenet Cherokee"/>
-        <a:font script="Yiii" typeface="Microsoft Yi Baiti"/>
-        <a:font script="Tibt" typeface="Microsoft Himalaya"/>
-        <a:font script="Thaa" typeface="MV Boli"/>
-        <a:font script="Deva" typeface="Mangal"/>
-        <a:font script="Telu" typeface="Gautami"/>
-        <a:font script="Taml" typeface="Latha"/>
-        <a:font script="Syrc" typeface="Estrangelo Edessa"/>
-        <a:font script="Orya" typeface="Kalinga"/>
-        <a:font script="Mlym" typeface="Kartika"/>
-        <a:font script="Laoo" typeface="DokChampa"/>
-        <a:font script="Sinh" typeface="Iskoola Pota"/>
-        <a:font script="Mong" typeface="Mongolian Baiti"/>
-        <a:font script="Viet" typeface="Times New Roman"/>
-        <a:font script="Uigh" typeface="Microsoft Uighur"/>
-        <a:font script="Geor" typeface="Sylfaen"/>
-      </a:majorFont>
-      <a:minorFont>
-        <a:latin typeface="Arial"/>
-        <a:ea typeface=""/>
-        <a:cs typeface=""/>
-        <a:font script="Jpan" typeface="ＭＳ Ｐゴシック"/>
-        <a:font script="Hang" typeface="맑은 고딕"/>
-        <a:font script="Hans" typeface="宋体"/>
-        <a:font script="Hant" typeface="新細明體"/>
-        <a:font script="Arab" typeface="Arial"/>
-        <a:font script="Hebr" typeface="Arial"/>
-        <a:font script="Thai" typeface="Cordia New"/>
-        <a:font script="Ethi" typeface="Nyala"/>
-        <a:font script="Beng" typeface="Vrinda"/>
-        <a:font script="Gujr" typeface="Shruti"/>
-        <a:font script="Khmr" typeface="DaunPenh"/>
-        <a:font script="Knda" typeface="Tunga"/>
-        <a:font script="Guru" typeface="Raavi"/>
-        <a:font script="Cans" typeface="Euphemia"/>
-        <a:font script="Cher" typeface="Plantagenet Cherokee"/>
-        <a:font script="Yiii" typeface="Microsoft Yi Baiti"/>
-        <a:font script="Tibt" typeface="Microsoft Himalaya"/>
-        <a:font script="Thaa" typeface="MV Boli"/>
-        <a:font script="Deva" typeface="Mangal"/>
-        <a:font script="Telu" typeface="Gautami"/>
-        <a:font script="Taml" typeface="Latha"/>
-        <a:font script="Syrc" typeface="Estrangelo Edessa"/>
-        <a:font script="Orya" typeface="Kalinga"/>
-        <a:font script="Mlym" typeface="Kartika"/>
-        <a:font script="Laoo" typeface="DokChampa"/>
-        <a:font script="Sinh" typeface="Iskoola Pota"/>
-        <a:font script="Mong" typeface="Mongolian Baiti"/>
-        <a:font script="Viet" typeface="Arial"/>
-        <a:font script="Uigh" typeface="Microsoft Uighur"/>
-        <a:font script="Geor" typeface="Sylfaen"/>
-      </a:minorFont>
-    </a:fontScheme>
-    <a:fmtScheme name="Office">
-      <a:fillStyleLst>
-        <a:solidFill>
-          <a:schemeClr val="phClr"/>
-        </a:solidFill>
-        <a:gradFill rotWithShape="1">
-          <a:gsLst>
-            <a:gs pos="0">
-              <a:schemeClr val="phClr">
-                <a:tint val="50000"/>
-                <a:satMod val="300000"/>
-              </a:schemeClr>
-            </a:gs>
-            <a:gs pos="35000">
-              <a:schemeClr val="phClr">
-                <a:tint val="37000"/>
-                <a:satMod val="300000"/>
-              </a:schemeClr>
-            </a:gs>
-            <a:gs pos="100000">
-              <a:schemeClr val="phClr">
-                <a:tint val="15000"/>
-                <a:satMod val="350000"/>
-              </a:schemeClr>
-            </a:gs>
-          </a:gsLst>
-          <a:lin ang="16200000" scaled="1"/>
-        </a:gradFill>
-        <a:gradFill rotWithShape="1">
-          <a:gsLst>
-            <a:gs pos="0">
-              <a:schemeClr val="phClr">
-                <a:tint val="100000"/>
-                <a:shade val="100000"/>
-                <a:satMod val="130000"/>
-              </a:schemeClr>
-            </a:gs>
-            <a:gs pos="100000">
-              <a:schemeClr val="phClr">
-                <a:tint val="50000"/>
-                <a:shade val="100000"/>
-                <a:satMod val="350000"/>
-              </a:schemeClr>
-            </a:gs>
-          </a:gsLst>
-          <a:lin ang="16200000" scaled="0"/>
-        </a:gradFill>
-      </a:fillStyleLst>
-      <a:lnStyleLst>
-        <a:ln w="9525" cap="flat" cmpd="sng" algn="ctr">
-          <a:solidFill>
-            <a:schemeClr val="phClr">
-              <a:shade val="95000"/>
-              <a:satMod val="105000"/>
-            </a:schemeClr>
-          </a:solidFill>
-          <a:prstDash val="solid"/>
-        </a:ln>
-        <a:ln w="25400" cap="flat" cmpd="sng" algn="ctr">
-          <a:solidFill>
-            <a:schemeClr val="phClr"/>
-          </a:solidFill>
-          <a:prstDash val="solid"/>
-        </a:ln>
-        <a:ln w="38100" cap="flat" cmpd="sng" algn="ctr">
-          <a:solidFill>
-            <a:schemeClr val="phClr"/>
-          </a:solidFill>
-          <a:prstDash val="solid"/>
-        </a:ln>
-      </a:lnStyleLst>
-      <a:effectStyleLst>
-        <a:effectStyle>
-          <a:effectLst>
-            <a:outerShdw blurRad="40000" dist="20000" dir="5400000" rotWithShape="0">
-              <a:srgbClr val="000000">
-                <a:alpha val="38000"/>
-              </a:srgbClr>
-            </a:outerShdw>
-          </a:effectLst>
-        </a:effectStyle>
-        <a:effectStyle>
-          <a:effectLst>
-            <a:outerShdw blurRad="40000" dist="23000" dir="5400000" rotWithShape="0">
-              <a:srgbClr val="000000">
-                <a:alpha val="35000"/>
-              </a:srgbClr>
-            </a:outerShdw>
-          </a:effectLst>
-        </a:effectStyle>
-        <a:effectStyle>
-          <a:effectLst>
-            <a:outerShdw blurRad="40000" dist="23000" dir="5400000" rotWithShape="0">
-              <a:srgbClr val="000000">
-                <a:alpha val="35000"/>
-              </a:srgbClr>
-            </a:outerShdw>
-          </a:effectLst>
-          <a:scene3d>
-            <a:camera prst="orthographicFront">
-              <a:rot lat="0" lon="0" rev="0"/>
-            </a:camera>
-            <a:lightRig rig="threePt" dir="t">
-              <a:rot lat="0" lon="0" rev="1200000"/>
-            </a:lightRig>
-          </a:scene3d>
-          <a:sp3d>
-            <a:bevelT w="63500" h="25400"/>
-          </a:sp3d>
-        </a:effectStyle>
-      </a:effectStyleLst>
-      <a:bgFillStyleLst>
-        <a:solidFill>
-          <a:schemeClr val="phClr"/>
-        </a:solidFill>
-        <a:gradFill rotWithShape="1">
-          <a:gsLst>
-            <a:gs pos="0">
-              <a:schemeClr val="phClr">
-                <a:tint val="40000"/>
-                <a:satMod val="350000"/>
-              </a:schemeClr>
-            </a:gs>
-            <a:gs pos="40000">
-              <a:schemeClr val="phClr">
-                <a:tint val="45000"/>
-                <a:shade val="99000"/>
-                <a:satMod val="350000"/>
-              </a:schemeClr>
-            </a:gs>
-            <a:gs pos="100000">
-              <a:schemeClr val="phClr">
-                <a:shade val="20000"/>
-                <a:satMod val="255000"/>
-              </a:schemeClr>
-            </a:gs>
-          </a:gsLst>
-          <a:path path="circle">
-            <a:fillToRect l="50000" t="-80000" r="50000" b="180000"/>
-          </a:path>
-        </a:gradFill>
-        <a:gradFill rotWithShape="1">
-          <a:gsLst>
-            <a:gs pos="0">
-              <a:schemeClr val="phClr">
-                <a:tint val="80000"/>
-                <a:satMod val="300000"/>
-              </a:schemeClr>
-            </a:gs>
-            <a:gs pos="100000">
-              <a:schemeClr val="phClr">
-                <a:shade val="30000"/>
-                <a:satMod val="200000"/>
-              </a:schemeClr>
-            </a:gs>
-          </a:gsLst>
-          <a:path path="circle">
-            <a:fillToRect l="50000" t="50000" r="50000" b="50000"/>
-          </a:path>
-        </a:gradFill>
-      </a:bgFillStyleLst>
-    </a:fmtScheme>
-  </a:themeElements>
-</a:theme>
 </file>
</xml_diff>

<commit_message>
Change the signal to relaunch simus in stress testing wkw (#1329)
</commit_message>
<xml_diff>
--- a/Finance/resources/doc/risk-valuation-proactive.pptx
+++ b/Finance/resources/doc/risk-valuation-proactive.pptx
@@ -268,7 +268,7 @@
   </p:defaultTextStyle>
   <p:extLst>
     <p:ext uri="GoogleSlidesCustomDataVersion2">
-      <go:slidesCustomData xmlns:go="http://customooxmlschemas.google.com/" r:id="rId26" roundtripDataSignature="AMtx7miUG9hGhwnYgyPDhGVjBW0SccQz4w=="/>
+      <go:slidesCustomData xmlns:go="http://customooxmlschemas.google.com/" r:id="rId26" roundtripDataSignature="AMtx7mh5+hPHNZC/eadkp7v43Q8f0OhEVg=="/>
     </p:ext>
   </p:extLst>
 </p:presentation>
@@ -11614,7 +11614,23 @@
                 <a:cs typeface="Arial"/>
                 <a:sym typeface="Arial"/>
               </a:rPr>
-              <a:t>The interactive version of the Stress_Testing_Monte_Carlo_Value_Portfolio workflow allows the user to add more MC simulations to each estimated stressed portfolio P&amp;L.</a:t>
+              <a:t>The interactive version of the Stress_Testing_Monte_Carlo_Value_Portfolio workflow allows the user to </a:t>
+            </a:r>
+            <a:r>
+              <a:rPr lang="en-US" sz="1800"/>
+              <a:t>stress test the portfolio by considering a new set of parameters</a:t>
+            </a:r>
+            <a:r>
+              <a:rPr b="0" i="0" lang="en-US" sz="1800" u="none" cap="none" strike="noStrike">
+                <a:solidFill>
+                  <a:srgbClr val="000000"/>
+                </a:solidFill>
+                <a:latin typeface="Arial"/>
+                <a:ea typeface="Arial"/>
+                <a:cs typeface="Arial"/>
+                <a:sym typeface="Arial"/>
+              </a:rPr>
+              <a:t>.</a:t>
             </a:r>
             <a:endParaRPr b="0" i="0" sz="1800" u="none" cap="none" strike="noStrike">
               <a:solidFill>
@@ -11661,17 +11677,18 @@
           <p:cNvPicPr preferRelativeResize="0"/>
           <p:nvPr/>
         </p:nvPicPr>
-        <p:blipFill rotWithShape="1">
+        <p:blipFill>
           <a:blip r:embed="rId4">
             <a:alphaModFix/>
           </a:blip>
-          <a:srcRect b="0" l="0" r="0" t="0"/>
-          <a:stretch/>
+          <a:stretch>
+            <a:fillRect/>
+          </a:stretch>
         </p:blipFill>
         <p:spPr>
           <a:xfrm>
-            <a:off x="6521450" y="2117550"/>
-            <a:ext cx="6362700" cy="2152650"/>
+            <a:off x="5537988" y="2174888"/>
+            <a:ext cx="7229475" cy="2752725"/>
           </a:xfrm>
           <a:prstGeom prst="rect">
             <a:avLst/>
@@ -24230,6 +24247,285 @@
 </file>
 
 <file path=ppt/theme/theme1.xml><?xml version="1.0" encoding="utf-8"?>
+<a:theme xmlns:a="http://schemas.openxmlformats.org/drawingml/2006/main" xmlns:r="http://schemas.openxmlformats.org/officeDocument/2006/relationships">
+  <a:themeElements>
+    <a:clrScheme name="Default">
+      <a:dk1>
+        <a:srgbClr val="000000"/>
+      </a:dk1>
+      <a:lt1>
+        <a:srgbClr val="FFFFFF"/>
+      </a:lt1>
+      <a:dk2>
+        <a:srgbClr val="158158"/>
+      </a:dk2>
+      <a:lt2>
+        <a:srgbClr val="F3F3F3"/>
+      </a:lt2>
+      <a:accent1>
+        <a:srgbClr val="058DC7"/>
+      </a:accent1>
+      <a:accent2>
+        <a:srgbClr val="50B432"/>
+      </a:accent2>
+      <a:accent3>
+        <a:srgbClr val="ED561B"/>
+      </a:accent3>
+      <a:accent4>
+        <a:srgbClr val="EDEF00"/>
+      </a:accent4>
+      <a:accent5>
+        <a:srgbClr val="24CBE5"/>
+      </a:accent5>
+      <a:accent6>
+        <a:srgbClr val="64E572"/>
+      </a:accent6>
+      <a:hlink>
+        <a:srgbClr val="2200CC"/>
+      </a:hlink>
+      <a:folHlink>
+        <a:srgbClr val="551A8B"/>
+      </a:folHlink>
+    </a:clrScheme>
+    <a:fontScheme name="Office">
+      <a:majorFont>
+        <a:latin typeface="Arial"/>
+        <a:ea typeface=""/>
+        <a:cs typeface=""/>
+        <a:font script="Jpan" typeface="ＭＳ Ｐゴシック"/>
+        <a:font script="Hang" typeface="맑은 고딕"/>
+        <a:font script="Hans" typeface="宋体"/>
+        <a:font script="Hant" typeface="新細明體"/>
+        <a:font script="Arab" typeface="Times New Roman"/>
+        <a:font script="Hebr" typeface="Times New Roman"/>
+        <a:font script="Thai" typeface="Angsana New"/>
+        <a:font script="Ethi" typeface="Nyala"/>
+        <a:font script="Beng" typeface="Vrinda"/>
+        <a:font script="Gujr" typeface="Shruti"/>
+        <a:font script="Khmr" typeface="MoolBoran"/>
+        <a:font script="Knda" typeface="Tunga"/>
+        <a:font script="Guru" typeface="Raavi"/>
+        <a:font script="Cans" typeface="Euphemia"/>
+        <a:font script="Cher" typeface="Plantagenet Cherokee"/>
+        <a:font script="Yiii" typeface="Microsoft Yi Baiti"/>
+        <a:font script="Tibt" typeface="Microsoft Himalaya"/>
+        <a:font script="Thaa" typeface="MV Boli"/>
+        <a:font script="Deva" typeface="Mangal"/>
+        <a:font script="Telu" typeface="Gautami"/>
+        <a:font script="Taml" typeface="Latha"/>
+        <a:font script="Syrc" typeface="Estrangelo Edessa"/>
+        <a:font script="Orya" typeface="Kalinga"/>
+        <a:font script="Mlym" typeface="Kartika"/>
+        <a:font script="Laoo" typeface="DokChampa"/>
+        <a:font script="Sinh" typeface="Iskoola Pota"/>
+        <a:font script="Mong" typeface="Mongolian Baiti"/>
+        <a:font script="Viet" typeface="Times New Roman"/>
+        <a:font script="Uigh" typeface="Microsoft Uighur"/>
+        <a:font script="Geor" typeface="Sylfaen"/>
+      </a:majorFont>
+      <a:minorFont>
+        <a:latin typeface="Arial"/>
+        <a:ea typeface=""/>
+        <a:cs typeface=""/>
+        <a:font script="Jpan" typeface="ＭＳ Ｐゴシック"/>
+        <a:font script="Hang" typeface="맑은 고딕"/>
+        <a:font script="Hans" typeface="宋体"/>
+        <a:font script="Hant" typeface="新細明體"/>
+        <a:font script="Arab" typeface="Arial"/>
+        <a:font script="Hebr" typeface="Arial"/>
+        <a:font script="Thai" typeface="Cordia New"/>
+        <a:font script="Ethi" typeface="Nyala"/>
+        <a:font script="Beng" typeface="Vrinda"/>
+        <a:font script="Gujr" typeface="Shruti"/>
+        <a:font script="Khmr" typeface="DaunPenh"/>
+        <a:font script="Knda" typeface="Tunga"/>
+        <a:font script="Guru" typeface="Raavi"/>
+        <a:font script="Cans" typeface="Euphemia"/>
+        <a:font script="Cher" typeface="Plantagenet Cherokee"/>
+        <a:font script="Yiii" typeface="Microsoft Yi Baiti"/>
+        <a:font script="Tibt" typeface="Microsoft Himalaya"/>
+        <a:font script="Thaa" typeface="MV Boli"/>
+        <a:font script="Deva" typeface="Mangal"/>
+        <a:font script="Telu" typeface="Gautami"/>
+        <a:font script="Taml" typeface="Latha"/>
+        <a:font script="Syrc" typeface="Estrangelo Edessa"/>
+        <a:font script="Orya" typeface="Kalinga"/>
+        <a:font script="Mlym" typeface="Kartika"/>
+        <a:font script="Laoo" typeface="DokChampa"/>
+        <a:font script="Sinh" typeface="Iskoola Pota"/>
+        <a:font script="Mong" typeface="Mongolian Baiti"/>
+        <a:font script="Viet" typeface="Arial"/>
+        <a:font script="Uigh" typeface="Microsoft Uighur"/>
+        <a:font script="Geor" typeface="Sylfaen"/>
+      </a:minorFont>
+    </a:fontScheme>
+    <a:fmtScheme name="Office">
+      <a:fillStyleLst>
+        <a:solidFill>
+          <a:schemeClr val="phClr"/>
+        </a:solidFill>
+        <a:gradFill rotWithShape="1">
+          <a:gsLst>
+            <a:gs pos="0">
+              <a:schemeClr val="phClr">
+                <a:tint val="50000"/>
+                <a:satMod val="300000"/>
+              </a:schemeClr>
+            </a:gs>
+            <a:gs pos="35000">
+              <a:schemeClr val="phClr">
+                <a:tint val="37000"/>
+                <a:satMod val="300000"/>
+              </a:schemeClr>
+            </a:gs>
+            <a:gs pos="100000">
+              <a:schemeClr val="phClr">
+                <a:tint val="15000"/>
+                <a:satMod val="350000"/>
+              </a:schemeClr>
+            </a:gs>
+          </a:gsLst>
+          <a:lin ang="16200000" scaled="1"/>
+        </a:gradFill>
+        <a:gradFill rotWithShape="1">
+          <a:gsLst>
+            <a:gs pos="0">
+              <a:schemeClr val="phClr">
+                <a:tint val="100000"/>
+                <a:shade val="100000"/>
+                <a:satMod val="130000"/>
+              </a:schemeClr>
+            </a:gs>
+            <a:gs pos="100000">
+              <a:schemeClr val="phClr">
+                <a:tint val="50000"/>
+                <a:shade val="100000"/>
+                <a:satMod val="350000"/>
+              </a:schemeClr>
+            </a:gs>
+          </a:gsLst>
+          <a:lin ang="16200000" scaled="0"/>
+        </a:gradFill>
+      </a:fillStyleLst>
+      <a:lnStyleLst>
+        <a:ln w="9525" cap="flat" cmpd="sng" algn="ctr">
+          <a:solidFill>
+            <a:schemeClr val="phClr">
+              <a:shade val="95000"/>
+              <a:satMod val="105000"/>
+            </a:schemeClr>
+          </a:solidFill>
+          <a:prstDash val="solid"/>
+        </a:ln>
+        <a:ln w="25400" cap="flat" cmpd="sng" algn="ctr">
+          <a:solidFill>
+            <a:schemeClr val="phClr"/>
+          </a:solidFill>
+          <a:prstDash val="solid"/>
+        </a:ln>
+        <a:ln w="38100" cap="flat" cmpd="sng" algn="ctr">
+          <a:solidFill>
+            <a:schemeClr val="phClr"/>
+          </a:solidFill>
+          <a:prstDash val="solid"/>
+        </a:ln>
+      </a:lnStyleLst>
+      <a:effectStyleLst>
+        <a:effectStyle>
+          <a:effectLst>
+            <a:outerShdw blurRad="40000" dist="20000" dir="5400000" rotWithShape="0">
+              <a:srgbClr val="000000">
+                <a:alpha val="38000"/>
+              </a:srgbClr>
+            </a:outerShdw>
+          </a:effectLst>
+        </a:effectStyle>
+        <a:effectStyle>
+          <a:effectLst>
+            <a:outerShdw blurRad="40000" dist="23000" dir="5400000" rotWithShape="0">
+              <a:srgbClr val="000000">
+                <a:alpha val="35000"/>
+              </a:srgbClr>
+            </a:outerShdw>
+          </a:effectLst>
+        </a:effectStyle>
+        <a:effectStyle>
+          <a:effectLst>
+            <a:outerShdw blurRad="40000" dist="23000" dir="5400000" rotWithShape="0">
+              <a:srgbClr val="000000">
+                <a:alpha val="35000"/>
+              </a:srgbClr>
+            </a:outerShdw>
+          </a:effectLst>
+          <a:scene3d>
+            <a:camera prst="orthographicFront">
+              <a:rot lat="0" lon="0" rev="0"/>
+            </a:camera>
+            <a:lightRig rig="threePt" dir="t">
+              <a:rot lat="0" lon="0" rev="1200000"/>
+            </a:lightRig>
+          </a:scene3d>
+          <a:sp3d>
+            <a:bevelT w="63500" h="25400"/>
+          </a:sp3d>
+        </a:effectStyle>
+      </a:effectStyleLst>
+      <a:bgFillStyleLst>
+        <a:solidFill>
+          <a:schemeClr val="phClr"/>
+        </a:solidFill>
+        <a:gradFill rotWithShape="1">
+          <a:gsLst>
+            <a:gs pos="0">
+              <a:schemeClr val="phClr">
+                <a:tint val="40000"/>
+                <a:satMod val="350000"/>
+              </a:schemeClr>
+            </a:gs>
+            <a:gs pos="40000">
+              <a:schemeClr val="phClr">
+                <a:tint val="45000"/>
+                <a:shade val="99000"/>
+                <a:satMod val="350000"/>
+              </a:schemeClr>
+            </a:gs>
+            <a:gs pos="100000">
+              <a:schemeClr val="phClr">
+                <a:shade val="20000"/>
+                <a:satMod val="255000"/>
+              </a:schemeClr>
+            </a:gs>
+          </a:gsLst>
+          <a:path path="circle">
+            <a:fillToRect l="50000" t="-80000" r="50000" b="180000"/>
+          </a:path>
+        </a:gradFill>
+        <a:gradFill rotWithShape="1">
+          <a:gsLst>
+            <a:gs pos="0">
+              <a:schemeClr val="phClr">
+                <a:tint val="80000"/>
+                <a:satMod val="300000"/>
+              </a:schemeClr>
+            </a:gs>
+            <a:gs pos="100000">
+              <a:schemeClr val="phClr">
+                <a:shade val="30000"/>
+                <a:satMod val="200000"/>
+              </a:schemeClr>
+            </a:gs>
+          </a:gsLst>
+          <a:path path="circle">
+            <a:fillToRect l="50000" t="50000" r="50000" b="50000"/>
+          </a:path>
+        </a:gradFill>
+      </a:bgFillStyleLst>
+    </a:fmtScheme>
+  </a:themeElements>
+</a:theme>
+</file>
+
+<file path=ppt/theme/theme2.xml><?xml version="1.0" encoding="utf-8"?>
 <a:theme xmlns:a="http://schemas.openxmlformats.org/drawingml/2006/main" xmlns:r="http://schemas.openxmlformats.org/officeDocument/2006/relationships" name="1_Activeeon Presentation Template">
   <a:themeElements>
     <a:clrScheme name="AE Blue">
@@ -24506,283 +24802,4 @@
     </a:fmtScheme>
   </a:themeElements>
 </a:theme>
-</file>
-
-<file path=ppt/theme/theme2.xml><?xml version="1.0" encoding="utf-8"?>
-<a:theme xmlns:a="http://schemas.openxmlformats.org/drawingml/2006/main" xmlns:r="http://schemas.openxmlformats.org/officeDocument/2006/relationships">
-  <a:themeElements>
-    <a:clrScheme name="Default">
-      <a:dk1>
-        <a:srgbClr val="000000"/>
-      </a:dk1>
-      <a:lt1>
-        <a:srgbClr val="FFFFFF"/>
-      </a:lt1>
-      <a:dk2>
-        <a:srgbClr val="158158"/>
-      </a:dk2>
-      <a:lt2>
-        <a:srgbClr val="F3F3F3"/>
-      </a:lt2>
-      <a:accent1>
-        <a:srgbClr val="058DC7"/>
-      </a:accent1>
-      <a:accent2>
-        <a:srgbClr val="50B432"/>
-      </a:accent2>
-      <a:accent3>
-        <a:srgbClr val="ED561B"/>
-      </a:accent3>
-      <a:accent4>
-        <a:srgbClr val="EDEF00"/>
-      </a:accent4>
-      <a:accent5>
-        <a:srgbClr val="24CBE5"/>
-      </a:accent5>
-      <a:accent6>
-        <a:srgbClr val="64E572"/>
-      </a:accent6>
-      <a:hlink>
-        <a:srgbClr val="2200CC"/>
-      </a:hlink>
-      <a:folHlink>
-        <a:srgbClr val="551A8B"/>
-      </a:folHlink>
-    </a:clrScheme>
-    <a:fontScheme name="Office">
-      <a:majorFont>
-        <a:latin typeface="Arial"/>
-        <a:ea typeface=""/>
-        <a:cs typeface=""/>
-        <a:font script="Jpan" typeface="ＭＳ Ｐゴシック"/>
-        <a:font script="Hang" typeface="맑은 고딕"/>
-        <a:font script="Hans" typeface="宋体"/>
-        <a:font script="Hant" typeface="新細明體"/>
-        <a:font script="Arab" typeface="Times New Roman"/>
-        <a:font script="Hebr" typeface="Times New Roman"/>
-        <a:font script="Thai" typeface="Angsana New"/>
-        <a:font script="Ethi" typeface="Nyala"/>
-        <a:font script="Beng" typeface="Vrinda"/>
-        <a:font script="Gujr" typeface="Shruti"/>
-        <a:font script="Khmr" typeface="MoolBoran"/>
-        <a:font script="Knda" typeface="Tunga"/>
-        <a:font script="Guru" typeface="Raavi"/>
-        <a:font script="Cans" typeface="Euphemia"/>
-        <a:font script="Cher" typeface="Plantagenet Cherokee"/>
-        <a:font script="Yiii" typeface="Microsoft Yi Baiti"/>
-        <a:font script="Tibt" typeface="Microsoft Himalaya"/>
-        <a:font script="Thaa" typeface="MV Boli"/>
-        <a:font script="Deva" typeface="Mangal"/>
-        <a:font script="Telu" typeface="Gautami"/>
-        <a:font script="Taml" typeface="Latha"/>
-        <a:font script="Syrc" typeface="Estrangelo Edessa"/>
-        <a:font script="Orya" typeface="Kalinga"/>
-        <a:font script="Mlym" typeface="Kartika"/>
-        <a:font script="Laoo" typeface="DokChampa"/>
-        <a:font script="Sinh" typeface="Iskoola Pota"/>
-        <a:font script="Mong" typeface="Mongolian Baiti"/>
-        <a:font script="Viet" typeface="Times New Roman"/>
-        <a:font script="Uigh" typeface="Microsoft Uighur"/>
-        <a:font script="Geor" typeface="Sylfaen"/>
-      </a:majorFont>
-      <a:minorFont>
-        <a:latin typeface="Arial"/>
-        <a:ea typeface=""/>
-        <a:cs typeface=""/>
-        <a:font script="Jpan" typeface="ＭＳ Ｐゴシック"/>
-        <a:font script="Hang" typeface="맑은 고딕"/>
-        <a:font script="Hans" typeface="宋体"/>
-        <a:font script="Hant" typeface="新細明體"/>
-        <a:font script="Arab" typeface="Arial"/>
-        <a:font script="Hebr" typeface="Arial"/>
-        <a:font script="Thai" typeface="Cordia New"/>
-        <a:font script="Ethi" typeface="Nyala"/>
-        <a:font script="Beng" typeface="Vrinda"/>
-        <a:font script="Gujr" typeface="Shruti"/>
-        <a:font script="Khmr" typeface="DaunPenh"/>
-        <a:font script="Knda" typeface="Tunga"/>
-        <a:font script="Guru" typeface="Raavi"/>
-        <a:font script="Cans" typeface="Euphemia"/>
-        <a:font script="Cher" typeface="Plantagenet Cherokee"/>
-        <a:font script="Yiii" typeface="Microsoft Yi Baiti"/>
-        <a:font script="Tibt" typeface="Microsoft Himalaya"/>
-        <a:font script="Thaa" typeface="MV Boli"/>
-        <a:font script="Deva" typeface="Mangal"/>
-        <a:font script="Telu" typeface="Gautami"/>
-        <a:font script="Taml" typeface="Latha"/>
-        <a:font script="Syrc" typeface="Estrangelo Edessa"/>
-        <a:font script="Orya" typeface="Kalinga"/>
-        <a:font script="Mlym" typeface="Kartika"/>
-        <a:font script="Laoo" typeface="DokChampa"/>
-        <a:font script="Sinh" typeface="Iskoola Pota"/>
-        <a:font script="Mong" typeface="Mongolian Baiti"/>
-        <a:font script="Viet" typeface="Arial"/>
-        <a:font script="Uigh" typeface="Microsoft Uighur"/>
-        <a:font script="Geor" typeface="Sylfaen"/>
-      </a:minorFont>
-    </a:fontScheme>
-    <a:fmtScheme name="Office">
-      <a:fillStyleLst>
-        <a:solidFill>
-          <a:schemeClr val="phClr"/>
-        </a:solidFill>
-        <a:gradFill rotWithShape="1">
-          <a:gsLst>
-            <a:gs pos="0">
-              <a:schemeClr val="phClr">
-                <a:tint val="50000"/>
-                <a:satMod val="300000"/>
-              </a:schemeClr>
-            </a:gs>
-            <a:gs pos="35000">
-              <a:schemeClr val="phClr">
-                <a:tint val="37000"/>
-                <a:satMod val="300000"/>
-              </a:schemeClr>
-            </a:gs>
-            <a:gs pos="100000">
-              <a:schemeClr val="phClr">
-                <a:tint val="15000"/>
-                <a:satMod val="350000"/>
-              </a:schemeClr>
-            </a:gs>
-          </a:gsLst>
-          <a:lin ang="16200000" scaled="1"/>
-        </a:gradFill>
-        <a:gradFill rotWithShape="1">
-          <a:gsLst>
-            <a:gs pos="0">
-              <a:schemeClr val="phClr">
-                <a:tint val="100000"/>
-                <a:shade val="100000"/>
-                <a:satMod val="130000"/>
-              </a:schemeClr>
-            </a:gs>
-            <a:gs pos="100000">
-              <a:schemeClr val="phClr">
-                <a:tint val="50000"/>
-                <a:shade val="100000"/>
-                <a:satMod val="350000"/>
-              </a:schemeClr>
-            </a:gs>
-          </a:gsLst>
-          <a:lin ang="16200000" scaled="0"/>
-        </a:gradFill>
-      </a:fillStyleLst>
-      <a:lnStyleLst>
-        <a:ln w="9525" cap="flat" cmpd="sng" algn="ctr">
-          <a:solidFill>
-            <a:schemeClr val="phClr">
-              <a:shade val="95000"/>
-              <a:satMod val="105000"/>
-            </a:schemeClr>
-          </a:solidFill>
-          <a:prstDash val="solid"/>
-        </a:ln>
-        <a:ln w="25400" cap="flat" cmpd="sng" algn="ctr">
-          <a:solidFill>
-            <a:schemeClr val="phClr"/>
-          </a:solidFill>
-          <a:prstDash val="solid"/>
-        </a:ln>
-        <a:ln w="38100" cap="flat" cmpd="sng" algn="ctr">
-          <a:solidFill>
-            <a:schemeClr val="phClr"/>
-          </a:solidFill>
-          <a:prstDash val="solid"/>
-        </a:ln>
-      </a:lnStyleLst>
-      <a:effectStyleLst>
-        <a:effectStyle>
-          <a:effectLst>
-            <a:outerShdw blurRad="40000" dist="20000" dir="5400000" rotWithShape="0">
-              <a:srgbClr val="000000">
-                <a:alpha val="38000"/>
-              </a:srgbClr>
-            </a:outerShdw>
-          </a:effectLst>
-        </a:effectStyle>
-        <a:effectStyle>
-          <a:effectLst>
-            <a:outerShdw blurRad="40000" dist="23000" dir="5400000" rotWithShape="0">
-              <a:srgbClr val="000000">
-                <a:alpha val="35000"/>
-              </a:srgbClr>
-            </a:outerShdw>
-          </a:effectLst>
-        </a:effectStyle>
-        <a:effectStyle>
-          <a:effectLst>
-            <a:outerShdw blurRad="40000" dist="23000" dir="5400000" rotWithShape="0">
-              <a:srgbClr val="000000">
-                <a:alpha val="35000"/>
-              </a:srgbClr>
-            </a:outerShdw>
-          </a:effectLst>
-          <a:scene3d>
-            <a:camera prst="orthographicFront">
-              <a:rot lat="0" lon="0" rev="0"/>
-            </a:camera>
-            <a:lightRig rig="threePt" dir="t">
-              <a:rot lat="0" lon="0" rev="1200000"/>
-            </a:lightRig>
-          </a:scene3d>
-          <a:sp3d>
-            <a:bevelT w="63500" h="25400"/>
-          </a:sp3d>
-        </a:effectStyle>
-      </a:effectStyleLst>
-      <a:bgFillStyleLst>
-        <a:solidFill>
-          <a:schemeClr val="phClr"/>
-        </a:solidFill>
-        <a:gradFill rotWithShape="1">
-          <a:gsLst>
-            <a:gs pos="0">
-              <a:schemeClr val="phClr">
-                <a:tint val="40000"/>
-                <a:satMod val="350000"/>
-              </a:schemeClr>
-            </a:gs>
-            <a:gs pos="40000">
-              <a:schemeClr val="phClr">
-                <a:tint val="45000"/>
-                <a:shade val="99000"/>
-                <a:satMod val="350000"/>
-              </a:schemeClr>
-            </a:gs>
-            <a:gs pos="100000">
-              <a:schemeClr val="phClr">
-                <a:shade val="20000"/>
-                <a:satMod val="255000"/>
-              </a:schemeClr>
-            </a:gs>
-          </a:gsLst>
-          <a:path path="circle">
-            <a:fillToRect l="50000" t="-80000" r="50000" b="180000"/>
-          </a:path>
-        </a:gradFill>
-        <a:gradFill rotWithShape="1">
-          <a:gsLst>
-            <a:gs pos="0">
-              <a:schemeClr val="phClr">
-                <a:tint val="80000"/>
-                <a:satMod val="300000"/>
-              </a:schemeClr>
-            </a:gs>
-            <a:gs pos="100000">
-              <a:schemeClr val="phClr">
-                <a:shade val="30000"/>
-                <a:satMod val="200000"/>
-              </a:schemeClr>
-            </a:gs>
-          </a:gsLst>
-          <a:path path="circle">
-            <a:fillToRect l="50000" t="50000" r="50000" b="50000"/>
-          </a:path>
-        </a:gradFill>
-      </a:bgFillStyleLst>
-    </a:fmtScheme>
-  </a:themeElements>
-</a:theme>
 </file>
</xml_diff>